<commit_message>
Added review page. Completed slides.
</commit_message>
<xml_diff>
--- a/slides/AHaque_Bootstrap-Presentation_1-24-15.pptx
+++ b/slides/AHaque_Bootstrap-Presentation_1-24-15.pptx
@@ -37,19 +37,22 @@
     <p:sldId id="264" r:id="rId31"/>
     <p:sldId id="291" r:id="rId32"/>
     <p:sldId id="265" r:id="rId33"/>
-    <p:sldId id="266" r:id="rId34"/>
-    <p:sldId id="269" r:id="rId35"/>
-    <p:sldId id="299" r:id="rId36"/>
-    <p:sldId id="292" r:id="rId37"/>
-    <p:sldId id="293" r:id="rId38"/>
-    <p:sldId id="301" r:id="rId39"/>
-    <p:sldId id="298" r:id="rId40"/>
-    <p:sldId id="297" r:id="rId41"/>
-    <p:sldId id="295" r:id="rId42"/>
-    <p:sldId id="294" r:id="rId43"/>
-    <p:sldId id="259" r:id="rId44"/>
-    <p:sldId id="300" r:id="rId45"/>
-    <p:sldId id="256" r:id="rId46"/>
+    <p:sldId id="311" r:id="rId34"/>
+    <p:sldId id="266" r:id="rId35"/>
+    <p:sldId id="269" r:id="rId36"/>
+    <p:sldId id="299" r:id="rId37"/>
+    <p:sldId id="314" r:id="rId38"/>
+    <p:sldId id="292" r:id="rId39"/>
+    <p:sldId id="313" r:id="rId40"/>
+    <p:sldId id="301" r:id="rId41"/>
+    <p:sldId id="298" r:id="rId42"/>
+    <p:sldId id="297" r:id="rId43"/>
+    <p:sldId id="295" r:id="rId44"/>
+    <p:sldId id="315" r:id="rId45"/>
+    <p:sldId id="316" r:id="rId46"/>
+    <p:sldId id="259" r:id="rId47"/>
+    <p:sldId id="300" r:id="rId48"/>
+    <p:sldId id="256" r:id="rId49"/>
   </p:sldIdLst>
   <p:sldSz cx="9144000" cy="6858000" type="screen4x3"/>
   <p:notesSz cx="6858000" cy="9144000"/>
@@ -4429,14 +4432,7 @@
                 <a:latin typeface="Arial" panose="020B0604020202020204" pitchFamily="34" charset="0"/>
                 <a:cs typeface="Arial" panose="020B0604020202020204" pitchFamily="34" charset="0"/>
               </a:rPr>
-              <a:t>Hella </a:t>
-            </a:r>
-            <a:r>
-              <a:rPr lang="en-US" sz="3600" b="1" dirty="0" smtClean="0">
-                <a:latin typeface="Arial" panose="020B0604020202020204" pitchFamily="34" charset="0"/>
-                <a:cs typeface="Arial" panose="020B0604020202020204" pitchFamily="34" charset="0"/>
-              </a:rPr>
-              <a:t>boring.</a:t>
+              <a:t>Hella boring.</a:t>
             </a:r>
             <a:endParaRPr lang="en-US" sz="3600" b="1" dirty="0">
               <a:latin typeface="Arial" panose="020B0604020202020204" pitchFamily="34" charset="0"/>
@@ -6312,14 +6308,7 @@
                 <a:latin typeface="Arial" panose="020B0604020202020204" pitchFamily="34" charset="0"/>
                 <a:cs typeface="Arial" panose="020B0604020202020204" pitchFamily="34" charset="0"/>
               </a:rPr>
-              <a:t>Still </a:t>
-            </a:r>
-            <a:r>
-              <a:rPr lang="en-US" sz="3600" b="1" dirty="0" smtClean="0">
-                <a:latin typeface="Arial" panose="020B0604020202020204" pitchFamily="34" charset="0"/>
-                <a:cs typeface="Arial" panose="020B0604020202020204" pitchFamily="34" charset="0"/>
-              </a:rPr>
-              <a:t>boring… </a:t>
+              <a:t>Still boring… </a:t>
             </a:r>
           </a:p>
           <a:p>
@@ -7735,14 +7724,7 @@
                 <a:latin typeface="Arial" panose="020B0604020202020204" pitchFamily="34" charset="0"/>
                 <a:cs typeface="Arial" panose="020B0604020202020204" pitchFamily="34" charset="0"/>
               </a:rPr>
-              <a:t>Documentation here</a:t>
-            </a:r>
-            <a:r>
-              <a:rPr lang="en-US" sz="2400" dirty="0" smtClean="0">
-                <a:latin typeface="Arial" panose="020B0604020202020204" pitchFamily="34" charset="0"/>
-                <a:cs typeface="Arial" panose="020B0604020202020204" pitchFamily="34" charset="0"/>
-              </a:rPr>
-              <a:t>: </a:t>
+              <a:t>Documentation here: </a:t>
             </a:r>
             <a:r>
               <a:rPr lang="en-US" sz="2400" dirty="0" smtClean="0">
@@ -8428,10 +8410,6 @@
               </a:rPr>
               <a:t> for an example.</a:t>
             </a:r>
-            <a:endParaRPr lang="en-US" sz="2200" dirty="0" smtClean="0">
-              <a:latin typeface="Arial" panose="020B0604020202020204" pitchFamily="34" charset="0"/>
-              <a:cs typeface="Arial" panose="020B0604020202020204" pitchFamily="34" charset="0"/>
-            </a:endParaRPr>
           </a:p>
           <a:p>
             <a:pPr marL="0" indent="0">
@@ -8838,21 +8816,7 @@
                 <a:latin typeface="Arial" panose="020B0604020202020204" pitchFamily="34" charset="0"/>
                 <a:cs typeface="Arial" panose="020B0604020202020204" pitchFamily="34" charset="0"/>
               </a:rPr>
-              <a:t>HTML </a:t>
-            </a:r>
-            <a:r>
-              <a:rPr lang="en-US" b="1" u="sng" dirty="0" smtClean="0">
-                <a:latin typeface="Arial" panose="020B0604020202020204" pitchFamily="34" charset="0"/>
-                <a:cs typeface="Arial" panose="020B0604020202020204" pitchFamily="34" charset="0"/>
-              </a:rPr>
-              <a:t>/ </a:t>
-            </a:r>
-            <a:r>
-              <a:rPr lang="en-US" b="1" u="sng" dirty="0" smtClean="0">
-                <a:latin typeface="Arial" panose="020B0604020202020204" pitchFamily="34" charset="0"/>
-                <a:cs typeface="Arial" panose="020B0604020202020204" pitchFamily="34" charset="0"/>
-              </a:rPr>
-              <a:t>CSS</a:t>
+              <a:t>HTML / CSS</a:t>
             </a:r>
             <a:endParaRPr lang="en-US" b="1" u="sng" dirty="0">
               <a:latin typeface="Arial" panose="020B0604020202020204" pitchFamily="34" charset="0"/>
@@ -8865,14 +8829,7 @@
                 <a:latin typeface="Arial" panose="020B0604020202020204" pitchFamily="34" charset="0"/>
                 <a:cs typeface="Arial" panose="020B0604020202020204" pitchFamily="34" charset="0"/>
               </a:rPr>
-              <a:t>Like </a:t>
-            </a:r>
-            <a:r>
-              <a:rPr lang="en-US" sz="1800" dirty="0" smtClean="0">
-                <a:latin typeface="Arial" panose="020B0604020202020204" pitchFamily="34" charset="0"/>
-                <a:cs typeface="Arial" panose="020B0604020202020204" pitchFamily="34" charset="0"/>
-              </a:rPr>
-              <a:t>writing papers in Microsoft Word.</a:t>
+              <a:t>Like writing papers in Microsoft Word.</a:t>
             </a:r>
           </a:p>
           <a:p>
@@ -9153,14 +9110,7 @@
                 <a:latin typeface="Arial" panose="020B0604020202020204" pitchFamily="34" charset="0"/>
                 <a:cs typeface="Arial" panose="020B0604020202020204" pitchFamily="34" charset="0"/>
               </a:rPr>
-              <a:t>HTML / </a:t>
-            </a:r>
-            <a:r>
-              <a:rPr lang="en-US" b="1" u="sng" dirty="0" smtClean="0">
-                <a:latin typeface="Arial" panose="020B0604020202020204" pitchFamily="34" charset="0"/>
-                <a:cs typeface="Arial" panose="020B0604020202020204" pitchFamily="34" charset="0"/>
-              </a:rPr>
-              <a:t>CSS &amp; Bootstrap </a:t>
+              <a:t>HTML / CSS &amp; Bootstrap </a:t>
             </a:r>
             <a:endParaRPr lang="en-US" b="1" u="sng" dirty="0">
               <a:latin typeface="Arial" panose="020B0604020202020204" pitchFamily="34" charset="0"/>
@@ -9173,14 +9123,7 @@
                 <a:latin typeface="Arial" panose="020B0604020202020204" pitchFamily="34" charset="0"/>
                 <a:cs typeface="Arial" panose="020B0604020202020204" pitchFamily="34" charset="0"/>
               </a:rPr>
-              <a:t>Like writing papers in Microsoft </a:t>
-            </a:r>
-            <a:r>
-              <a:rPr lang="en-US" sz="1900" dirty="0" smtClean="0">
-                <a:latin typeface="Arial" panose="020B0604020202020204" pitchFamily="34" charset="0"/>
-                <a:cs typeface="Arial" panose="020B0604020202020204" pitchFamily="34" charset="0"/>
-              </a:rPr>
-              <a:t>Word with a </a:t>
+              <a:t>Like writing papers in Microsoft Word with a </a:t>
             </a:r>
             <a:r>
               <a:rPr lang="en-US" sz="1900" b="1" u="sng" dirty="0" smtClean="0">
@@ -9189,10 +9132,6 @@
               </a:rPr>
               <a:t>prebuilt template.</a:t>
             </a:r>
-            <a:endParaRPr lang="en-US" sz="1900" b="1" u="sng" dirty="0" smtClean="0">
-              <a:latin typeface="Arial" panose="020B0604020202020204" pitchFamily="34" charset="0"/>
-              <a:cs typeface="Arial" panose="020B0604020202020204" pitchFamily="34" charset="0"/>
-            </a:endParaRPr>
           </a:p>
           <a:p>
             <a:endParaRPr lang="en-US" sz="1900" b="1" u="sng" dirty="0">
@@ -9365,17 +9304,7 @@
                 <a:latin typeface="Arial" panose="020B0604020202020204" pitchFamily="34" charset="0"/>
                 <a:cs typeface="Arial" panose="020B0604020202020204" pitchFamily="34" charset="0"/>
               </a:rPr>
-              <a:t>Our basic website </a:t>
-            </a:r>
-            <a:r>
-              <a:rPr lang="en-US" sz="3600" b="1" dirty="0" smtClean="0">
-                <a:solidFill>
-                  <a:schemeClr val="bg1"/>
-                </a:solidFill>
-                <a:latin typeface="Arial" panose="020B0604020202020204" pitchFamily="34" charset="0"/>
-                <a:cs typeface="Arial" panose="020B0604020202020204" pitchFamily="34" charset="0"/>
-              </a:rPr>
-              <a:t>with Bootstrap…</a:t>
+              <a:t>Our basic website with Bootstrap…</a:t>
             </a:r>
             <a:endParaRPr lang="en-US" sz="1800" b="1" dirty="0">
               <a:solidFill>
@@ -9472,7 +9401,7 @@
         <p:spPr>
           <a:xfrm>
             <a:off x="7374092" y="2921144"/>
-            <a:ext cx="1620957" cy="646331"/>
+            <a:ext cx="1620957" cy="1200329"/>
           </a:xfrm>
           <a:prstGeom prst="rect">
             <a:avLst/>
@@ -9485,12 +9414,30 @@
           </a:bodyPr>
           <a:lstStyle/>
           <a:p>
+            <a:pPr algn="ctr"/>
             <a:r>
               <a:rPr lang="en-US" sz="3600" b="1" dirty="0" smtClean="0">
                 <a:latin typeface="Arial" panose="020B0604020202020204" pitchFamily="34" charset="0"/>
                 <a:cs typeface="Arial" panose="020B0604020202020204" pitchFamily="34" charset="0"/>
               </a:rPr>
-              <a:t>Damn!</a:t>
+              <a:t>Hot</a:t>
+            </a:r>
+          </a:p>
+          <a:p>
+            <a:pPr algn="ctr"/>
+            <a:r>
+              <a:rPr lang="en-US" sz="3600" b="1" dirty="0" smtClean="0">
+                <a:latin typeface="Arial" panose="020B0604020202020204" pitchFamily="34" charset="0"/>
+                <a:cs typeface="Arial" panose="020B0604020202020204" pitchFamily="34" charset="0"/>
+              </a:rPr>
+              <a:t>Damn</a:t>
+            </a:r>
+            <a:r>
+              <a:rPr lang="en-US" sz="3600" b="1" dirty="0" smtClean="0">
+                <a:latin typeface="Arial" panose="020B0604020202020204" pitchFamily="34" charset="0"/>
+                <a:cs typeface="Arial" panose="020B0604020202020204" pitchFamily="34" charset="0"/>
+              </a:rPr>
+              <a:t>!</a:t>
             </a:r>
             <a:endParaRPr lang="en-US" sz="3600" b="1" dirty="0">
               <a:latin typeface="Arial" panose="020B0604020202020204" pitchFamily="34" charset="0"/>
@@ -10428,9 +10375,50 @@
           </a:prstGeom>
         </p:spPr>
       </p:pic>
-      <p:sp>
-        <p:nvSpPr>
-          <p:cNvPr id="5" name="Content Placeholder 4"/>
+      <p:pic>
+        <p:nvPicPr>
+          <p:cNvPr id="2052" name="Picture 4" descr="https://cdn.tutsplus.com/webdesign/uploads/legacy/tuts/341_wf/wireframe-bare.png"/>
+          <p:cNvPicPr>
+            <a:picLocks noChangeAspect="1" noChangeArrowheads="1"/>
+          </p:cNvPicPr>
+          <p:nvPr/>
+        </p:nvPicPr>
+        <p:blipFill>
+          <a:blip r:embed="rId3">
+            <a:extLst>
+              <a:ext uri="{28A0092B-C50C-407E-A947-70E740481C1C}">
+                <a14:useLocalDpi xmlns:a14="http://schemas.microsoft.com/office/drawing/2010/main" val="0"/>
+              </a:ext>
+            </a:extLst>
+          </a:blip>
+          <a:srcRect/>
+          <a:stretch>
+            <a:fillRect/>
+          </a:stretch>
+        </p:blipFill>
+        <p:spPr bwMode="auto">
+          <a:xfrm>
+            <a:off x="914400" y="990600"/>
+            <a:ext cx="6827519" cy="4800600"/>
+          </a:xfrm>
+          <a:prstGeom prst="rect">
+            <a:avLst/>
+          </a:prstGeom>
+          <a:noFill/>
+          <a:extLst>
+            <a:ext uri="{909E8E84-426E-40DD-AFC4-6F175D3DCCD1}">
+              <a14:hiddenFill xmlns:a14="http://schemas.microsoft.com/office/drawing/2010/main">
+                <a:solidFill>
+                  <a:srgbClr val="FFFFFF"/>
+                </a:solidFill>
+              </a14:hiddenFill>
+            </a:ext>
+          </a:extLst>
+        </p:spPr>
+      </p:pic>
+      <p:sp>
+        <p:nvSpPr>
+          <p:cNvPr id="8" name="Content Placeholder 2"/>
           <p:cNvSpPr>
             <a:spLocks noGrp="1"/>
           </p:cNvSpPr>
@@ -10438,12 +10426,29 @@
             <p:ph idx="1"/>
           </p:nvPr>
         </p:nvSpPr>
-        <p:spPr/>
-        <p:txBody>
-          <a:bodyPr/>
+        <p:spPr>
+          <a:xfrm>
+            <a:off x="457200" y="5867400"/>
+            <a:ext cx="8229600" cy="762000"/>
+          </a:xfrm>
+        </p:spPr>
+        <p:txBody>
+          <a:bodyPr>
+            <a:normAutofit/>
+          </a:bodyPr>
           <a:lstStyle/>
           <a:p>
-            <a:endParaRPr lang="en-US"/>
+            <a:r>
+              <a:rPr lang="en-US" sz="2400" dirty="0" smtClean="0">
+                <a:latin typeface="Arial" panose="020B0604020202020204" pitchFamily="34" charset="0"/>
+                <a:cs typeface="Arial" panose="020B0604020202020204" pitchFamily="34" charset="0"/>
+              </a:rPr>
+              <a:t>Grids serve to align elements aesthetically. </a:t>
+            </a:r>
+            <a:endParaRPr lang="en-US" sz="2400" dirty="0">
+              <a:latin typeface="Arial" panose="020B0604020202020204" pitchFamily="34" charset="0"/>
+              <a:cs typeface="Arial" panose="020B0604020202020204" pitchFamily="34" charset="0"/>
+            </a:endParaRPr>
           </a:p>
         </p:txBody>
       </p:sp>
@@ -11058,7 +11063,7 @@
                 <a:latin typeface="Arial" panose="020B0604020202020204" pitchFamily="34" charset="0"/>
                 <a:cs typeface="Arial" panose="020B0604020202020204" pitchFamily="34" charset="0"/>
               </a:rPr>
-              <a:t>Tools for Sketch / Grid Creation</a:t>
+              <a:t>A More Complex Grid…</a:t>
             </a:r>
             <a:endParaRPr lang="en-US" sz="3600" b="1" dirty="0">
               <a:solidFill>
@@ -11116,285 +11121,6 @@
           </a:p>
         </p:txBody>
       </p:sp>
-      <p:sp>
-        <p:nvSpPr>
-          <p:cNvPr id="3" name="Content Placeholder 2"/>
-          <p:cNvSpPr>
-            <a:spLocks noGrp="1"/>
-          </p:cNvSpPr>
-          <p:nvPr>
-            <p:ph idx="1"/>
-          </p:nvPr>
-        </p:nvSpPr>
-        <p:spPr>
-          <a:xfrm>
-            <a:off x="457200" y="1295400"/>
-            <a:ext cx="8229600" cy="4525963"/>
-          </a:xfrm>
-        </p:spPr>
-        <p:txBody>
-          <a:bodyPr>
-            <a:normAutofit fontScale="77500" lnSpcReduction="20000"/>
-          </a:bodyPr>
-          <a:lstStyle/>
-          <a:p>
-            <a:pPr marL="0" indent="0">
-              <a:buNone/>
-            </a:pPr>
-            <a:r>
-              <a:rPr lang="en-US" b="1" u="sng" dirty="0" err="1" smtClean="0">
-                <a:latin typeface="Arial" panose="020B0604020202020204" pitchFamily="34" charset="0"/>
-                <a:cs typeface="Arial" panose="020B0604020202020204" pitchFamily="34" charset="0"/>
-              </a:rPr>
-              <a:t>Wireframing</a:t>
-            </a:r>
-            <a:r>
-              <a:rPr lang="en-US" b="1" u="sng" dirty="0" smtClean="0">
-                <a:latin typeface="Arial" panose="020B0604020202020204" pitchFamily="34" charset="0"/>
-                <a:cs typeface="Arial" panose="020B0604020202020204" pitchFamily="34" charset="0"/>
-              </a:rPr>
-              <a:t> Tools:</a:t>
-            </a:r>
-          </a:p>
-          <a:p>
-            <a:r>
-              <a:rPr lang="en-US" sz="2800" dirty="0" err="1" smtClean="0">
-                <a:latin typeface="Arial" panose="020B0604020202020204" pitchFamily="34" charset="0"/>
-                <a:cs typeface="Arial" panose="020B0604020202020204" pitchFamily="34" charset="0"/>
-              </a:rPr>
-              <a:t>Balsamiq</a:t>
-            </a:r>
-            <a:r>
-              <a:rPr lang="en-US" sz="2800" dirty="0" smtClean="0">
-                <a:latin typeface="Arial" panose="020B0604020202020204" pitchFamily="34" charset="0"/>
-                <a:cs typeface="Arial" panose="020B0604020202020204" pitchFamily="34" charset="0"/>
-              </a:rPr>
-              <a:t>***: </a:t>
-            </a:r>
-            <a:r>
-              <a:rPr lang="en-US" sz="2800" dirty="0" smtClean="0">
-                <a:latin typeface="Arial" panose="020B0604020202020204" pitchFamily="34" charset="0"/>
-                <a:cs typeface="Arial" panose="020B0604020202020204" pitchFamily="34" charset="0"/>
-                <a:hlinkClick r:id="rId2"/>
-              </a:rPr>
-              <a:t>https://balsamiq.com/</a:t>
-            </a:r>
-            <a:r>
-              <a:rPr lang="en-US" sz="2800" dirty="0" smtClean="0">
-                <a:latin typeface="Arial" panose="020B0604020202020204" pitchFamily="34" charset="0"/>
-                <a:cs typeface="Arial" panose="020B0604020202020204" pitchFamily="34" charset="0"/>
-              </a:rPr>
-              <a:t> </a:t>
-            </a:r>
-          </a:p>
-          <a:p>
-            <a:r>
-              <a:rPr lang="en-US" sz="2800" dirty="0" err="1" smtClean="0">
-                <a:latin typeface="Arial" panose="020B0604020202020204" pitchFamily="34" charset="0"/>
-                <a:cs typeface="Arial" panose="020B0604020202020204" pitchFamily="34" charset="0"/>
-              </a:rPr>
-              <a:t>Framebox</a:t>
-            </a:r>
-            <a:r>
-              <a:rPr lang="en-US" sz="2800" dirty="0" smtClean="0">
-                <a:latin typeface="Arial" panose="020B0604020202020204" pitchFamily="34" charset="0"/>
-                <a:cs typeface="Arial" panose="020B0604020202020204" pitchFamily="34" charset="0"/>
-              </a:rPr>
-              <a:t>: </a:t>
-            </a:r>
-            <a:r>
-              <a:rPr lang="en-US" sz="2800" dirty="0" smtClean="0">
-                <a:latin typeface="Arial" panose="020B0604020202020204" pitchFamily="34" charset="0"/>
-                <a:cs typeface="Arial" panose="020B0604020202020204" pitchFamily="34" charset="0"/>
-                <a:hlinkClick r:id="rId3"/>
-              </a:rPr>
-              <a:t>http://framebox.org/</a:t>
-            </a:r>
-            <a:r>
-              <a:rPr lang="en-US" sz="2800" dirty="0" smtClean="0">
-                <a:latin typeface="Arial" panose="020B0604020202020204" pitchFamily="34" charset="0"/>
-                <a:cs typeface="Arial" panose="020B0604020202020204" pitchFamily="34" charset="0"/>
-              </a:rPr>
-              <a:t> </a:t>
-            </a:r>
-          </a:p>
-          <a:p>
-            <a:r>
-              <a:rPr lang="en-US" sz="2800" dirty="0" smtClean="0">
-                <a:latin typeface="Arial" panose="020B0604020202020204" pitchFamily="34" charset="0"/>
-                <a:cs typeface="Arial" panose="020B0604020202020204" pitchFamily="34" charset="0"/>
-              </a:rPr>
-              <a:t>Pen and Paper: Your notebook</a:t>
-            </a:r>
-          </a:p>
-          <a:p>
-            <a:endParaRPr lang="en-US" b="1" dirty="0">
-              <a:latin typeface="Arial" panose="020B0604020202020204" pitchFamily="34" charset="0"/>
-              <a:cs typeface="Arial" panose="020B0604020202020204" pitchFamily="34" charset="0"/>
-            </a:endParaRPr>
-          </a:p>
-          <a:p>
-            <a:pPr marL="0" indent="0">
-              <a:buNone/>
-            </a:pPr>
-            <a:r>
-              <a:rPr lang="en-US" b="1" u="sng" dirty="0" smtClean="0">
-                <a:latin typeface="Arial" panose="020B0604020202020204" pitchFamily="34" charset="0"/>
-                <a:cs typeface="Arial" panose="020B0604020202020204" pitchFamily="34" charset="0"/>
-              </a:rPr>
-              <a:t>Grids for Photoshop / Illustrator:</a:t>
-            </a:r>
-          </a:p>
-          <a:p>
-            <a:r>
-              <a:rPr lang="en-US" sz="2800" dirty="0" smtClean="0">
-                <a:latin typeface="Arial" panose="020B0604020202020204" pitchFamily="34" charset="0"/>
-                <a:cs typeface="Arial" panose="020B0604020202020204" pitchFamily="34" charset="0"/>
-              </a:rPr>
-              <a:t>960 GS: </a:t>
-            </a:r>
-            <a:r>
-              <a:rPr lang="en-US" sz="2800" dirty="0" smtClean="0">
-                <a:latin typeface="Arial" panose="020B0604020202020204" pitchFamily="34" charset="0"/>
-                <a:cs typeface="Arial" panose="020B0604020202020204" pitchFamily="34" charset="0"/>
-                <a:hlinkClick r:id="rId4"/>
-              </a:rPr>
-              <a:t>http://960.gs/</a:t>
-            </a:r>
-            <a:endParaRPr lang="en-US" sz="2800" dirty="0" smtClean="0">
-              <a:latin typeface="Arial" panose="020B0604020202020204" pitchFamily="34" charset="0"/>
-              <a:cs typeface="Arial" panose="020B0604020202020204" pitchFamily="34" charset="0"/>
-            </a:endParaRPr>
-          </a:p>
-          <a:p>
-            <a:r>
-              <a:rPr lang="en-US" sz="2800" dirty="0" err="1" smtClean="0">
-                <a:latin typeface="Arial" panose="020B0604020202020204" pitchFamily="34" charset="0"/>
-                <a:cs typeface="Arial" panose="020B0604020202020204" pitchFamily="34" charset="0"/>
-              </a:rPr>
-              <a:t>GuideGuide</a:t>
-            </a:r>
-            <a:r>
-              <a:rPr lang="en-US" sz="2800" dirty="0" smtClean="0">
-                <a:latin typeface="Arial" panose="020B0604020202020204" pitchFamily="34" charset="0"/>
-                <a:cs typeface="Arial" panose="020B0604020202020204" pitchFamily="34" charset="0"/>
-              </a:rPr>
-              <a:t>: </a:t>
-            </a:r>
-            <a:r>
-              <a:rPr lang="en-US" sz="2800" dirty="0" smtClean="0">
-                <a:latin typeface="Arial" panose="020B0604020202020204" pitchFamily="34" charset="0"/>
-                <a:cs typeface="Arial" panose="020B0604020202020204" pitchFamily="34" charset="0"/>
-                <a:hlinkClick r:id="rId3"/>
-              </a:rPr>
-              <a:t>http://framebox.org/</a:t>
-            </a:r>
-            <a:r>
-              <a:rPr lang="en-US" sz="2800" dirty="0" smtClean="0">
-                <a:latin typeface="Arial" panose="020B0604020202020204" pitchFamily="34" charset="0"/>
-                <a:cs typeface="Arial" panose="020B0604020202020204" pitchFamily="34" charset="0"/>
-              </a:rPr>
-              <a:t> </a:t>
-            </a:r>
-          </a:p>
-          <a:p>
-            <a:endParaRPr lang="en-US" dirty="0">
-              <a:latin typeface="Arial" panose="020B0604020202020204" pitchFamily="34" charset="0"/>
-              <a:cs typeface="Arial" panose="020B0604020202020204" pitchFamily="34" charset="0"/>
-            </a:endParaRPr>
-          </a:p>
-          <a:p>
-            <a:pPr marL="0" indent="0">
-              <a:buNone/>
-            </a:pPr>
-            <a:r>
-              <a:rPr lang="en-US" b="1" u="sng" dirty="0" smtClean="0">
-                <a:latin typeface="Arial" panose="020B0604020202020204" pitchFamily="34" charset="0"/>
-                <a:cs typeface="Arial" panose="020B0604020202020204" pitchFamily="34" charset="0"/>
-              </a:rPr>
-              <a:t>Designing with Grids Guides: </a:t>
-            </a:r>
-          </a:p>
-          <a:p>
-            <a:r>
-              <a:rPr lang="en-US" sz="2400" dirty="0" smtClean="0">
-                <a:latin typeface="Arial" panose="020B0604020202020204" pitchFamily="34" charset="0"/>
-                <a:cs typeface="Arial" panose="020B0604020202020204" pitchFamily="34" charset="0"/>
-              </a:rPr>
-              <a:t>960 Grid System Made Easy: </a:t>
-            </a:r>
-            <a:r>
-              <a:rPr lang="en-US" sz="2400" dirty="0" smtClean="0">
-                <a:latin typeface="Arial" panose="020B0604020202020204" pitchFamily="34" charset="0"/>
-                <a:cs typeface="Arial" panose="020B0604020202020204" pitchFamily="34" charset="0"/>
-                <a:hlinkClick r:id="rId5"/>
-              </a:rPr>
-              <a:t>http://bit.ly/1sjYaFC</a:t>
-            </a:r>
-            <a:r>
-              <a:rPr lang="en-US" sz="2400" dirty="0" smtClean="0">
-                <a:latin typeface="Arial" panose="020B0604020202020204" pitchFamily="34" charset="0"/>
-                <a:cs typeface="Arial" panose="020B0604020202020204" pitchFamily="34" charset="0"/>
-              </a:rPr>
-              <a:t> </a:t>
-            </a:r>
-          </a:p>
-          <a:p>
-            <a:r>
-              <a:rPr lang="en-US" sz="2400" dirty="0" smtClean="0">
-                <a:latin typeface="Arial" panose="020B0604020202020204" pitchFamily="34" charset="0"/>
-                <a:cs typeface="Arial" panose="020B0604020202020204" pitchFamily="34" charset="0"/>
-              </a:rPr>
-              <a:t>Design by Grid: </a:t>
-            </a:r>
-            <a:r>
-              <a:rPr lang="en-US" sz="2400" dirty="0" smtClean="0">
-                <a:latin typeface="Arial" panose="020B0604020202020204" pitchFamily="34" charset="0"/>
-                <a:cs typeface="Arial" panose="020B0604020202020204" pitchFamily="34" charset="0"/>
-                <a:hlinkClick r:id="rId6"/>
-              </a:rPr>
-              <a:t>http://www.designbygrid.com/</a:t>
-            </a:r>
-            <a:endParaRPr lang="en-US" sz="2400" dirty="0" smtClean="0">
-              <a:latin typeface="Arial" panose="020B0604020202020204" pitchFamily="34" charset="0"/>
-              <a:cs typeface="Arial" panose="020B0604020202020204" pitchFamily="34" charset="0"/>
-            </a:endParaRPr>
-          </a:p>
-          <a:p>
-            <a:r>
-              <a:rPr lang="en-US" sz="2400" dirty="0" smtClean="0">
-                <a:latin typeface="Arial" panose="020B0604020202020204" pitchFamily="34" charset="0"/>
-                <a:cs typeface="Arial" panose="020B0604020202020204" pitchFamily="34" charset="0"/>
-              </a:rPr>
-              <a:t>Designing with Grid-Based Approach: </a:t>
-            </a:r>
-            <a:r>
-              <a:rPr lang="en-US" sz="2400" dirty="0" smtClean="0">
-                <a:latin typeface="Arial" panose="020B0604020202020204" pitchFamily="34" charset="0"/>
-                <a:cs typeface="Arial" panose="020B0604020202020204" pitchFamily="34" charset="0"/>
-                <a:hlinkClick r:id="rId7"/>
-              </a:rPr>
-              <a:t>http://bit.ly/1CM4Hzo</a:t>
-            </a:r>
-            <a:r>
-              <a:rPr lang="en-US" sz="2400" dirty="0" smtClean="0">
-                <a:latin typeface="Arial" panose="020B0604020202020204" pitchFamily="34" charset="0"/>
-                <a:cs typeface="Arial" panose="020B0604020202020204" pitchFamily="34" charset="0"/>
-              </a:rPr>
-              <a:t> </a:t>
-            </a:r>
-          </a:p>
-          <a:p>
-            <a:pPr marL="0" indent="0">
-              <a:buNone/>
-            </a:pPr>
-            <a:endParaRPr lang="en-US" dirty="0" smtClean="0">
-              <a:latin typeface="Arial" panose="020B0604020202020204" pitchFamily="34" charset="0"/>
-              <a:cs typeface="Arial" panose="020B0604020202020204" pitchFamily="34" charset="0"/>
-            </a:endParaRPr>
-          </a:p>
-        </p:txBody>
-      </p:sp>
       <p:pic>
         <p:nvPicPr>
           <p:cNvPr id="7" name="Picture 6"/>
@@ -11404,7 +11130,7 @@
           <p:nvPr/>
         </p:nvPicPr>
         <p:blipFill>
-          <a:blip r:embed="rId8" cstate="print">
+          <a:blip r:embed="rId2" cstate="print">
             <a:extLst>
               <a:ext uri="{28A0092B-C50C-407E-A947-70E740481C1C}">
                 <a14:useLocalDpi xmlns:a14="http://schemas.microsoft.com/office/drawing/2010/main" val="0"/>
@@ -11427,14 +11153,14 @@
       </p:pic>
       <p:pic>
         <p:nvPicPr>
-          <p:cNvPr id="18435" name="Picture 3"/>
+          <p:cNvPr id="19458" name="Picture 2" descr="12 Column Example"/>
           <p:cNvPicPr>
             <a:picLocks noChangeAspect="1" noChangeArrowheads="1"/>
           </p:cNvPicPr>
           <p:nvPr/>
         </p:nvPicPr>
         <p:blipFill>
-          <a:blip r:embed="rId9">
+          <a:blip r:embed="rId3">
             <a:extLst>
               <a:ext uri="{28A0092B-C50C-407E-A947-70E740481C1C}">
                 <a14:useLocalDpi xmlns:a14="http://schemas.microsoft.com/office/drawing/2010/main" val="0"/>
@@ -11448,33 +11174,59 @@
         </p:blipFill>
         <p:spPr bwMode="auto">
           <a:xfrm>
-            <a:off x="6020656" y="1219200"/>
-            <a:ext cx="2666144" cy="3200400"/>
+            <a:off x="155575" y="-136525"/>
+            <a:ext cx="4381500" cy="9525"/>
           </a:xfrm>
           <a:prstGeom prst="rect">
             <a:avLst/>
           </a:prstGeom>
           <a:noFill/>
-          <a:ln>
-            <a:noFill/>
-          </a:ln>
           <a:extLst>
             <a:ext uri="{909E8E84-426E-40DD-AFC4-6F175D3DCCD1}">
               <a14:hiddenFill xmlns:a14="http://schemas.microsoft.com/office/drawing/2010/main">
                 <a:solidFill>
-                  <a:schemeClr val="accent1"/>
+                  <a:srgbClr val="FFFFFF"/>
                 </a:solidFill>
               </a14:hiddenFill>
             </a:ext>
-            <a:ext uri="{91240B29-F687-4F45-9708-019B960494DF}">
-              <a14:hiddenLine xmlns:a14="http://schemas.microsoft.com/office/drawing/2010/main" w="9525">
-                <a:solidFill>
-                  <a:schemeClr val="tx1"/>
-                </a:solidFill>
-                <a:miter lim="800000"/>
-                <a:headEnd/>
-                <a:tailEnd/>
-              </a14:hiddenLine>
+          </a:extLst>
+        </p:spPr>
+      </p:pic>
+      <p:pic>
+        <p:nvPicPr>
+          <p:cNvPr id="1026" name="Picture 2" descr="http://1.bp.blogspot.com/-MApmsFuowRg/U4b9KpiOLbI/AAAAAAAAAh4/pDVukrQsJ_Y/s1600/cnn.png"/>
+          <p:cNvPicPr>
+            <a:picLocks noChangeAspect="1" noChangeArrowheads="1"/>
+          </p:cNvPicPr>
+          <p:nvPr/>
+        </p:nvPicPr>
+        <p:blipFill rotWithShape="1">
+          <a:blip r:embed="rId4">
+            <a:extLst>
+              <a:ext uri="{28A0092B-C50C-407E-A947-70E740481C1C}">
+                <a14:useLocalDpi xmlns:a14="http://schemas.microsoft.com/office/drawing/2010/main" val="0"/>
+              </a:ext>
+            </a:extLst>
+          </a:blip>
+          <a:srcRect l="10542" r="10523"/>
+          <a:stretch/>
+        </p:blipFill>
+        <p:spPr bwMode="auto">
+          <a:xfrm>
+            <a:off x="305254" y="990600"/>
+            <a:ext cx="8610146" cy="5271999"/>
+          </a:xfrm>
+          <a:prstGeom prst="rect">
+            <a:avLst/>
+          </a:prstGeom>
+          <a:noFill/>
+          <a:extLst>
+            <a:ext uri="{909E8E84-426E-40DD-AFC4-6F175D3DCCD1}">
+              <a14:hiddenFill xmlns:a14="http://schemas.microsoft.com/office/drawing/2010/main">
+                <a:solidFill>
+                  <a:srgbClr val="FFFFFF"/>
+                </a:solidFill>
+              </a14:hiddenFill>
             </a:ext>
           </a:extLst>
         </p:spPr>
@@ -11482,7 +11234,7 @@
     </p:spTree>
     <p:extLst>
       <p:ext uri="{BB962C8B-B14F-4D97-AF65-F5344CB8AC3E}">
-        <p14:creationId xmlns:p14="http://schemas.microsoft.com/office/powerpoint/2010/main" val="2921019782"/>
+        <p14:creationId xmlns:p14="http://schemas.microsoft.com/office/powerpoint/2010/main" val="3716143178"/>
       </p:ext>
     </p:extLst>
   </p:cSld>
@@ -11518,14 +11270,57 @@
       </p:grpSpPr>
       <p:sp>
         <p:nvSpPr>
-          <p:cNvPr id="9" name="Flowchart: Process 8"/>
+          <p:cNvPr id="2" name="Title 1"/>
+          <p:cNvSpPr>
+            <a:spLocks noGrp="1"/>
+          </p:cNvSpPr>
+          <p:nvPr>
+            <p:ph type="title"/>
+          </p:nvPr>
+        </p:nvSpPr>
+        <p:spPr>
+          <a:xfrm>
+            <a:off x="304800" y="122238"/>
+            <a:ext cx="8229600" cy="639762"/>
+          </a:xfrm>
+        </p:spPr>
+        <p:txBody>
+          <a:bodyPr>
+            <a:noAutofit/>
+          </a:bodyPr>
+          <a:lstStyle/>
+          <a:p>
+            <a:pPr algn="l"/>
+            <a:r>
+              <a:rPr lang="en-US" sz="3600" b="1" dirty="0" smtClean="0">
+                <a:solidFill>
+                  <a:schemeClr val="bg1"/>
+                </a:solidFill>
+                <a:latin typeface="Arial" panose="020B0604020202020204" pitchFamily="34" charset="0"/>
+                <a:cs typeface="Arial" panose="020B0604020202020204" pitchFamily="34" charset="0"/>
+              </a:rPr>
+              <a:t>Tools for Sketch / Grid Creation</a:t>
+            </a:r>
+            <a:endParaRPr lang="en-US" sz="3600" b="1" dirty="0">
+              <a:solidFill>
+                <a:schemeClr val="bg1"/>
+              </a:solidFill>
+              <a:latin typeface="Arial" panose="020B0604020202020204" pitchFamily="34" charset="0"/>
+              <a:cs typeface="Arial" panose="020B0604020202020204" pitchFamily="34" charset="0"/>
+            </a:endParaRPr>
+          </a:p>
+        </p:txBody>
+      </p:sp>
+      <p:sp>
+        <p:nvSpPr>
+          <p:cNvPr id="6" name="Flowchart: Process 5"/>
           <p:cNvSpPr/>
           <p:nvPr/>
         </p:nvSpPr>
         <p:spPr>
           <a:xfrm>
-            <a:off x="376381" y="3840481"/>
-            <a:ext cx="8447810" cy="45719"/>
+            <a:off x="-13855" y="838200"/>
+            <a:ext cx="9144000" cy="5791201"/>
           </a:xfrm>
           <a:prstGeom prst="flowChartProcess">
             <a:avLst/>
@@ -11564,53 +11359,371 @@
       </p:sp>
       <p:sp>
         <p:nvSpPr>
-          <p:cNvPr id="5" name="Title 1"/>
+          <p:cNvPr id="3" name="Content Placeholder 2"/>
           <p:cNvSpPr>
             <a:spLocks noGrp="1"/>
           </p:cNvSpPr>
           <p:nvPr>
-            <p:ph type="ctrTitle"/>
+            <p:ph idx="1"/>
           </p:nvPr>
         </p:nvSpPr>
         <p:spPr>
           <a:xfrm>
-            <a:off x="322695" y="2376249"/>
-            <a:ext cx="8610600" cy="1464232"/>
+            <a:off x="457200" y="1295400"/>
+            <a:ext cx="8229600" cy="4525963"/>
           </a:xfrm>
         </p:spPr>
         <p:txBody>
           <a:bodyPr>
-            <a:normAutofit/>
+            <a:normAutofit fontScale="77500" lnSpcReduction="20000"/>
           </a:bodyPr>
           <a:lstStyle/>
           <a:p>
-            <a:pPr algn="l"/>
-            <a:r>
-              <a:rPr lang="en-US" sz="6000" b="1" i="1" dirty="0" smtClean="0">
-                <a:solidFill>
-                  <a:schemeClr val="bg1"/>
-                </a:solidFill>
-                <a:latin typeface="Arial" panose="020B0604020202020204" pitchFamily="34" charset="0"/>
-                <a:ea typeface="Roboto" panose="02000000000000000000" pitchFamily="2" charset="0"/>
-                <a:cs typeface="Arial" panose="020B0604020202020204" pitchFamily="34" charset="0"/>
-              </a:rPr>
-              <a:t>Key Bootstrap Parts</a:t>
-            </a:r>
-            <a:endParaRPr lang="en-US" sz="6000" b="1" i="1" dirty="0">
-              <a:solidFill>
-                <a:schemeClr val="bg1"/>
-              </a:solidFill>
+            <a:pPr marL="0" indent="0">
+              <a:buNone/>
+            </a:pPr>
+            <a:r>
+              <a:rPr lang="en-US" b="1" u="sng" dirty="0" err="1" smtClean="0">
+                <a:latin typeface="Arial" panose="020B0604020202020204" pitchFamily="34" charset="0"/>
+                <a:cs typeface="Arial" panose="020B0604020202020204" pitchFamily="34" charset="0"/>
+              </a:rPr>
+              <a:t>Wireframing</a:t>
+            </a:r>
+            <a:r>
+              <a:rPr lang="en-US" b="1" u="sng" dirty="0" smtClean="0">
+                <a:latin typeface="Arial" panose="020B0604020202020204" pitchFamily="34" charset="0"/>
+                <a:cs typeface="Arial" panose="020B0604020202020204" pitchFamily="34" charset="0"/>
+              </a:rPr>
+              <a:t> Tools:</a:t>
+            </a:r>
+          </a:p>
+          <a:p>
+            <a:r>
+              <a:rPr lang="en-US" sz="2800" dirty="0" err="1" smtClean="0">
+                <a:latin typeface="Arial" panose="020B0604020202020204" pitchFamily="34" charset="0"/>
+                <a:cs typeface="Arial" panose="020B0604020202020204" pitchFamily="34" charset="0"/>
+              </a:rPr>
+              <a:t>Balsamiq</a:t>
+            </a:r>
+            <a:r>
+              <a:rPr lang="en-US" sz="2800" dirty="0" smtClean="0">
+                <a:latin typeface="Arial" panose="020B0604020202020204" pitchFamily="34" charset="0"/>
+                <a:cs typeface="Arial" panose="020B0604020202020204" pitchFamily="34" charset="0"/>
+              </a:rPr>
+              <a:t>***: </a:t>
+            </a:r>
+            <a:r>
+              <a:rPr lang="en-US" sz="2800" dirty="0" smtClean="0">
+                <a:latin typeface="Arial" panose="020B0604020202020204" pitchFamily="34" charset="0"/>
+                <a:cs typeface="Arial" panose="020B0604020202020204" pitchFamily="34" charset="0"/>
+                <a:hlinkClick r:id="rId2"/>
+              </a:rPr>
+              <a:t>https://balsamiq.com/</a:t>
+            </a:r>
+            <a:r>
+              <a:rPr lang="en-US" sz="2800" dirty="0" smtClean="0">
+                <a:latin typeface="Arial" panose="020B0604020202020204" pitchFamily="34" charset="0"/>
+                <a:cs typeface="Arial" panose="020B0604020202020204" pitchFamily="34" charset="0"/>
+              </a:rPr>
+              <a:t> </a:t>
+            </a:r>
+          </a:p>
+          <a:p>
+            <a:r>
+              <a:rPr lang="en-US" sz="2800" dirty="0" err="1" smtClean="0">
+                <a:latin typeface="Arial" panose="020B0604020202020204" pitchFamily="34" charset="0"/>
+                <a:cs typeface="Arial" panose="020B0604020202020204" pitchFamily="34" charset="0"/>
+              </a:rPr>
+              <a:t>Framebox</a:t>
+            </a:r>
+            <a:r>
+              <a:rPr lang="en-US" sz="2800" dirty="0" smtClean="0">
+                <a:latin typeface="Arial" panose="020B0604020202020204" pitchFamily="34" charset="0"/>
+                <a:cs typeface="Arial" panose="020B0604020202020204" pitchFamily="34" charset="0"/>
+              </a:rPr>
+              <a:t>: </a:t>
+            </a:r>
+            <a:r>
+              <a:rPr lang="en-US" sz="2800" dirty="0" smtClean="0">
+                <a:latin typeface="Arial" panose="020B0604020202020204" pitchFamily="34" charset="0"/>
+                <a:cs typeface="Arial" panose="020B0604020202020204" pitchFamily="34" charset="0"/>
+                <a:hlinkClick r:id="rId3"/>
+              </a:rPr>
+              <a:t>http://framebox.org/</a:t>
+            </a:r>
+            <a:r>
+              <a:rPr lang="en-US" sz="2800" dirty="0" smtClean="0">
+                <a:latin typeface="Arial" panose="020B0604020202020204" pitchFamily="34" charset="0"/>
+                <a:cs typeface="Arial" panose="020B0604020202020204" pitchFamily="34" charset="0"/>
+              </a:rPr>
+              <a:t> </a:t>
+            </a:r>
+          </a:p>
+          <a:p>
+            <a:r>
+              <a:rPr lang="en-US" sz="2800" dirty="0" smtClean="0">
+                <a:latin typeface="Arial" panose="020B0604020202020204" pitchFamily="34" charset="0"/>
+                <a:cs typeface="Arial" panose="020B0604020202020204" pitchFamily="34" charset="0"/>
+              </a:rPr>
+              <a:t>Pen and Paper: Your notebook</a:t>
+            </a:r>
+          </a:p>
+          <a:p>
+            <a:endParaRPr lang="en-US" b="1" dirty="0">
               <a:latin typeface="Arial" panose="020B0604020202020204" pitchFamily="34" charset="0"/>
-              <a:ea typeface="Roboto" panose="02000000000000000000" pitchFamily="2" charset="0"/>
               <a:cs typeface="Arial" panose="020B0604020202020204" pitchFamily="34" charset="0"/>
             </a:endParaRPr>
           </a:p>
-        </p:txBody>
-      </p:sp>
+          <a:p>
+            <a:pPr marL="0" indent="0">
+              <a:buNone/>
+            </a:pPr>
+            <a:r>
+              <a:rPr lang="en-US" b="1" u="sng" dirty="0" smtClean="0">
+                <a:latin typeface="Arial" panose="020B0604020202020204" pitchFamily="34" charset="0"/>
+                <a:cs typeface="Arial" panose="020B0604020202020204" pitchFamily="34" charset="0"/>
+              </a:rPr>
+              <a:t>Grids for Photoshop / Illustrator:</a:t>
+            </a:r>
+          </a:p>
+          <a:p>
+            <a:r>
+              <a:rPr lang="en-US" sz="2800" dirty="0" smtClean="0">
+                <a:latin typeface="Arial" panose="020B0604020202020204" pitchFamily="34" charset="0"/>
+                <a:cs typeface="Arial" panose="020B0604020202020204" pitchFamily="34" charset="0"/>
+              </a:rPr>
+              <a:t>960 GS: </a:t>
+            </a:r>
+            <a:r>
+              <a:rPr lang="en-US" sz="2800" dirty="0" smtClean="0">
+                <a:latin typeface="Arial" panose="020B0604020202020204" pitchFamily="34" charset="0"/>
+                <a:cs typeface="Arial" panose="020B0604020202020204" pitchFamily="34" charset="0"/>
+                <a:hlinkClick r:id="rId4"/>
+              </a:rPr>
+              <a:t>http://960.gs/</a:t>
+            </a:r>
+            <a:endParaRPr lang="en-US" sz="2800" dirty="0" smtClean="0">
+              <a:latin typeface="Arial" panose="020B0604020202020204" pitchFamily="34" charset="0"/>
+              <a:cs typeface="Arial" panose="020B0604020202020204" pitchFamily="34" charset="0"/>
+            </a:endParaRPr>
+          </a:p>
+          <a:p>
+            <a:r>
+              <a:rPr lang="en-US" sz="2800" dirty="0" err="1" smtClean="0">
+                <a:latin typeface="Arial" panose="020B0604020202020204" pitchFamily="34" charset="0"/>
+                <a:cs typeface="Arial" panose="020B0604020202020204" pitchFamily="34" charset="0"/>
+              </a:rPr>
+              <a:t>GuideGuide</a:t>
+            </a:r>
+            <a:r>
+              <a:rPr lang="en-US" sz="2800" dirty="0" smtClean="0">
+                <a:latin typeface="Arial" panose="020B0604020202020204" pitchFamily="34" charset="0"/>
+                <a:cs typeface="Arial" panose="020B0604020202020204" pitchFamily="34" charset="0"/>
+              </a:rPr>
+              <a:t>: </a:t>
+            </a:r>
+            <a:r>
+              <a:rPr lang="en-US" sz="2800" dirty="0" smtClean="0">
+                <a:latin typeface="Arial" panose="020B0604020202020204" pitchFamily="34" charset="0"/>
+                <a:cs typeface="Arial" panose="020B0604020202020204" pitchFamily="34" charset="0"/>
+                <a:hlinkClick r:id="rId3"/>
+              </a:rPr>
+              <a:t>http://framebox.org/</a:t>
+            </a:r>
+            <a:r>
+              <a:rPr lang="en-US" sz="2800" dirty="0" smtClean="0">
+                <a:latin typeface="Arial" panose="020B0604020202020204" pitchFamily="34" charset="0"/>
+                <a:cs typeface="Arial" panose="020B0604020202020204" pitchFamily="34" charset="0"/>
+              </a:rPr>
+              <a:t> </a:t>
+            </a:r>
+          </a:p>
+          <a:p>
+            <a:endParaRPr lang="en-US" dirty="0">
+              <a:latin typeface="Arial" panose="020B0604020202020204" pitchFamily="34" charset="0"/>
+              <a:cs typeface="Arial" panose="020B0604020202020204" pitchFamily="34" charset="0"/>
+            </a:endParaRPr>
+          </a:p>
+          <a:p>
+            <a:pPr marL="0" indent="0">
+              <a:buNone/>
+            </a:pPr>
+            <a:r>
+              <a:rPr lang="en-US" b="1" u="sng" dirty="0" smtClean="0">
+                <a:latin typeface="Arial" panose="020B0604020202020204" pitchFamily="34" charset="0"/>
+                <a:cs typeface="Arial" panose="020B0604020202020204" pitchFamily="34" charset="0"/>
+              </a:rPr>
+              <a:t>Designing with Grids Guides: </a:t>
+            </a:r>
+          </a:p>
+          <a:p>
+            <a:r>
+              <a:rPr lang="en-US" sz="2400" dirty="0" smtClean="0">
+                <a:latin typeface="Arial" panose="020B0604020202020204" pitchFamily="34" charset="0"/>
+                <a:cs typeface="Arial" panose="020B0604020202020204" pitchFamily="34" charset="0"/>
+              </a:rPr>
+              <a:t>960 Grid System Made Easy: </a:t>
+            </a:r>
+            <a:r>
+              <a:rPr lang="en-US" sz="2400" dirty="0" smtClean="0">
+                <a:latin typeface="Arial" panose="020B0604020202020204" pitchFamily="34" charset="0"/>
+                <a:cs typeface="Arial" panose="020B0604020202020204" pitchFamily="34" charset="0"/>
+                <a:hlinkClick r:id="rId5"/>
+              </a:rPr>
+              <a:t>http://bit.ly/1sjYaFC</a:t>
+            </a:r>
+            <a:r>
+              <a:rPr lang="en-US" sz="2400" dirty="0" smtClean="0">
+                <a:latin typeface="Arial" panose="020B0604020202020204" pitchFamily="34" charset="0"/>
+                <a:cs typeface="Arial" panose="020B0604020202020204" pitchFamily="34" charset="0"/>
+              </a:rPr>
+              <a:t> </a:t>
+            </a:r>
+          </a:p>
+          <a:p>
+            <a:r>
+              <a:rPr lang="en-US" sz="2400" dirty="0" smtClean="0">
+                <a:latin typeface="Arial" panose="020B0604020202020204" pitchFamily="34" charset="0"/>
+                <a:cs typeface="Arial" panose="020B0604020202020204" pitchFamily="34" charset="0"/>
+              </a:rPr>
+              <a:t>Design by Grid: </a:t>
+            </a:r>
+            <a:r>
+              <a:rPr lang="en-US" sz="2400" dirty="0" smtClean="0">
+                <a:latin typeface="Arial" panose="020B0604020202020204" pitchFamily="34" charset="0"/>
+                <a:cs typeface="Arial" panose="020B0604020202020204" pitchFamily="34" charset="0"/>
+                <a:hlinkClick r:id="rId6"/>
+              </a:rPr>
+              <a:t>http://www.designbygrid.com/</a:t>
+            </a:r>
+            <a:endParaRPr lang="en-US" sz="2400" dirty="0" smtClean="0">
+              <a:latin typeface="Arial" panose="020B0604020202020204" pitchFamily="34" charset="0"/>
+              <a:cs typeface="Arial" panose="020B0604020202020204" pitchFamily="34" charset="0"/>
+            </a:endParaRPr>
+          </a:p>
+          <a:p>
+            <a:r>
+              <a:rPr lang="en-US" sz="2400" dirty="0" smtClean="0">
+                <a:latin typeface="Arial" panose="020B0604020202020204" pitchFamily="34" charset="0"/>
+                <a:cs typeface="Arial" panose="020B0604020202020204" pitchFamily="34" charset="0"/>
+              </a:rPr>
+              <a:t>Designing with Grid-Based Approach: </a:t>
+            </a:r>
+            <a:r>
+              <a:rPr lang="en-US" sz="2400" dirty="0" smtClean="0">
+                <a:latin typeface="Arial" panose="020B0604020202020204" pitchFamily="34" charset="0"/>
+                <a:cs typeface="Arial" panose="020B0604020202020204" pitchFamily="34" charset="0"/>
+                <a:hlinkClick r:id="rId7"/>
+              </a:rPr>
+              <a:t>http://bit.ly/1CM4Hzo</a:t>
+            </a:r>
+            <a:r>
+              <a:rPr lang="en-US" sz="2400" dirty="0" smtClean="0">
+                <a:latin typeface="Arial" panose="020B0604020202020204" pitchFamily="34" charset="0"/>
+                <a:cs typeface="Arial" panose="020B0604020202020204" pitchFamily="34" charset="0"/>
+              </a:rPr>
+              <a:t> </a:t>
+            </a:r>
+          </a:p>
+          <a:p>
+            <a:pPr marL="0" indent="0">
+              <a:buNone/>
+            </a:pPr>
+            <a:endParaRPr lang="en-US" dirty="0" smtClean="0">
+              <a:latin typeface="Arial" panose="020B0604020202020204" pitchFamily="34" charset="0"/>
+              <a:cs typeface="Arial" panose="020B0604020202020204" pitchFamily="34" charset="0"/>
+            </a:endParaRPr>
+          </a:p>
+        </p:txBody>
+      </p:sp>
+      <p:pic>
+        <p:nvPicPr>
+          <p:cNvPr id="7" name="Picture 6"/>
+          <p:cNvPicPr>
+            <a:picLocks noChangeAspect="1"/>
+          </p:cNvPicPr>
+          <p:nvPr/>
+        </p:nvPicPr>
+        <p:blipFill>
+          <a:blip r:embed="rId8" cstate="print">
+            <a:extLst>
+              <a:ext uri="{28A0092B-C50C-407E-A947-70E740481C1C}">
+                <a14:useLocalDpi xmlns:a14="http://schemas.microsoft.com/office/drawing/2010/main" val="0"/>
+              </a:ext>
+            </a:extLst>
+          </a:blip>
+          <a:stretch>
+            <a:fillRect/>
+          </a:stretch>
+        </p:blipFill>
+        <p:spPr>
+          <a:xfrm>
+            <a:off x="7238999" y="6294884"/>
+            <a:ext cx="1891145" cy="310951"/>
+          </a:xfrm>
+          <a:prstGeom prst="rect">
+            <a:avLst/>
+          </a:prstGeom>
+        </p:spPr>
+      </p:pic>
+      <p:pic>
+        <p:nvPicPr>
+          <p:cNvPr id="18435" name="Picture 3"/>
+          <p:cNvPicPr>
+            <a:picLocks noChangeAspect="1" noChangeArrowheads="1"/>
+          </p:cNvPicPr>
+          <p:nvPr/>
+        </p:nvPicPr>
+        <p:blipFill>
+          <a:blip r:embed="rId9">
+            <a:extLst>
+              <a:ext uri="{28A0092B-C50C-407E-A947-70E740481C1C}">
+                <a14:useLocalDpi xmlns:a14="http://schemas.microsoft.com/office/drawing/2010/main" val="0"/>
+              </a:ext>
+            </a:extLst>
+          </a:blip>
+          <a:srcRect/>
+          <a:stretch>
+            <a:fillRect/>
+          </a:stretch>
+        </p:blipFill>
+        <p:spPr bwMode="auto">
+          <a:xfrm>
+            <a:off x="6020656" y="1219200"/>
+            <a:ext cx="2666144" cy="3200400"/>
+          </a:xfrm>
+          <a:prstGeom prst="rect">
+            <a:avLst/>
+          </a:prstGeom>
+          <a:noFill/>
+          <a:ln>
+            <a:noFill/>
+          </a:ln>
+          <a:extLst>
+            <a:ext uri="{909E8E84-426E-40DD-AFC4-6F175D3DCCD1}">
+              <a14:hiddenFill xmlns:a14="http://schemas.microsoft.com/office/drawing/2010/main">
+                <a:solidFill>
+                  <a:schemeClr val="accent1"/>
+                </a:solidFill>
+              </a14:hiddenFill>
+            </a:ext>
+            <a:ext uri="{91240B29-F687-4F45-9708-019B960494DF}">
+              <a14:hiddenLine xmlns:a14="http://schemas.microsoft.com/office/drawing/2010/main" w="9525">
+                <a:solidFill>
+                  <a:schemeClr val="tx1"/>
+                </a:solidFill>
+                <a:miter lim="800000"/>
+                <a:headEnd/>
+                <a:tailEnd/>
+              </a14:hiddenLine>
+            </a:ext>
+          </a:extLst>
+        </p:spPr>
+      </p:pic>
     </p:spTree>
     <p:extLst>
       <p:ext uri="{BB962C8B-B14F-4D97-AF65-F5344CB8AC3E}">
-        <p14:creationId xmlns:p14="http://schemas.microsoft.com/office/powerpoint/2010/main" val="2531195373"/>
+        <p14:creationId xmlns:p14="http://schemas.microsoft.com/office/powerpoint/2010/main" val="2921019782"/>
       </p:ext>
     </p:extLst>
   </p:cSld>
@@ -11646,57 +11759,14 @@
       </p:grpSpPr>
       <p:sp>
         <p:nvSpPr>
-          <p:cNvPr id="2" name="Title 1"/>
-          <p:cNvSpPr>
-            <a:spLocks noGrp="1"/>
-          </p:cNvSpPr>
-          <p:nvPr>
-            <p:ph type="title"/>
-          </p:nvPr>
-        </p:nvSpPr>
-        <p:spPr>
-          <a:xfrm>
-            <a:off x="304800" y="122238"/>
-            <a:ext cx="8229600" cy="639762"/>
-          </a:xfrm>
-        </p:spPr>
-        <p:txBody>
-          <a:bodyPr>
-            <a:noAutofit/>
-          </a:bodyPr>
-          <a:lstStyle/>
-          <a:p>
-            <a:pPr algn="l"/>
-            <a:r>
-              <a:rPr lang="en-US" sz="3600" b="1" dirty="0" smtClean="0">
-                <a:solidFill>
-                  <a:schemeClr val="bg1"/>
-                </a:solidFill>
-                <a:latin typeface="Arial" panose="020B0604020202020204" pitchFamily="34" charset="0"/>
-                <a:cs typeface="Arial" panose="020B0604020202020204" pitchFamily="34" charset="0"/>
-              </a:rPr>
-              <a:t>Bootstrap Guide (Link)</a:t>
-            </a:r>
-            <a:endParaRPr lang="en-US" sz="3600" b="1" dirty="0">
-              <a:solidFill>
-                <a:schemeClr val="bg1"/>
-              </a:solidFill>
-              <a:latin typeface="Arial" panose="020B0604020202020204" pitchFamily="34" charset="0"/>
-              <a:cs typeface="Arial" panose="020B0604020202020204" pitchFamily="34" charset="0"/>
-            </a:endParaRPr>
-          </a:p>
-        </p:txBody>
-      </p:sp>
-      <p:sp>
-        <p:nvSpPr>
-          <p:cNvPr id="6" name="Flowchart: Process 5"/>
+          <p:cNvPr id="9" name="Flowchart: Process 8"/>
           <p:cNvSpPr/>
           <p:nvPr/>
         </p:nvSpPr>
         <p:spPr>
           <a:xfrm>
-            <a:off x="-13855" y="838200"/>
-            <a:ext cx="9144000" cy="5791201"/>
+            <a:off x="376381" y="3840481"/>
+            <a:ext cx="8447810" cy="45719"/>
           </a:xfrm>
           <a:prstGeom prst="flowChartProcess">
             <a:avLst/>
@@ -11733,166 +11803,46 @@
           </a:p>
         </p:txBody>
       </p:sp>
-      <p:pic>
-        <p:nvPicPr>
-          <p:cNvPr id="7" name="Picture 6"/>
-          <p:cNvPicPr>
-            <a:picLocks noChangeAspect="1"/>
-          </p:cNvPicPr>
-          <p:nvPr/>
-        </p:nvPicPr>
-        <p:blipFill>
-          <a:blip r:embed="rId2" cstate="print">
-            <a:extLst>
-              <a:ext uri="{28A0092B-C50C-407E-A947-70E740481C1C}">
-                <a14:useLocalDpi xmlns:a14="http://schemas.microsoft.com/office/drawing/2010/main" val="0"/>
-              </a:ext>
-            </a:extLst>
-          </a:blip>
-          <a:stretch>
-            <a:fillRect/>
-          </a:stretch>
-        </p:blipFill>
-        <p:spPr>
-          <a:xfrm>
-            <a:off x="7238999" y="6294884"/>
-            <a:ext cx="1891145" cy="310951"/>
-          </a:xfrm>
-          <a:prstGeom prst="rect">
-            <a:avLst/>
-          </a:prstGeom>
-        </p:spPr>
-      </p:pic>
-      <p:pic>
-        <p:nvPicPr>
-          <p:cNvPr id="21506" name="Picture 2" descr="http://speckycdn.sdm.netdna-cdn.com/wp-content/uploads/2011/05/wireframe-sketch-07.jpg"/>
-          <p:cNvPicPr>
-            <a:picLocks noChangeAspect="1" noChangeArrowheads="1"/>
-          </p:cNvPicPr>
-          <p:nvPr/>
-        </p:nvPicPr>
-        <p:blipFill>
-          <a:blip r:embed="rId3">
-            <a:extLst>
-              <a:ext uri="{28A0092B-C50C-407E-A947-70E740481C1C}">
-                <a14:useLocalDpi xmlns:a14="http://schemas.microsoft.com/office/drawing/2010/main" val="0"/>
-              </a:ext>
-            </a:extLst>
-          </a:blip>
-          <a:srcRect/>
-          <a:stretch>
-            <a:fillRect/>
-          </a:stretch>
-        </p:blipFill>
-        <p:spPr bwMode="auto">
-          <a:xfrm>
-            <a:off x="5087513" y="1905000"/>
-            <a:ext cx="3897813" cy="3276600"/>
-          </a:xfrm>
-          <a:prstGeom prst="rect">
-            <a:avLst/>
-          </a:prstGeom>
-          <a:noFill/>
-          <a:extLst>
-            <a:ext uri="{909E8E84-426E-40DD-AFC4-6F175D3DCCD1}">
-              <a14:hiddenFill xmlns:a14="http://schemas.microsoft.com/office/drawing/2010/main">
-                <a:solidFill>
-                  <a:srgbClr val="FFFFFF"/>
-                </a:solidFill>
-              </a14:hiddenFill>
-            </a:ext>
-          </a:extLst>
-        </p:spPr>
-      </p:pic>
-      <p:sp>
-        <p:nvSpPr>
-          <p:cNvPr id="9" name="Content Placeholder 2"/>
+      <p:sp>
+        <p:nvSpPr>
+          <p:cNvPr id="5" name="Title 1"/>
           <p:cNvSpPr>
             <a:spLocks noGrp="1"/>
           </p:cNvSpPr>
           <p:nvPr>
-            <p:ph idx="1"/>
+            <p:ph type="ctrTitle"/>
           </p:nvPr>
         </p:nvSpPr>
         <p:spPr>
           <a:xfrm>
-            <a:off x="457200" y="1295400"/>
-            <a:ext cx="4495800" cy="4525963"/>
+            <a:off x="322695" y="2376249"/>
+            <a:ext cx="8610600" cy="1464232"/>
           </a:xfrm>
         </p:spPr>
         <p:txBody>
           <a:bodyPr>
-            <a:normAutofit fontScale="92500"/>
+            <a:normAutofit/>
           </a:bodyPr>
           <a:lstStyle/>
           <a:p>
-            <a:r>
-              <a:rPr lang="en-US" sz="2400" dirty="0" smtClean="0">
-                <a:latin typeface="Arial" panose="020B0604020202020204" pitchFamily="34" charset="0"/>
-                <a:cs typeface="Arial" panose="020B0604020202020204" pitchFamily="34" charset="0"/>
-              </a:rPr>
-              <a:t>Because every aspect of a site’s “look” is defined by HTML/CSS – it is crucial to have a detailed sketch going in.</a:t>
-            </a:r>
-          </a:p>
-          <a:p>
-            <a:endParaRPr lang="en-US" sz="2400" dirty="0">
+            <a:pPr algn="l"/>
+            <a:r>
+              <a:rPr lang="en-US" sz="6000" b="1" i="1" dirty="0" smtClean="0">
+                <a:solidFill>
+                  <a:schemeClr val="bg1"/>
+                </a:solidFill>
+                <a:latin typeface="Arial" panose="020B0604020202020204" pitchFamily="34" charset="0"/>
+                <a:ea typeface="Roboto" panose="02000000000000000000" pitchFamily="2" charset="0"/>
+                <a:cs typeface="Arial" panose="020B0604020202020204" pitchFamily="34" charset="0"/>
+              </a:rPr>
+              <a:t>Key Bootstrap Parts</a:t>
+            </a:r>
+            <a:endParaRPr lang="en-US" sz="6000" b="1" i="1" dirty="0">
+              <a:solidFill>
+                <a:schemeClr val="bg1"/>
+              </a:solidFill>
               <a:latin typeface="Arial" panose="020B0604020202020204" pitchFamily="34" charset="0"/>
-              <a:cs typeface="Arial" panose="020B0604020202020204" pitchFamily="34" charset="0"/>
-            </a:endParaRPr>
-          </a:p>
-          <a:p>
-            <a:r>
-              <a:rPr lang="en-US" sz="2400" dirty="0" smtClean="0">
-                <a:latin typeface="Arial" panose="020B0604020202020204" pitchFamily="34" charset="0"/>
-                <a:cs typeface="Arial" panose="020B0604020202020204" pitchFamily="34" charset="0"/>
-              </a:rPr>
-              <a:t>Pay particular attention to the location of navigation bars, titles, headers, content, images, footers etc. </a:t>
-            </a:r>
-          </a:p>
-          <a:p>
-            <a:endParaRPr lang="en-US" sz="2400" dirty="0">
-              <a:latin typeface="Arial" panose="020B0604020202020204" pitchFamily="34" charset="0"/>
-              <a:cs typeface="Arial" panose="020B0604020202020204" pitchFamily="34" charset="0"/>
-            </a:endParaRPr>
-          </a:p>
-          <a:p>
-            <a:r>
-              <a:rPr lang="en-US" sz="2400" dirty="0" smtClean="0">
-                <a:latin typeface="Arial" panose="020B0604020202020204" pitchFamily="34" charset="0"/>
-                <a:cs typeface="Arial" panose="020B0604020202020204" pitchFamily="34" charset="0"/>
-              </a:rPr>
-              <a:t>When imagining alignments, in particular, be mindful of the </a:t>
-            </a:r>
-            <a:r>
-              <a:rPr lang="en-US" sz="2400" b="1" i="1" u="sng" dirty="0" smtClean="0">
-                <a:latin typeface="Arial" panose="020B0604020202020204" pitchFamily="34" charset="0"/>
-                <a:cs typeface="Arial" panose="020B0604020202020204" pitchFamily="34" charset="0"/>
-              </a:rPr>
-              <a:t>grid</a:t>
-            </a:r>
-            <a:r>
-              <a:rPr lang="en-US" sz="2400" i="1" dirty="0" smtClean="0">
-                <a:latin typeface="Arial" panose="020B0604020202020204" pitchFamily="34" charset="0"/>
-                <a:cs typeface="Arial" panose="020B0604020202020204" pitchFamily="34" charset="0"/>
-              </a:rPr>
-              <a:t> </a:t>
-            </a:r>
-          </a:p>
-          <a:p>
-            <a:pPr marL="0" indent="0">
-              <a:buNone/>
-            </a:pPr>
-            <a:endParaRPr lang="en-US" sz="2400" dirty="0">
-              <a:latin typeface="Arial" panose="020B0604020202020204" pitchFamily="34" charset="0"/>
-              <a:cs typeface="Arial" panose="020B0604020202020204" pitchFamily="34" charset="0"/>
-            </a:endParaRPr>
-          </a:p>
-          <a:p>
-            <a:pPr marL="0" indent="0">
-              <a:buNone/>
-            </a:pPr>
-            <a:endParaRPr lang="en-US" sz="2400" dirty="0" smtClean="0">
-              <a:latin typeface="Arial" panose="020B0604020202020204" pitchFamily="34" charset="0"/>
+              <a:ea typeface="Roboto" panose="02000000000000000000" pitchFamily="2" charset="0"/>
               <a:cs typeface="Arial" panose="020B0604020202020204" pitchFamily="34" charset="0"/>
             </a:endParaRPr>
           </a:p>
@@ -11901,7 +11851,7 @@
     </p:spTree>
     <p:extLst>
       <p:ext uri="{BB962C8B-B14F-4D97-AF65-F5344CB8AC3E}">
-        <p14:creationId xmlns:p14="http://schemas.microsoft.com/office/powerpoint/2010/main" val="3741631702"/>
+        <p14:creationId xmlns:p14="http://schemas.microsoft.com/office/powerpoint/2010/main" val="2531195373"/>
       </p:ext>
     </p:extLst>
   </p:cSld>
@@ -11966,7 +11916,17 @@
                 <a:latin typeface="Arial" panose="020B0604020202020204" pitchFamily="34" charset="0"/>
                 <a:cs typeface="Arial" panose="020B0604020202020204" pitchFamily="34" charset="0"/>
               </a:rPr>
-              <a:t>Bootstrap Grid System</a:t>
+              <a:t>Bootstrap </a:t>
+            </a:r>
+            <a:r>
+              <a:rPr lang="en-US" sz="3600" b="1" dirty="0" smtClean="0">
+                <a:solidFill>
+                  <a:schemeClr val="bg1"/>
+                </a:solidFill>
+                <a:latin typeface="Arial" panose="020B0604020202020204" pitchFamily="34" charset="0"/>
+                <a:cs typeface="Arial" panose="020B0604020202020204" pitchFamily="34" charset="0"/>
+              </a:rPr>
+              <a:t>Guide</a:t>
             </a:r>
             <a:endParaRPr lang="en-US" sz="3600" b="1" dirty="0">
               <a:solidFill>
@@ -12056,7 +12016,7 @@
       </p:pic>
       <p:pic>
         <p:nvPicPr>
-          <p:cNvPr id="21506" name="Picture 2" descr="http://speckycdn.sdm.netdna-cdn.com/wp-content/uploads/2011/05/wireframe-sketch-07.jpg"/>
+          <p:cNvPr id="5122" name="Picture 2"/>
           <p:cNvPicPr>
             <a:picLocks noChangeAspect="1" noChangeArrowheads="1"/>
           </p:cNvPicPr>
@@ -12077,27 +12037,40 @@
         </p:blipFill>
         <p:spPr bwMode="auto">
           <a:xfrm>
-            <a:off x="5087513" y="1905000"/>
-            <a:ext cx="3897813" cy="3276600"/>
+            <a:off x="1307523" y="949194"/>
+            <a:ext cx="6501244" cy="4156206"/>
           </a:xfrm>
           <a:prstGeom prst="rect">
             <a:avLst/>
           </a:prstGeom>
           <a:noFill/>
+          <a:ln>
+            <a:noFill/>
+          </a:ln>
           <a:extLst>
             <a:ext uri="{909E8E84-426E-40DD-AFC4-6F175D3DCCD1}">
               <a14:hiddenFill xmlns:a14="http://schemas.microsoft.com/office/drawing/2010/main">
                 <a:solidFill>
-                  <a:srgbClr val="FFFFFF"/>
+                  <a:schemeClr val="accent1"/>
                 </a:solidFill>
               </a14:hiddenFill>
             </a:ext>
+            <a:ext uri="{91240B29-F687-4F45-9708-019B960494DF}">
+              <a14:hiddenLine xmlns:a14="http://schemas.microsoft.com/office/drawing/2010/main" w="9525">
+                <a:solidFill>
+                  <a:schemeClr val="tx1"/>
+                </a:solidFill>
+                <a:miter lim="800000"/>
+                <a:headEnd/>
+                <a:tailEnd/>
+              </a14:hiddenLine>
+            </a:ext>
           </a:extLst>
         </p:spPr>
       </p:pic>
       <p:sp>
         <p:nvSpPr>
-          <p:cNvPr id="9" name="Content Placeholder 2"/>
+          <p:cNvPr id="10" name="Content Placeholder 2"/>
           <p:cNvSpPr>
             <a:spLocks noGrp="1"/>
           </p:cNvSpPr>
@@ -12107,92 +12080,34 @@
         </p:nvSpPr>
         <p:spPr>
           <a:xfrm>
-            <a:off x="457200" y="1295400"/>
-            <a:ext cx="4495800" cy="4525963"/>
+            <a:off x="367145" y="5334000"/>
+            <a:ext cx="8382000" cy="2087563"/>
           </a:xfrm>
         </p:spPr>
         <p:txBody>
           <a:bodyPr>
-            <a:normAutofit fontScale="92500"/>
+            <a:noAutofit/>
           </a:bodyPr>
           <a:lstStyle/>
           <a:p>
             <a:r>
-              <a:rPr lang="en-US" sz="2400" dirty="0" smtClean="0">
-                <a:latin typeface="Arial" panose="020B0604020202020204" pitchFamily="34" charset="0"/>
-                <a:cs typeface="Arial" panose="020B0604020202020204" pitchFamily="34" charset="0"/>
-              </a:rPr>
-              <a:t>Because every aspect of a site’s “look” is defined by HTML/CSS – it is crucial to have a detailed sketch going in.</a:t>
-            </a:r>
-          </a:p>
-          <a:p>
-            <a:endParaRPr lang="en-US" sz="2400" dirty="0">
+              <a:rPr lang="en-US" sz="2000" dirty="0" smtClean="0">
+                <a:latin typeface="Arial" panose="020B0604020202020204" pitchFamily="34" charset="0"/>
+                <a:cs typeface="Arial" panose="020B0604020202020204" pitchFamily="34" charset="0"/>
+              </a:rPr>
+              <a:t>Bootstrap offers a wide range of components for inclusion in your next web project. Best way to use them is to simply flip through the documentation and incorporate elements as necessary. </a:t>
+            </a:r>
+            <a:endParaRPr lang="en-US" sz="2000" dirty="0" smtClean="0">
               <a:latin typeface="Arial" panose="020B0604020202020204" pitchFamily="34" charset="0"/>
               <a:cs typeface="Arial" panose="020B0604020202020204" pitchFamily="34" charset="0"/>
             </a:endParaRPr>
           </a:p>
-          <a:p>
-            <a:r>
-              <a:rPr lang="en-US" sz="2400" dirty="0" smtClean="0">
-                <a:latin typeface="Arial" panose="020B0604020202020204" pitchFamily="34" charset="0"/>
-                <a:cs typeface="Arial" panose="020B0604020202020204" pitchFamily="34" charset="0"/>
-              </a:rPr>
-              <a:t>Pay particular attention to the location of navigation bars, titles, headers, content, images, footers etc. </a:t>
-            </a:r>
-          </a:p>
-          <a:p>
-            <a:endParaRPr lang="en-US" sz="2400" dirty="0">
-              <a:latin typeface="Arial" panose="020B0604020202020204" pitchFamily="34" charset="0"/>
-              <a:cs typeface="Arial" panose="020B0604020202020204" pitchFamily="34" charset="0"/>
-            </a:endParaRPr>
-          </a:p>
-          <a:p>
-            <a:r>
-              <a:rPr lang="en-US" sz="2400" dirty="0" smtClean="0">
-                <a:latin typeface="Arial" panose="020B0604020202020204" pitchFamily="34" charset="0"/>
-                <a:cs typeface="Arial" panose="020B0604020202020204" pitchFamily="34" charset="0"/>
-              </a:rPr>
-              <a:t>When imagining alignments, in particular, be mindful of the </a:t>
-            </a:r>
-            <a:r>
-              <a:rPr lang="en-US" sz="2400" b="1" i="1" u="sng" dirty="0" smtClean="0">
-                <a:latin typeface="Arial" panose="020B0604020202020204" pitchFamily="34" charset="0"/>
-                <a:cs typeface="Arial" panose="020B0604020202020204" pitchFamily="34" charset="0"/>
-              </a:rPr>
-              <a:t>grid</a:t>
-            </a:r>
-            <a:r>
-              <a:rPr lang="en-US" sz="2400" i="1" dirty="0" smtClean="0">
-                <a:latin typeface="Arial" panose="020B0604020202020204" pitchFamily="34" charset="0"/>
-                <a:cs typeface="Arial" panose="020B0604020202020204" pitchFamily="34" charset="0"/>
-              </a:rPr>
-              <a:t> </a:t>
-            </a:r>
-          </a:p>
-          <a:p>
-            <a:pPr marL="0" indent="0">
-              <a:buNone/>
-            </a:pPr>
-            <a:endParaRPr lang="en-US" sz="2400" dirty="0">
-              <a:latin typeface="Arial" panose="020B0604020202020204" pitchFamily="34" charset="0"/>
-              <a:cs typeface="Arial" panose="020B0604020202020204" pitchFamily="34" charset="0"/>
-            </a:endParaRPr>
-          </a:p>
-          <a:p>
-            <a:pPr marL="0" indent="0">
-              <a:buNone/>
-            </a:pPr>
-            <a:endParaRPr lang="en-US" sz="2400" dirty="0" smtClean="0">
-              <a:latin typeface="Arial" panose="020B0604020202020204" pitchFamily="34" charset="0"/>
-              <a:cs typeface="Arial" panose="020B0604020202020204" pitchFamily="34" charset="0"/>
-            </a:endParaRPr>
-          </a:p>
         </p:txBody>
       </p:sp>
     </p:spTree>
     <p:extLst>
       <p:ext uri="{BB962C8B-B14F-4D97-AF65-F5344CB8AC3E}">
-        <p14:creationId xmlns:p14="http://schemas.microsoft.com/office/powerpoint/2010/main" val="3042202240"/>
+        <p14:creationId xmlns:p14="http://schemas.microsoft.com/office/powerpoint/2010/main" val="3741631702"/>
       </p:ext>
     </p:extLst>
   </p:cSld>
@@ -12257,7 +12172,7 @@
                 <a:latin typeface="Arial" panose="020B0604020202020204" pitchFamily="34" charset="0"/>
                 <a:cs typeface="Arial" panose="020B0604020202020204" pitchFamily="34" charset="0"/>
               </a:rPr>
-              <a:t>Bootstrap Typography</a:t>
+              <a:t>Incorporating Bootstrap</a:t>
             </a:r>
             <a:endParaRPr lang="en-US" sz="3600" b="1" dirty="0">
               <a:solidFill>
@@ -12345,9 +12260,168 @@
           </a:prstGeom>
         </p:spPr>
       </p:pic>
+      <p:sp>
+        <p:nvSpPr>
+          <p:cNvPr id="10" name="Content Placeholder 2"/>
+          <p:cNvSpPr>
+            <a:spLocks noGrp="1"/>
+          </p:cNvSpPr>
+          <p:nvPr>
+            <p:ph idx="1"/>
+          </p:nvPr>
+        </p:nvSpPr>
+        <p:spPr>
+          <a:xfrm>
+            <a:off x="367145" y="3352800"/>
+            <a:ext cx="8382000" cy="2087563"/>
+          </a:xfrm>
+        </p:spPr>
+        <p:txBody>
+          <a:bodyPr>
+            <a:noAutofit/>
+          </a:bodyPr>
+          <a:lstStyle/>
+          <a:p>
+            <a:pPr marL="0" indent="0">
+              <a:buNone/>
+            </a:pPr>
+            <a:r>
+              <a:rPr lang="en-US" sz="2000" dirty="0" smtClean="0">
+                <a:latin typeface="Arial" panose="020B0604020202020204" pitchFamily="34" charset="0"/>
+                <a:cs typeface="Arial" panose="020B0604020202020204" pitchFamily="34" charset="0"/>
+              </a:rPr>
+              <a:t>To </a:t>
+            </a:r>
+            <a:r>
+              <a:rPr lang="en-US" sz="2000" dirty="0" smtClean="0">
+                <a:latin typeface="Arial" panose="020B0604020202020204" pitchFamily="34" charset="0"/>
+                <a:cs typeface="Arial" panose="020B0604020202020204" pitchFamily="34" charset="0"/>
+              </a:rPr>
+              <a:t>add Bootstrap styling to your web project simply incorporate the CDN reference in the header section of your HTML.</a:t>
+            </a:r>
+          </a:p>
+          <a:p>
+            <a:endParaRPr lang="en-US" sz="2000" dirty="0">
+              <a:latin typeface="Arial" panose="020B0604020202020204" pitchFamily="34" charset="0"/>
+              <a:cs typeface="Arial" panose="020B0604020202020204" pitchFamily="34" charset="0"/>
+            </a:endParaRPr>
+          </a:p>
+          <a:p>
+            <a:pPr marL="0" indent="0">
+              <a:buNone/>
+            </a:pPr>
+            <a:r>
+              <a:rPr lang="en-US" sz="2000" b="1" dirty="0" smtClean="0">
+                <a:latin typeface="Arial" panose="020B0604020202020204" pitchFamily="34" charset="0"/>
+                <a:cs typeface="Arial" panose="020B0604020202020204" pitchFamily="34" charset="0"/>
+              </a:rPr>
+              <a:t>Example:</a:t>
+            </a:r>
+          </a:p>
+          <a:p>
+            <a:pPr marL="0" indent="0">
+              <a:buNone/>
+            </a:pPr>
+            <a:r>
+              <a:rPr lang="en-US" sz="1800" dirty="0" smtClean="0">
+                <a:latin typeface="Arial" panose="020B0604020202020204" pitchFamily="34" charset="0"/>
+                <a:cs typeface="Arial" panose="020B0604020202020204" pitchFamily="34" charset="0"/>
+              </a:rPr>
+              <a:t>&lt;</a:t>
+            </a:r>
+            <a:r>
+              <a:rPr lang="en-US" sz="1800" dirty="0">
+                <a:latin typeface="Arial" panose="020B0604020202020204" pitchFamily="34" charset="0"/>
+                <a:cs typeface="Arial" panose="020B0604020202020204" pitchFamily="34" charset="0"/>
+              </a:rPr>
+              <a:t>link</a:t>
+            </a:r>
+            <a:r>
+              <a:rPr lang="en-US" sz="1800" dirty="0">
+                <a:latin typeface="Arial" panose="020B0604020202020204" pitchFamily="34" charset="0"/>
+                <a:cs typeface="Arial" panose="020B0604020202020204" pitchFamily="34" charset="0"/>
+              </a:rPr>
+              <a:t> </a:t>
+            </a:r>
+            <a:r>
+              <a:rPr lang="en-US" sz="1800" dirty="0" err="1">
+                <a:latin typeface="Arial" panose="020B0604020202020204" pitchFamily="34" charset="0"/>
+                <a:cs typeface="Arial" panose="020B0604020202020204" pitchFamily="34" charset="0"/>
+              </a:rPr>
+              <a:t>rel</a:t>
+            </a:r>
+            <a:r>
+              <a:rPr lang="en-US" sz="1800" dirty="0">
+                <a:latin typeface="Arial" panose="020B0604020202020204" pitchFamily="34" charset="0"/>
+                <a:cs typeface="Arial" panose="020B0604020202020204" pitchFamily="34" charset="0"/>
+              </a:rPr>
+              <a:t>="</a:t>
+            </a:r>
+            <a:r>
+              <a:rPr lang="en-US" sz="1800" dirty="0" smtClean="0">
+                <a:latin typeface="Arial" panose="020B0604020202020204" pitchFamily="34" charset="0"/>
+                <a:cs typeface="Arial" panose="020B0604020202020204" pitchFamily="34" charset="0"/>
+              </a:rPr>
+              <a:t>stylesheet“ </a:t>
+            </a:r>
+            <a:r>
+              <a:rPr lang="en-US" sz="1800" dirty="0" err="1" smtClean="0">
+                <a:latin typeface="Arial" panose="020B0604020202020204" pitchFamily="34" charset="0"/>
+                <a:cs typeface="Arial" panose="020B0604020202020204" pitchFamily="34" charset="0"/>
+              </a:rPr>
+              <a:t>href</a:t>
+            </a:r>
+            <a:r>
+              <a:rPr lang="en-US" sz="1800" dirty="0">
+                <a:latin typeface="Arial" panose="020B0604020202020204" pitchFamily="34" charset="0"/>
+                <a:cs typeface="Arial" panose="020B0604020202020204" pitchFamily="34" charset="0"/>
+              </a:rPr>
+              <a:t>="https://</a:t>
+            </a:r>
+            <a:r>
+              <a:rPr lang="en-US" sz="1800" dirty="0" smtClean="0">
+                <a:latin typeface="Arial" panose="020B0604020202020204" pitchFamily="34" charset="0"/>
+                <a:cs typeface="Arial" panose="020B0604020202020204" pitchFamily="34" charset="0"/>
+              </a:rPr>
+              <a:t>maxcdn.bootstrapcdn.com/bootstrap/3.3.2/</a:t>
+            </a:r>
+            <a:r>
+              <a:rPr lang="en-US" sz="1800" dirty="0" err="1" smtClean="0">
+                <a:latin typeface="Arial" panose="020B0604020202020204" pitchFamily="34" charset="0"/>
+                <a:cs typeface="Arial" panose="020B0604020202020204" pitchFamily="34" charset="0"/>
+              </a:rPr>
+              <a:t>css</a:t>
+            </a:r>
+            <a:r>
+              <a:rPr lang="en-US" sz="1800" dirty="0" smtClean="0">
+                <a:latin typeface="Arial" panose="020B0604020202020204" pitchFamily="34" charset="0"/>
+                <a:cs typeface="Arial" panose="020B0604020202020204" pitchFamily="34" charset="0"/>
+              </a:rPr>
+              <a:t>/bootstrap.min.css "&gt; </a:t>
+            </a:r>
+            <a:r>
+              <a:rPr lang="en-US" sz="1800" dirty="0">
+                <a:latin typeface="Arial" panose="020B0604020202020204" pitchFamily="34" charset="0"/>
+                <a:cs typeface="Arial" panose="020B0604020202020204" pitchFamily="34" charset="0"/>
+              </a:rPr>
+              <a:t/>
+            </a:r>
+            <a:br>
+              <a:rPr lang="en-US" sz="1800" dirty="0">
+                <a:latin typeface="Arial" panose="020B0604020202020204" pitchFamily="34" charset="0"/>
+                <a:cs typeface="Arial" panose="020B0604020202020204" pitchFamily="34" charset="0"/>
+              </a:rPr>
+            </a:br>
+            <a:endParaRPr lang="en-US" sz="1800" b="1" dirty="0" smtClean="0">
+              <a:latin typeface="Arial" panose="020B0604020202020204" pitchFamily="34" charset="0"/>
+              <a:cs typeface="Arial" panose="020B0604020202020204" pitchFamily="34" charset="0"/>
+            </a:endParaRPr>
+          </a:p>
+        </p:txBody>
+      </p:sp>
       <p:pic>
         <p:nvPicPr>
-          <p:cNvPr id="21506" name="Picture 2" descr="http://speckycdn.sdm.netdna-cdn.com/wp-content/uploads/2011/05/wireframe-sketch-07.jpg"/>
+          <p:cNvPr id="9219" name="Picture 3"/>
           <p:cNvPicPr>
             <a:picLocks noChangeAspect="1" noChangeArrowheads="1"/>
           </p:cNvPicPr>
@@ -12368,122 +12442,41 @@
         </p:blipFill>
         <p:spPr bwMode="auto">
           <a:xfrm>
-            <a:off x="5087513" y="1905000"/>
-            <a:ext cx="3897813" cy="3276600"/>
+            <a:off x="0" y="1524000"/>
+            <a:ext cx="9130144" cy="1438275"/>
           </a:xfrm>
           <a:prstGeom prst="rect">
             <a:avLst/>
           </a:prstGeom>
           <a:noFill/>
+          <a:ln>
+            <a:noFill/>
+          </a:ln>
           <a:extLst>
             <a:ext uri="{909E8E84-426E-40DD-AFC4-6F175D3DCCD1}">
               <a14:hiddenFill xmlns:a14="http://schemas.microsoft.com/office/drawing/2010/main">
                 <a:solidFill>
-                  <a:srgbClr val="FFFFFF"/>
+                  <a:schemeClr val="accent1"/>
                 </a:solidFill>
               </a14:hiddenFill>
             </a:ext>
+            <a:ext uri="{91240B29-F687-4F45-9708-019B960494DF}">
+              <a14:hiddenLine xmlns:a14="http://schemas.microsoft.com/office/drawing/2010/main" w="9525">
+                <a:solidFill>
+                  <a:schemeClr val="tx1"/>
+                </a:solidFill>
+                <a:miter lim="800000"/>
+                <a:headEnd/>
+                <a:tailEnd/>
+              </a14:hiddenLine>
+            </a:ext>
           </a:extLst>
         </p:spPr>
       </p:pic>
-      <p:sp>
-        <p:nvSpPr>
-          <p:cNvPr id="9" name="Content Placeholder 2"/>
-          <p:cNvSpPr>
-            <a:spLocks noGrp="1"/>
-          </p:cNvSpPr>
-          <p:nvPr>
-            <p:ph idx="1"/>
-          </p:nvPr>
-        </p:nvSpPr>
-        <p:spPr>
-          <a:xfrm>
-            <a:off x="457200" y="1295400"/>
-            <a:ext cx="4495800" cy="4525963"/>
-          </a:xfrm>
-        </p:spPr>
-        <p:txBody>
-          <a:bodyPr>
-            <a:normAutofit fontScale="92500"/>
-          </a:bodyPr>
-          <a:lstStyle/>
-          <a:p>
-            <a:r>
-              <a:rPr lang="en-US" sz="2400" dirty="0" smtClean="0">
-                <a:latin typeface="Arial" panose="020B0604020202020204" pitchFamily="34" charset="0"/>
-                <a:cs typeface="Arial" panose="020B0604020202020204" pitchFamily="34" charset="0"/>
-              </a:rPr>
-              <a:t>Because every aspect of a site’s “look” is defined by HTML/CSS – it is crucial to have a detailed sketch going in.</a:t>
-            </a:r>
-          </a:p>
-          <a:p>
-            <a:endParaRPr lang="en-US" sz="2400" dirty="0">
-              <a:latin typeface="Arial" panose="020B0604020202020204" pitchFamily="34" charset="0"/>
-              <a:cs typeface="Arial" panose="020B0604020202020204" pitchFamily="34" charset="0"/>
-            </a:endParaRPr>
-          </a:p>
-          <a:p>
-            <a:r>
-              <a:rPr lang="en-US" sz="2400" dirty="0" smtClean="0">
-                <a:latin typeface="Arial" panose="020B0604020202020204" pitchFamily="34" charset="0"/>
-                <a:cs typeface="Arial" panose="020B0604020202020204" pitchFamily="34" charset="0"/>
-              </a:rPr>
-              <a:t>Pay particular attention to the location of navigation bars, titles, headers, content, images, footers etc. </a:t>
-            </a:r>
-          </a:p>
-          <a:p>
-            <a:endParaRPr lang="en-US" sz="2400" dirty="0">
-              <a:latin typeface="Arial" panose="020B0604020202020204" pitchFamily="34" charset="0"/>
-              <a:cs typeface="Arial" panose="020B0604020202020204" pitchFamily="34" charset="0"/>
-            </a:endParaRPr>
-          </a:p>
-          <a:p>
-            <a:r>
-              <a:rPr lang="en-US" sz="2400" dirty="0" smtClean="0">
-                <a:latin typeface="Arial" panose="020B0604020202020204" pitchFamily="34" charset="0"/>
-                <a:cs typeface="Arial" panose="020B0604020202020204" pitchFamily="34" charset="0"/>
-              </a:rPr>
-              <a:t>When imagining alignments, in particular, be mindful of the </a:t>
-            </a:r>
-            <a:r>
-              <a:rPr lang="en-US" sz="2400" b="1" i="1" u="sng" dirty="0" smtClean="0">
-                <a:latin typeface="Arial" panose="020B0604020202020204" pitchFamily="34" charset="0"/>
-                <a:cs typeface="Arial" panose="020B0604020202020204" pitchFamily="34" charset="0"/>
-              </a:rPr>
-              <a:t>grid</a:t>
-            </a:r>
-            <a:r>
-              <a:rPr lang="en-US" sz="2400" i="1" dirty="0" smtClean="0">
-                <a:latin typeface="Arial" panose="020B0604020202020204" pitchFamily="34" charset="0"/>
-                <a:cs typeface="Arial" panose="020B0604020202020204" pitchFamily="34" charset="0"/>
-              </a:rPr>
-              <a:t> </a:t>
-            </a:r>
-          </a:p>
-          <a:p>
-            <a:pPr marL="0" indent="0">
-              <a:buNone/>
-            </a:pPr>
-            <a:endParaRPr lang="en-US" sz="2400" dirty="0">
-              <a:latin typeface="Arial" panose="020B0604020202020204" pitchFamily="34" charset="0"/>
-              <a:cs typeface="Arial" panose="020B0604020202020204" pitchFamily="34" charset="0"/>
-            </a:endParaRPr>
-          </a:p>
-          <a:p>
-            <a:pPr marL="0" indent="0">
-              <a:buNone/>
-            </a:pPr>
-            <a:endParaRPr lang="en-US" sz="2400" dirty="0" smtClean="0">
-              <a:latin typeface="Arial" panose="020B0604020202020204" pitchFamily="34" charset="0"/>
-              <a:cs typeface="Arial" panose="020B0604020202020204" pitchFamily="34" charset="0"/>
-            </a:endParaRPr>
-          </a:p>
-        </p:txBody>
-      </p:sp>
     </p:spTree>
     <p:extLst>
       <p:ext uri="{BB962C8B-B14F-4D97-AF65-F5344CB8AC3E}">
-        <p14:creationId xmlns:p14="http://schemas.microsoft.com/office/powerpoint/2010/main" val="3715416107"/>
+        <p14:creationId xmlns:p14="http://schemas.microsoft.com/office/powerpoint/2010/main" val="1698708661"/>
       </p:ext>
     </p:extLst>
   </p:cSld>
@@ -12548,7 +12541,7 @@
                 <a:latin typeface="Arial" panose="020B0604020202020204" pitchFamily="34" charset="0"/>
                 <a:cs typeface="Arial" panose="020B0604020202020204" pitchFamily="34" charset="0"/>
               </a:rPr>
-              <a:t>Bootstrap Buttons</a:t>
+              <a:t>Bootstrap Grid System</a:t>
             </a:r>
             <a:endParaRPr lang="en-US" sz="3600" b="1" dirty="0">
               <a:solidFill>
@@ -12638,7 +12631,7 @@
       </p:pic>
       <p:pic>
         <p:nvPicPr>
-          <p:cNvPr id="21506" name="Picture 2" descr="http://speckycdn.sdm.netdna-cdn.com/wp-content/uploads/2011/05/wireframe-sketch-07.jpg"/>
+          <p:cNvPr id="8" name="Picture 2" descr="http://dab1nmslvvntp.cloudfront.net/wp-content/uploads/2013/05/960-12-col-grid.jpg"/>
           <p:cNvPicPr>
             <a:picLocks noChangeAspect="1" noChangeArrowheads="1"/>
           </p:cNvPicPr>
@@ -12659,8 +12652,8 @@
         </p:blipFill>
         <p:spPr bwMode="auto">
           <a:xfrm>
-            <a:off x="5087513" y="1905000"/>
-            <a:ext cx="3897813" cy="3276600"/>
+            <a:off x="152400" y="1150257"/>
+            <a:ext cx="5395685" cy="4940424"/>
           </a:xfrm>
           <a:prstGeom prst="rect">
             <a:avLst/>
@@ -12679,7 +12672,7 @@
       </p:pic>
       <p:sp>
         <p:nvSpPr>
-          <p:cNvPr id="9" name="Content Placeholder 2"/>
+          <p:cNvPr id="10" name="Content Placeholder 2"/>
           <p:cNvSpPr>
             <a:spLocks noGrp="1"/>
           </p:cNvSpPr>
@@ -12689,73 +12682,107 @@
         </p:nvSpPr>
         <p:spPr>
           <a:xfrm>
-            <a:off x="457200" y="1295400"/>
-            <a:ext cx="4495800" cy="4525963"/>
+            <a:off x="5548085" y="1524000"/>
+            <a:ext cx="3443515" cy="4343400"/>
           </a:xfrm>
         </p:spPr>
         <p:txBody>
           <a:bodyPr>
-            <a:normAutofit fontScale="92500"/>
+            <a:normAutofit lnSpcReduction="10000"/>
           </a:bodyPr>
           <a:lstStyle/>
           <a:p>
-            <a:r>
-              <a:rPr lang="en-US" sz="2400" dirty="0" smtClean="0">
-                <a:latin typeface="Arial" panose="020B0604020202020204" pitchFamily="34" charset="0"/>
-                <a:cs typeface="Arial" panose="020B0604020202020204" pitchFamily="34" charset="0"/>
-              </a:rPr>
-              <a:t>Because every aspect of a site’s “look” is defined by HTML/CSS – it is crucial to have a detailed sketch going in.</a:t>
-            </a:r>
-          </a:p>
-          <a:p>
-            <a:endParaRPr lang="en-US" sz="2400" dirty="0">
+            <a:pPr marL="0" indent="0">
+              <a:buNone/>
+            </a:pPr>
+            <a:r>
+              <a:rPr lang="en-US" sz="2200" dirty="0" smtClean="0">
+                <a:latin typeface="Arial" panose="020B0604020202020204" pitchFamily="34" charset="0"/>
+                <a:cs typeface="Arial" panose="020B0604020202020204" pitchFamily="34" charset="0"/>
+              </a:rPr>
+              <a:t>Bootstrap lets you organize content based on the “number of columns” a div spans – out of a total 12 columns. </a:t>
+            </a:r>
+          </a:p>
+          <a:p>
+            <a:pPr marL="0" indent="0">
+              <a:buNone/>
+            </a:pPr>
+            <a:endParaRPr lang="en-US" sz="2200" dirty="0">
               <a:latin typeface="Arial" panose="020B0604020202020204" pitchFamily="34" charset="0"/>
               <a:cs typeface="Arial" panose="020B0604020202020204" pitchFamily="34" charset="0"/>
             </a:endParaRPr>
           </a:p>
           <a:p>
-            <a:r>
-              <a:rPr lang="en-US" sz="2400" dirty="0" smtClean="0">
-                <a:latin typeface="Arial" panose="020B0604020202020204" pitchFamily="34" charset="0"/>
-                <a:cs typeface="Arial" panose="020B0604020202020204" pitchFamily="34" charset="0"/>
-              </a:rPr>
-              <a:t>Pay particular attention to the location of navigation bars, titles, headers, content, images, footers etc. </a:t>
-            </a:r>
-          </a:p>
-          <a:p>
-            <a:endParaRPr lang="en-US" sz="2400" dirty="0">
+            <a:pPr marL="0" indent="0">
+              <a:buNone/>
+            </a:pPr>
+            <a:r>
+              <a:rPr lang="en-US" sz="2200" b="1" dirty="0" smtClean="0">
+                <a:latin typeface="Arial" panose="020B0604020202020204" pitchFamily="34" charset="0"/>
+                <a:cs typeface="Arial" panose="020B0604020202020204" pitchFamily="34" charset="0"/>
+              </a:rPr>
+              <a:t>Example:</a:t>
+            </a:r>
+          </a:p>
+          <a:p>
+            <a:pPr marL="0" indent="0">
+              <a:buNone/>
+            </a:pPr>
+            <a:r>
+              <a:rPr lang="en-US" sz="2200" dirty="0">
+                <a:latin typeface="Arial" panose="020B0604020202020204" pitchFamily="34" charset="0"/>
+                <a:cs typeface="Arial" panose="020B0604020202020204" pitchFamily="34" charset="0"/>
+              </a:rPr>
+              <a:t>&lt;div class="col-md-12</a:t>
+            </a:r>
+            <a:r>
+              <a:rPr lang="en-US" sz="2200" dirty="0" smtClean="0">
+                <a:latin typeface="Arial" panose="020B0604020202020204" pitchFamily="34" charset="0"/>
+                <a:cs typeface="Arial" panose="020B0604020202020204" pitchFamily="34" charset="0"/>
+              </a:rPr>
+              <a:t>"&gt;</a:t>
+            </a:r>
+          </a:p>
+          <a:p>
+            <a:pPr marL="0" indent="0">
+              <a:buNone/>
+            </a:pPr>
+            <a:r>
+              <a:rPr lang="en-US" sz="2200" dirty="0" smtClean="0">
+                <a:latin typeface="Arial" panose="020B0604020202020204" pitchFamily="34" charset="0"/>
+                <a:cs typeface="Arial" panose="020B0604020202020204" pitchFamily="34" charset="0"/>
+              </a:rPr>
+              <a:t>(Spans full width)</a:t>
+            </a:r>
+          </a:p>
+          <a:p>
+            <a:pPr marL="0" indent="0">
+              <a:buNone/>
+            </a:pPr>
+            <a:endParaRPr lang="en-US" sz="2200" dirty="0">
               <a:latin typeface="Arial" panose="020B0604020202020204" pitchFamily="34" charset="0"/>
               <a:cs typeface="Arial" panose="020B0604020202020204" pitchFamily="34" charset="0"/>
             </a:endParaRPr>
           </a:p>
           <a:p>
-            <a:r>
-              <a:rPr lang="en-US" sz="2400" dirty="0" smtClean="0">
-                <a:latin typeface="Arial" panose="020B0604020202020204" pitchFamily="34" charset="0"/>
-                <a:cs typeface="Arial" panose="020B0604020202020204" pitchFamily="34" charset="0"/>
-              </a:rPr>
-              <a:t>When imagining alignments, in particular, be mindful of the </a:t>
-            </a:r>
-            <a:r>
-              <a:rPr lang="en-US" sz="2400" b="1" i="1" u="sng" dirty="0" smtClean="0">
-                <a:latin typeface="Arial" panose="020B0604020202020204" pitchFamily="34" charset="0"/>
-                <a:cs typeface="Arial" panose="020B0604020202020204" pitchFamily="34" charset="0"/>
-              </a:rPr>
-              <a:t>grid</a:t>
-            </a:r>
-            <a:r>
-              <a:rPr lang="en-US" sz="2400" i="1" dirty="0" smtClean="0">
-                <a:latin typeface="Arial" panose="020B0604020202020204" pitchFamily="34" charset="0"/>
-                <a:cs typeface="Arial" panose="020B0604020202020204" pitchFamily="34" charset="0"/>
-              </a:rPr>
-              <a:t> </a:t>
-            </a:r>
-          </a:p>
-          <a:p>
             <a:pPr marL="0" indent="0">
               <a:buNone/>
             </a:pPr>
-            <a:endParaRPr lang="en-US" sz="2400" dirty="0">
+            <a:r>
+              <a:rPr lang="en-US" sz="2200" dirty="0">
+                <a:latin typeface="Arial" panose="020B0604020202020204" pitchFamily="34" charset="0"/>
+                <a:cs typeface="Arial" panose="020B0604020202020204" pitchFamily="34" charset="0"/>
+              </a:rPr>
+              <a:t>&lt;div class="</a:t>
+            </a:r>
+            <a:r>
+              <a:rPr lang="en-US" sz="2200" dirty="0" smtClean="0">
+                <a:latin typeface="Arial" panose="020B0604020202020204" pitchFamily="34" charset="0"/>
+                <a:cs typeface="Arial" panose="020B0604020202020204" pitchFamily="34" charset="0"/>
+              </a:rPr>
+              <a:t>col-md-4"&gt;</a:t>
+            </a:r>
+            <a:endParaRPr lang="en-US" sz="2200" dirty="0">
               <a:latin typeface="Arial" panose="020B0604020202020204" pitchFamily="34" charset="0"/>
               <a:cs typeface="Arial" panose="020B0604020202020204" pitchFamily="34" charset="0"/>
             </a:endParaRPr>
@@ -12764,17 +12791,63 @@
             <a:pPr marL="0" indent="0">
               <a:buNone/>
             </a:pPr>
-            <a:endParaRPr lang="en-US" sz="2400" dirty="0" smtClean="0">
+            <a:r>
+              <a:rPr lang="en-US" sz="2200" dirty="0">
+                <a:latin typeface="Arial" panose="020B0604020202020204" pitchFamily="34" charset="0"/>
+                <a:cs typeface="Arial" panose="020B0604020202020204" pitchFamily="34" charset="0"/>
+              </a:rPr>
+              <a:t>(Spans </a:t>
+            </a:r>
+            <a:r>
+              <a:rPr lang="en-US" sz="2200" dirty="0" smtClean="0">
+                <a:latin typeface="Arial" panose="020B0604020202020204" pitchFamily="34" charset="0"/>
+                <a:cs typeface="Arial" panose="020B0604020202020204" pitchFamily="34" charset="0"/>
+              </a:rPr>
+              <a:t>1/3 of full width)</a:t>
+            </a:r>
+          </a:p>
+          <a:p>
+            <a:pPr marL="0" indent="0">
+              <a:buNone/>
+            </a:pPr>
+            <a:endParaRPr lang="en-US" sz="2200" dirty="0">
               <a:latin typeface="Arial" panose="020B0604020202020204" pitchFamily="34" charset="0"/>
               <a:cs typeface="Arial" panose="020B0604020202020204" pitchFamily="34" charset="0"/>
             </a:endParaRPr>
           </a:p>
+          <a:p>
+            <a:pPr marL="0" indent="0">
+              <a:buNone/>
+            </a:pPr>
+            <a:endParaRPr lang="en-US" sz="2200" dirty="0" smtClean="0">
+              <a:latin typeface="Arial" panose="020B0604020202020204" pitchFamily="34" charset="0"/>
+              <a:cs typeface="Arial" panose="020B0604020202020204" pitchFamily="34" charset="0"/>
+            </a:endParaRPr>
+          </a:p>
+          <a:p>
+            <a:pPr marL="0" indent="0">
+              <a:buNone/>
+            </a:pPr>
+            <a:endParaRPr lang="en-US" sz="2200" dirty="0">
+              <a:latin typeface="Arial" panose="020B0604020202020204" pitchFamily="34" charset="0"/>
+              <a:cs typeface="Arial" panose="020B0604020202020204" pitchFamily="34" charset="0"/>
+            </a:endParaRPr>
+          </a:p>
+          <a:p>
+            <a:pPr marL="0" indent="0">
+              <a:buNone/>
+            </a:pPr>
+            <a:endParaRPr lang="en-US" sz="2200" dirty="0">
+              <a:latin typeface="Arial" panose="020B0604020202020204" pitchFamily="34" charset="0"/>
+              <a:cs typeface="Arial" panose="020B0604020202020204" pitchFamily="34" charset="0"/>
+            </a:endParaRPr>
+          </a:p>
         </p:txBody>
       </p:sp>
     </p:spTree>
     <p:extLst>
       <p:ext uri="{BB962C8B-B14F-4D97-AF65-F5344CB8AC3E}">
-        <p14:creationId xmlns:p14="http://schemas.microsoft.com/office/powerpoint/2010/main" val="2365829835"/>
+        <p14:creationId xmlns:p14="http://schemas.microsoft.com/office/powerpoint/2010/main" val="3042202240"/>
       </p:ext>
     </p:extLst>
   </p:cSld>
@@ -12842,14 +12915,14 @@
               <a:t>Bootstrap </a:t>
             </a:r>
             <a:r>
-              <a:rPr lang="en-US" sz="3600" b="1" dirty="0" err="1" smtClean="0">
+              <a:rPr lang="en-US" sz="3600" b="1" dirty="0" smtClean="0">
                 <a:solidFill>
                   <a:schemeClr val="bg1"/>
                 </a:solidFill>
                 <a:latin typeface="Arial" panose="020B0604020202020204" pitchFamily="34" charset="0"/>
                 <a:cs typeface="Arial" panose="020B0604020202020204" pitchFamily="34" charset="0"/>
               </a:rPr>
-              <a:t>Navbar</a:t>
+              <a:t>Typography</a:t>
             </a:r>
             <a:endParaRPr lang="en-US" sz="3600" b="1" dirty="0">
               <a:solidFill>
@@ -12937,9 +13010,81 @@
           </a:prstGeom>
         </p:spPr>
       </p:pic>
+      <p:sp>
+        <p:nvSpPr>
+          <p:cNvPr id="10" name="Content Placeholder 2"/>
+          <p:cNvSpPr>
+            <a:spLocks noGrp="1"/>
+          </p:cNvSpPr>
+          <p:nvPr>
+            <p:ph idx="1"/>
+          </p:nvPr>
+        </p:nvSpPr>
+        <p:spPr>
+          <a:xfrm>
+            <a:off x="367145" y="4953000"/>
+            <a:ext cx="8382000" cy="2087563"/>
+          </a:xfrm>
+        </p:spPr>
+        <p:txBody>
+          <a:bodyPr>
+            <a:noAutofit/>
+          </a:bodyPr>
+          <a:lstStyle/>
+          <a:p>
+            <a:r>
+              <a:rPr lang="en-US" sz="2000" dirty="0" smtClean="0">
+                <a:latin typeface="Arial" panose="020B0604020202020204" pitchFamily="34" charset="0"/>
+                <a:cs typeface="Arial" panose="020B0604020202020204" pitchFamily="34" charset="0"/>
+              </a:rPr>
+              <a:t>By default, Bootstrap offers nice looking fonts / size ratios of headers and paragraphs. </a:t>
+            </a:r>
+            <a:r>
+              <a:rPr lang="en-US" sz="2000" dirty="0" smtClean="0">
+                <a:latin typeface="Arial" panose="020B0604020202020204" pitchFamily="34" charset="0"/>
+                <a:cs typeface="Arial" panose="020B0604020202020204" pitchFamily="34" charset="0"/>
+              </a:rPr>
+              <a:t>These come without you needing to do anything!</a:t>
+            </a:r>
+          </a:p>
+          <a:p>
+            <a:endParaRPr lang="en-US" sz="2000" dirty="0" smtClean="0">
+              <a:latin typeface="Arial" panose="020B0604020202020204" pitchFamily="34" charset="0"/>
+              <a:cs typeface="Arial" panose="020B0604020202020204" pitchFamily="34" charset="0"/>
+            </a:endParaRPr>
+          </a:p>
+          <a:p>
+            <a:r>
+              <a:rPr lang="en-US" sz="2000" dirty="0" smtClean="0">
+                <a:latin typeface="Arial" panose="020B0604020202020204" pitchFamily="34" charset="0"/>
+                <a:cs typeface="Arial" panose="020B0604020202020204" pitchFamily="34" charset="0"/>
+              </a:rPr>
+              <a:t>&lt;p&gt;&lt;/p&gt;, &lt;h1</a:t>
+            </a:r>
+            <a:r>
+              <a:rPr lang="en-US" sz="2000" dirty="0" smtClean="0">
+                <a:latin typeface="Arial" panose="020B0604020202020204" pitchFamily="34" charset="0"/>
+                <a:cs typeface="Arial" panose="020B0604020202020204" pitchFamily="34" charset="0"/>
+              </a:rPr>
+              <a:t>&gt;&lt;/h1&gt;, &lt;h2&gt;&lt;/h2, </a:t>
+            </a:r>
+            <a:r>
+              <a:rPr lang="en-US" sz="2000" dirty="0" err="1" smtClean="0">
+                <a:latin typeface="Arial" panose="020B0604020202020204" pitchFamily="34" charset="0"/>
+                <a:cs typeface="Arial" panose="020B0604020202020204" pitchFamily="34" charset="0"/>
+              </a:rPr>
+              <a:t>etc</a:t>
+            </a:r>
+            <a:endParaRPr lang="en-US" sz="2000" dirty="0" smtClean="0">
+              <a:latin typeface="Arial" panose="020B0604020202020204" pitchFamily="34" charset="0"/>
+              <a:cs typeface="Arial" panose="020B0604020202020204" pitchFamily="34" charset="0"/>
+            </a:endParaRPr>
+          </a:p>
+        </p:txBody>
+      </p:sp>
       <p:pic>
         <p:nvPicPr>
-          <p:cNvPr id="21506" name="Picture 2" descr="http://speckycdn.sdm.netdna-cdn.com/wp-content/uploads/2011/05/wireframe-sketch-07.jpg"/>
+          <p:cNvPr id="6146" name="Picture 2" descr="http://cdn.appstorm.net/web.appstorm.net/files/2011/08/Bootstrap-620x361.png"/>
           <p:cNvPicPr>
             <a:picLocks noChangeAspect="1" noChangeArrowheads="1"/>
           </p:cNvPicPr>
@@ -12960,8 +13105,8 @@
         </p:blipFill>
         <p:spPr bwMode="auto">
           <a:xfrm>
-            <a:off x="5087513" y="1905000"/>
-            <a:ext cx="3897813" cy="3276600"/>
+            <a:off x="956456" y="914400"/>
+            <a:ext cx="6815944" cy="3968639"/>
           </a:xfrm>
           <a:prstGeom prst="rect">
             <a:avLst/>
@@ -12978,104 +13123,10 @@
           </a:extLst>
         </p:spPr>
       </p:pic>
-      <p:sp>
-        <p:nvSpPr>
-          <p:cNvPr id="9" name="Content Placeholder 2"/>
-          <p:cNvSpPr>
-            <a:spLocks noGrp="1"/>
-          </p:cNvSpPr>
-          <p:nvPr>
-            <p:ph idx="1"/>
-          </p:nvPr>
-        </p:nvSpPr>
-        <p:spPr>
-          <a:xfrm>
-            <a:off x="457200" y="1295400"/>
-            <a:ext cx="4495800" cy="4525963"/>
-          </a:xfrm>
-        </p:spPr>
-        <p:txBody>
-          <a:bodyPr>
-            <a:normAutofit fontScale="92500"/>
-          </a:bodyPr>
-          <a:lstStyle/>
-          <a:p>
-            <a:r>
-              <a:rPr lang="en-US" sz="2400" dirty="0" smtClean="0">
-                <a:latin typeface="Arial" panose="020B0604020202020204" pitchFamily="34" charset="0"/>
-                <a:cs typeface="Arial" panose="020B0604020202020204" pitchFamily="34" charset="0"/>
-              </a:rPr>
-              <a:t>Because every aspect of a site’s “look” is defined by HTML/CSS – it is crucial to have a detailed sketch going in.</a:t>
-            </a:r>
-          </a:p>
-          <a:p>
-            <a:endParaRPr lang="en-US" sz="2400" dirty="0">
-              <a:latin typeface="Arial" panose="020B0604020202020204" pitchFamily="34" charset="0"/>
-              <a:cs typeface="Arial" panose="020B0604020202020204" pitchFamily="34" charset="0"/>
-            </a:endParaRPr>
-          </a:p>
-          <a:p>
-            <a:r>
-              <a:rPr lang="en-US" sz="2400" dirty="0" smtClean="0">
-                <a:latin typeface="Arial" panose="020B0604020202020204" pitchFamily="34" charset="0"/>
-                <a:cs typeface="Arial" panose="020B0604020202020204" pitchFamily="34" charset="0"/>
-              </a:rPr>
-              <a:t>Pay particular attention to the location of navigation bars, titles, headers, content, images, footers etc. </a:t>
-            </a:r>
-          </a:p>
-          <a:p>
-            <a:endParaRPr lang="en-US" sz="2400" dirty="0">
-              <a:latin typeface="Arial" panose="020B0604020202020204" pitchFamily="34" charset="0"/>
-              <a:cs typeface="Arial" panose="020B0604020202020204" pitchFamily="34" charset="0"/>
-            </a:endParaRPr>
-          </a:p>
-          <a:p>
-            <a:r>
-              <a:rPr lang="en-US" sz="2400" dirty="0" smtClean="0">
-                <a:latin typeface="Arial" panose="020B0604020202020204" pitchFamily="34" charset="0"/>
-                <a:cs typeface="Arial" panose="020B0604020202020204" pitchFamily="34" charset="0"/>
-              </a:rPr>
-              <a:t>When imagining alignments, in particular, be mindful of the </a:t>
-            </a:r>
-            <a:r>
-              <a:rPr lang="en-US" sz="2400" b="1" i="1" u="sng" dirty="0" smtClean="0">
-                <a:latin typeface="Arial" panose="020B0604020202020204" pitchFamily="34" charset="0"/>
-                <a:cs typeface="Arial" panose="020B0604020202020204" pitchFamily="34" charset="0"/>
-              </a:rPr>
-              <a:t>grid</a:t>
-            </a:r>
-            <a:r>
-              <a:rPr lang="en-US" sz="2400" i="1" dirty="0" smtClean="0">
-                <a:latin typeface="Arial" panose="020B0604020202020204" pitchFamily="34" charset="0"/>
-                <a:cs typeface="Arial" panose="020B0604020202020204" pitchFamily="34" charset="0"/>
-              </a:rPr>
-              <a:t> </a:t>
-            </a:r>
-          </a:p>
-          <a:p>
-            <a:pPr marL="0" indent="0">
-              <a:buNone/>
-            </a:pPr>
-            <a:endParaRPr lang="en-US" sz="2400" dirty="0">
-              <a:latin typeface="Arial" panose="020B0604020202020204" pitchFamily="34" charset="0"/>
-              <a:cs typeface="Arial" panose="020B0604020202020204" pitchFamily="34" charset="0"/>
-            </a:endParaRPr>
-          </a:p>
-          <a:p>
-            <a:pPr marL="0" indent="0">
-              <a:buNone/>
-            </a:pPr>
-            <a:endParaRPr lang="en-US" sz="2400" dirty="0" smtClean="0">
-              <a:latin typeface="Arial" panose="020B0604020202020204" pitchFamily="34" charset="0"/>
-              <a:cs typeface="Arial" panose="020B0604020202020204" pitchFamily="34" charset="0"/>
-            </a:endParaRPr>
-          </a:p>
-        </p:txBody>
-      </p:sp>
     </p:spTree>
     <p:extLst>
       <p:ext uri="{BB962C8B-B14F-4D97-AF65-F5344CB8AC3E}">
-        <p14:creationId xmlns:p14="http://schemas.microsoft.com/office/powerpoint/2010/main" val="995287254"/>
+        <p14:creationId xmlns:p14="http://schemas.microsoft.com/office/powerpoint/2010/main" val="1215744914"/>
       </p:ext>
     </p:extLst>
   </p:cSld>
@@ -13277,10 +13328,6 @@
               </a:rPr>
               <a:t>Behold! Bootstrap</a:t>
             </a:r>
-            <a:endParaRPr lang="en-US" dirty="0" smtClean="0">
-              <a:latin typeface="Arial" panose="020B0604020202020204" pitchFamily="34" charset="0"/>
-              <a:cs typeface="Arial" panose="020B0604020202020204" pitchFamily="34" charset="0"/>
-            </a:endParaRPr>
           </a:p>
           <a:p>
             <a:pPr marL="571500" indent="-571500">
@@ -13348,7 +13395,14 @@
                 <a:latin typeface="Arial" panose="020B0604020202020204" pitchFamily="34" charset="0"/>
                 <a:cs typeface="Arial" panose="020B0604020202020204" pitchFamily="34" charset="0"/>
               </a:rPr>
-              <a:t>Time to Build!</a:t>
+              <a:t>Time to Build</a:t>
+            </a:r>
+            <a:r>
+              <a:rPr lang="en-US" dirty="0" smtClean="0">
+                <a:latin typeface="Arial" panose="020B0604020202020204" pitchFamily="34" charset="0"/>
+                <a:cs typeface="Arial" panose="020B0604020202020204" pitchFamily="34" charset="0"/>
+              </a:rPr>
+              <a:t>!</a:t>
             </a:r>
           </a:p>
           <a:p>
@@ -13462,6 +13516,10 @@
               </a:rPr>
               <a:t>Formatting the Look </a:t>
             </a:r>
+            <a:endParaRPr lang="en-US" dirty="0" smtClean="0">
+              <a:latin typeface="Arial" panose="020B0604020202020204" pitchFamily="34" charset="0"/>
+              <a:cs typeface="Arial" panose="020B0604020202020204" pitchFamily="34" charset="0"/>
+            </a:endParaRPr>
           </a:p>
         </p:txBody>
       </p:sp>
@@ -13563,17 +13621,7 @@
                 <a:latin typeface="Arial" panose="020B0604020202020204" pitchFamily="34" charset="0"/>
                 <a:cs typeface="Arial" panose="020B0604020202020204" pitchFamily="34" charset="0"/>
               </a:rPr>
-              <a:t>Bootstrap </a:t>
-            </a:r>
-            <a:r>
-              <a:rPr lang="en-US" sz="3600" b="1" dirty="0" err="1" smtClean="0">
-                <a:solidFill>
-                  <a:schemeClr val="bg1"/>
-                </a:solidFill>
-                <a:latin typeface="Arial" panose="020B0604020202020204" pitchFamily="34" charset="0"/>
-                <a:cs typeface="Arial" panose="020B0604020202020204" pitchFamily="34" charset="0"/>
-              </a:rPr>
-              <a:t>Jumbotron</a:t>
+              <a:t>Bootstrap Buttons</a:t>
             </a:r>
             <a:endParaRPr lang="en-US" sz="3600" b="1" dirty="0">
               <a:solidFill>
@@ -13663,13 +13711,13 @@
       </p:pic>
       <p:pic>
         <p:nvPicPr>
-          <p:cNvPr id="21506" name="Picture 2" descr="http://speckycdn.sdm.netdna-cdn.com/wp-content/uploads/2011/05/wireframe-sketch-07.jpg"/>
+          <p:cNvPr id="7172" name="Picture 4" descr="http://www.bitrepository.com/wp-content/gallery/bootstrap-3/bootstrap-3-buttons.jpg"/>
           <p:cNvPicPr>
             <a:picLocks noChangeAspect="1" noChangeArrowheads="1"/>
           </p:cNvPicPr>
           <p:nvPr/>
         </p:nvPicPr>
-        <p:blipFill>
+        <p:blipFill rotWithShape="1">
           <a:blip r:embed="rId3">
             <a:extLst>
               <a:ext uri="{28A0092B-C50C-407E-A947-70E740481C1C}">
@@ -13677,15 +13725,13 @@
               </a:ext>
             </a:extLst>
           </a:blip>
-          <a:srcRect/>
-          <a:stretch>
-            <a:fillRect/>
-          </a:stretch>
+          <a:srcRect t="17270" b="-3746"/>
+          <a:stretch/>
         </p:blipFill>
         <p:spPr bwMode="auto">
           <a:xfrm>
-            <a:off x="5087513" y="1905000"/>
-            <a:ext cx="3897813" cy="3276600"/>
+            <a:off x="430645" y="979714"/>
+            <a:ext cx="8255000" cy="3294743"/>
           </a:xfrm>
           <a:prstGeom prst="rect">
             <a:avLst/>
@@ -13704,7 +13750,7 @@
       </p:pic>
       <p:sp>
         <p:nvSpPr>
-          <p:cNvPr id="9" name="Content Placeholder 2"/>
+          <p:cNvPr id="10" name="Content Placeholder 2"/>
           <p:cNvSpPr>
             <a:spLocks noGrp="1"/>
           </p:cNvSpPr>
@@ -13714,92 +13760,101 @@
         </p:nvSpPr>
         <p:spPr>
           <a:xfrm>
-            <a:off x="457200" y="1295400"/>
-            <a:ext cx="4495800" cy="4525963"/>
+            <a:off x="367145" y="4419600"/>
+            <a:ext cx="8382000" cy="1676400"/>
           </a:xfrm>
         </p:spPr>
         <p:txBody>
           <a:bodyPr>
-            <a:normAutofit fontScale="92500"/>
+            <a:noAutofit/>
           </a:bodyPr>
           <a:lstStyle/>
           <a:p>
-            <a:r>
-              <a:rPr lang="en-US" sz="2400" dirty="0" smtClean="0">
-                <a:latin typeface="Arial" panose="020B0604020202020204" pitchFamily="34" charset="0"/>
-                <a:cs typeface="Arial" panose="020B0604020202020204" pitchFamily="34" charset="0"/>
-              </a:rPr>
-              <a:t>Because every aspect of a site’s “look” is defined by HTML/CSS – it is crucial to have a detailed sketch going in.</a:t>
-            </a:r>
-          </a:p>
-          <a:p>
-            <a:endParaRPr lang="en-US" sz="2400" dirty="0">
+            <a:pPr marL="0" indent="0">
+              <a:buNone/>
+            </a:pPr>
+            <a:r>
+              <a:rPr lang="en-US" sz="2000" dirty="0" smtClean="0">
+                <a:latin typeface="Arial" panose="020B0604020202020204" pitchFamily="34" charset="0"/>
+                <a:cs typeface="Arial" panose="020B0604020202020204" pitchFamily="34" charset="0"/>
+              </a:rPr>
+              <a:t>Bootstrap also helps yo</a:t>
+            </a:r>
+            <a:r>
+              <a:rPr lang="en-US" sz="2000" dirty="0" smtClean="0">
+                <a:latin typeface="Arial" panose="020B0604020202020204" pitchFamily="34" charset="0"/>
+                <a:cs typeface="Arial" panose="020B0604020202020204" pitchFamily="34" charset="0"/>
+              </a:rPr>
+              <a:t>u quickly create buttons of various size/colors</a:t>
+            </a:r>
+          </a:p>
+          <a:p>
+            <a:pPr marL="0" indent="0">
+              <a:buNone/>
+            </a:pPr>
+            <a:endParaRPr lang="en-US" sz="2000" dirty="0" smtClean="0">
               <a:latin typeface="Arial" panose="020B0604020202020204" pitchFamily="34" charset="0"/>
               <a:cs typeface="Arial" panose="020B0604020202020204" pitchFamily="34" charset="0"/>
             </a:endParaRPr>
           </a:p>
           <a:p>
-            <a:r>
-              <a:rPr lang="en-US" sz="2400" dirty="0" smtClean="0">
-                <a:latin typeface="Arial" panose="020B0604020202020204" pitchFamily="34" charset="0"/>
-                <a:cs typeface="Arial" panose="020B0604020202020204" pitchFamily="34" charset="0"/>
-              </a:rPr>
-              <a:t>Pay particular attention to the location of navigation bars, titles, headers, content, images, footers etc. </a:t>
-            </a:r>
-          </a:p>
-          <a:p>
-            <a:endParaRPr lang="en-US" sz="2400" dirty="0">
-              <a:latin typeface="Arial" panose="020B0604020202020204" pitchFamily="34" charset="0"/>
-              <a:cs typeface="Arial" panose="020B0604020202020204" pitchFamily="34" charset="0"/>
-            </a:endParaRPr>
-          </a:p>
-          <a:p>
-            <a:r>
-              <a:rPr lang="en-US" sz="2400" dirty="0" smtClean="0">
-                <a:latin typeface="Arial" panose="020B0604020202020204" pitchFamily="34" charset="0"/>
-                <a:cs typeface="Arial" panose="020B0604020202020204" pitchFamily="34" charset="0"/>
-              </a:rPr>
-              <a:t>When imagining alignments, in particular, be mindful of the </a:t>
-            </a:r>
-            <a:r>
-              <a:rPr lang="en-US" sz="2400" b="1" i="1" u="sng" dirty="0" smtClean="0">
-                <a:latin typeface="Arial" panose="020B0604020202020204" pitchFamily="34" charset="0"/>
-                <a:cs typeface="Arial" panose="020B0604020202020204" pitchFamily="34" charset="0"/>
-              </a:rPr>
-              <a:t>grid</a:t>
-            </a:r>
-            <a:r>
-              <a:rPr lang="en-US" sz="2400" i="1" dirty="0" smtClean="0">
-                <a:latin typeface="Arial" panose="020B0604020202020204" pitchFamily="34" charset="0"/>
-                <a:cs typeface="Arial" panose="020B0604020202020204" pitchFamily="34" charset="0"/>
-              </a:rPr>
-              <a:t> </a:t>
-            </a:r>
-          </a:p>
-          <a:p>
             <a:pPr marL="0" indent="0">
               <a:buNone/>
             </a:pPr>
-            <a:endParaRPr lang="en-US" sz="2400" dirty="0">
-              <a:latin typeface="Arial" panose="020B0604020202020204" pitchFamily="34" charset="0"/>
-              <a:cs typeface="Arial" panose="020B0604020202020204" pitchFamily="34" charset="0"/>
-            </a:endParaRPr>
+            <a:r>
+              <a:rPr lang="en-US" sz="2000" b="1" dirty="0" smtClean="0">
+                <a:latin typeface="Arial" panose="020B0604020202020204" pitchFamily="34" charset="0"/>
+                <a:cs typeface="Arial" panose="020B0604020202020204" pitchFamily="34" charset="0"/>
+              </a:rPr>
+              <a:t>Example: </a:t>
+            </a:r>
           </a:p>
           <a:p>
             <a:pPr marL="0" indent="0">
               <a:buNone/>
             </a:pPr>
-            <a:endParaRPr lang="en-US" sz="2400" dirty="0" smtClean="0">
-              <a:latin typeface="Arial" panose="020B0604020202020204" pitchFamily="34" charset="0"/>
-              <a:cs typeface="Arial" panose="020B0604020202020204" pitchFamily="34" charset="0"/>
-            </a:endParaRPr>
+            <a:r>
+              <a:rPr lang="en-US" sz="2000" dirty="0" smtClean="0">
+                <a:latin typeface="Arial" panose="020B0604020202020204" pitchFamily="34" charset="0"/>
+                <a:cs typeface="Arial" panose="020B0604020202020204" pitchFamily="34" charset="0"/>
+              </a:rPr>
+              <a:t> &lt;button class="</a:t>
+            </a:r>
+            <a:r>
+              <a:rPr lang="en-US" sz="2000" dirty="0" err="1" smtClean="0">
+                <a:latin typeface="Arial" panose="020B0604020202020204" pitchFamily="34" charset="0"/>
+                <a:cs typeface="Arial" panose="020B0604020202020204" pitchFamily="34" charset="0"/>
+              </a:rPr>
+              <a:t>btn</a:t>
+            </a:r>
+            <a:r>
+              <a:rPr lang="en-US" sz="2000" dirty="0" smtClean="0">
+                <a:latin typeface="Arial" panose="020B0604020202020204" pitchFamily="34" charset="0"/>
+                <a:cs typeface="Arial" panose="020B0604020202020204" pitchFamily="34" charset="0"/>
+              </a:rPr>
+              <a:t> </a:t>
+            </a:r>
+            <a:r>
+              <a:rPr lang="en-US" sz="2000" dirty="0" err="1" smtClean="0">
+                <a:latin typeface="Arial" panose="020B0604020202020204" pitchFamily="34" charset="0"/>
+                <a:cs typeface="Arial" panose="020B0604020202020204" pitchFamily="34" charset="0"/>
+              </a:rPr>
+              <a:t>btn</a:t>
+            </a:r>
+            <a:r>
+              <a:rPr lang="en-US" sz="2000" dirty="0" smtClean="0">
+                <a:latin typeface="Arial" panose="020B0604020202020204" pitchFamily="34" charset="0"/>
+                <a:cs typeface="Arial" panose="020B0604020202020204" pitchFamily="34" charset="0"/>
+              </a:rPr>
+              <a:t>-default" type="submit"&gt;Button&lt;/button&gt; </a:t>
+            </a:r>
           </a:p>
         </p:txBody>
       </p:sp>
     </p:spTree>
     <p:extLst>
       <p:ext uri="{BB962C8B-B14F-4D97-AF65-F5344CB8AC3E}">
-        <p14:creationId xmlns:p14="http://schemas.microsoft.com/office/powerpoint/2010/main" val="2514767528"/>
+        <p14:creationId xmlns:p14="http://schemas.microsoft.com/office/powerpoint/2010/main" val="2365829835"/>
       </p:ext>
     </p:extLst>
   </p:cSld>
@@ -13864,7 +13919,17 @@
                 <a:latin typeface="Arial" panose="020B0604020202020204" pitchFamily="34" charset="0"/>
                 <a:cs typeface="Arial" panose="020B0604020202020204" pitchFamily="34" charset="0"/>
               </a:rPr>
-              <a:t>Bootstrap Tables</a:t>
+              <a:t>Bootstrap </a:t>
+            </a:r>
+            <a:r>
+              <a:rPr lang="en-US" sz="3600" b="1" dirty="0" err="1" smtClean="0">
+                <a:solidFill>
+                  <a:schemeClr val="bg1"/>
+                </a:solidFill>
+                <a:latin typeface="Arial" panose="020B0604020202020204" pitchFamily="34" charset="0"/>
+                <a:cs typeface="Arial" panose="020B0604020202020204" pitchFamily="34" charset="0"/>
+              </a:rPr>
+              <a:t>Navbar</a:t>
             </a:r>
             <a:endParaRPr lang="en-US" sz="3600" b="1" dirty="0">
               <a:solidFill>
@@ -13954,7 +14019,7 @@
       </p:pic>
       <p:pic>
         <p:nvPicPr>
-          <p:cNvPr id="21506" name="Picture 2" descr="http://speckycdn.sdm.netdna-cdn.com/wp-content/uploads/2011/05/wireframe-sketch-07.jpg"/>
+          <p:cNvPr id="11269" name="Picture 5"/>
           <p:cNvPicPr>
             <a:picLocks noChangeAspect="1" noChangeArrowheads="1"/>
           </p:cNvPicPr>
@@ -13975,122 +14040,93 @@
         </p:blipFill>
         <p:spPr bwMode="auto">
           <a:xfrm>
-            <a:off x="5087513" y="1905000"/>
-            <a:ext cx="3897813" cy="3276600"/>
+            <a:off x="455251" y="1830724"/>
+            <a:ext cx="8205788" cy="4343743"/>
           </a:xfrm>
           <a:prstGeom prst="rect">
             <a:avLst/>
           </a:prstGeom>
           <a:noFill/>
+          <a:ln>
+            <a:noFill/>
+          </a:ln>
           <a:extLst>
             <a:ext uri="{909E8E84-426E-40DD-AFC4-6F175D3DCCD1}">
               <a14:hiddenFill xmlns:a14="http://schemas.microsoft.com/office/drawing/2010/main">
                 <a:solidFill>
-                  <a:srgbClr val="FFFFFF"/>
+                  <a:schemeClr val="accent1"/>
                 </a:solidFill>
               </a14:hiddenFill>
             </a:ext>
+            <a:ext uri="{91240B29-F687-4F45-9708-019B960494DF}">
+              <a14:hiddenLine xmlns:a14="http://schemas.microsoft.com/office/drawing/2010/main" w="9525">
+                <a:solidFill>
+                  <a:schemeClr val="tx1"/>
+                </a:solidFill>
+                <a:miter lim="800000"/>
+                <a:headEnd/>
+                <a:tailEnd/>
+              </a14:hiddenLine>
+            </a:ext>
           </a:extLst>
         </p:spPr>
       </p:pic>
-      <p:sp>
-        <p:nvSpPr>
-          <p:cNvPr id="9" name="Content Placeholder 2"/>
-          <p:cNvSpPr>
-            <a:spLocks noGrp="1"/>
-          </p:cNvSpPr>
-          <p:nvPr>
-            <p:ph idx="1"/>
-          </p:nvPr>
-        </p:nvSpPr>
-        <p:spPr>
-          <a:xfrm>
-            <a:off x="457200" y="1295400"/>
-            <a:ext cx="4495800" cy="4525963"/>
-          </a:xfrm>
-        </p:spPr>
-        <p:txBody>
-          <a:bodyPr>
-            <a:normAutofit fontScale="92500"/>
-          </a:bodyPr>
-          <a:lstStyle/>
-          <a:p>
-            <a:r>
-              <a:rPr lang="en-US" sz="2400" dirty="0" smtClean="0">
-                <a:latin typeface="Arial" panose="020B0604020202020204" pitchFamily="34" charset="0"/>
-                <a:cs typeface="Arial" panose="020B0604020202020204" pitchFamily="34" charset="0"/>
-              </a:rPr>
-              <a:t>Because every aspect of a site’s “look” is defined by HTML/CSS – it is crucial to have a detailed sketch going in.</a:t>
-            </a:r>
-          </a:p>
-          <a:p>
-            <a:endParaRPr lang="en-US" sz="2400" dirty="0">
-              <a:latin typeface="Arial" panose="020B0604020202020204" pitchFamily="34" charset="0"/>
-              <a:cs typeface="Arial" panose="020B0604020202020204" pitchFamily="34" charset="0"/>
-            </a:endParaRPr>
-          </a:p>
-          <a:p>
-            <a:r>
-              <a:rPr lang="en-US" sz="2400" dirty="0" smtClean="0">
-                <a:latin typeface="Arial" panose="020B0604020202020204" pitchFamily="34" charset="0"/>
-                <a:cs typeface="Arial" panose="020B0604020202020204" pitchFamily="34" charset="0"/>
-              </a:rPr>
-              <a:t>Pay particular attention to the location of navigation bars, titles, headers, content, images, footers etc. </a:t>
-            </a:r>
-          </a:p>
-          <a:p>
-            <a:endParaRPr lang="en-US" sz="2400" dirty="0">
-              <a:latin typeface="Arial" panose="020B0604020202020204" pitchFamily="34" charset="0"/>
-              <a:cs typeface="Arial" panose="020B0604020202020204" pitchFamily="34" charset="0"/>
-            </a:endParaRPr>
-          </a:p>
-          <a:p>
-            <a:r>
-              <a:rPr lang="en-US" sz="2400" dirty="0" smtClean="0">
-                <a:latin typeface="Arial" panose="020B0604020202020204" pitchFamily="34" charset="0"/>
-                <a:cs typeface="Arial" panose="020B0604020202020204" pitchFamily="34" charset="0"/>
-              </a:rPr>
-              <a:t>When imagining alignments, in particular, be mindful of the </a:t>
-            </a:r>
-            <a:r>
-              <a:rPr lang="en-US" sz="2400" b="1" i="1" u="sng" dirty="0" smtClean="0">
-                <a:latin typeface="Arial" panose="020B0604020202020204" pitchFamily="34" charset="0"/>
-                <a:cs typeface="Arial" panose="020B0604020202020204" pitchFamily="34" charset="0"/>
-              </a:rPr>
-              <a:t>grid</a:t>
-            </a:r>
-            <a:r>
-              <a:rPr lang="en-US" sz="2400" i="1" dirty="0" smtClean="0">
-                <a:latin typeface="Arial" panose="020B0604020202020204" pitchFamily="34" charset="0"/>
-                <a:cs typeface="Arial" panose="020B0604020202020204" pitchFamily="34" charset="0"/>
-              </a:rPr>
-              <a:t> </a:t>
-            </a:r>
-          </a:p>
-          <a:p>
-            <a:pPr marL="0" indent="0">
-              <a:buNone/>
-            </a:pPr>
-            <a:endParaRPr lang="en-US" sz="2400" dirty="0">
-              <a:latin typeface="Arial" panose="020B0604020202020204" pitchFamily="34" charset="0"/>
-              <a:cs typeface="Arial" panose="020B0604020202020204" pitchFamily="34" charset="0"/>
-            </a:endParaRPr>
-          </a:p>
-          <a:p>
-            <a:pPr marL="0" indent="0">
-              <a:buNone/>
-            </a:pPr>
-            <a:endParaRPr lang="en-US" sz="2400" dirty="0" smtClean="0">
-              <a:latin typeface="Arial" panose="020B0604020202020204" pitchFamily="34" charset="0"/>
-              <a:cs typeface="Arial" panose="020B0604020202020204" pitchFamily="34" charset="0"/>
-            </a:endParaRPr>
-          </a:p>
-        </p:txBody>
-      </p:sp>
+      <p:pic>
+        <p:nvPicPr>
+          <p:cNvPr id="11270" name="Picture 6"/>
+          <p:cNvPicPr>
+            <a:picLocks noChangeAspect="1" noChangeArrowheads="1"/>
+          </p:cNvPicPr>
+          <p:nvPr/>
+        </p:nvPicPr>
+        <p:blipFill rotWithShape="1">
+          <a:blip r:embed="rId4">
+            <a:extLst>
+              <a:ext uri="{28A0092B-C50C-407E-A947-70E740481C1C}">
+                <a14:useLocalDpi xmlns:a14="http://schemas.microsoft.com/office/drawing/2010/main" val="0"/>
+              </a:ext>
+            </a:extLst>
+          </a:blip>
+          <a:srcRect r="19124"/>
+          <a:stretch/>
+        </p:blipFill>
+        <p:spPr bwMode="auto">
+          <a:xfrm>
+            <a:off x="0" y="1066800"/>
+            <a:ext cx="9130144" cy="485775"/>
+          </a:xfrm>
+          <a:prstGeom prst="rect">
+            <a:avLst/>
+          </a:prstGeom>
+          <a:noFill/>
+          <a:ln>
+            <a:noFill/>
+          </a:ln>
+          <a:extLst>
+            <a:ext uri="{909E8E84-426E-40DD-AFC4-6F175D3DCCD1}">
+              <a14:hiddenFill xmlns:a14="http://schemas.microsoft.com/office/drawing/2010/main">
+                <a:solidFill>
+                  <a:schemeClr val="accent1"/>
+                </a:solidFill>
+              </a14:hiddenFill>
+            </a:ext>
+            <a:ext uri="{91240B29-F687-4F45-9708-019B960494DF}">
+              <a14:hiddenLine xmlns:a14="http://schemas.microsoft.com/office/drawing/2010/main" w="9525">
+                <a:solidFill>
+                  <a:schemeClr val="tx1"/>
+                </a:solidFill>
+                <a:miter lim="800000"/>
+                <a:headEnd/>
+                <a:tailEnd/>
+              </a14:hiddenLine>
+            </a:ext>
+          </a:extLst>
+        </p:spPr>
+      </p:pic>
     </p:spTree>
     <p:extLst>
       <p:ext uri="{BB962C8B-B14F-4D97-AF65-F5344CB8AC3E}">
-        <p14:creationId xmlns:p14="http://schemas.microsoft.com/office/powerpoint/2010/main" val="2046804525"/>
+        <p14:creationId xmlns:p14="http://schemas.microsoft.com/office/powerpoint/2010/main" val="995287254"/>
       </p:ext>
     </p:extLst>
   </p:cSld>
@@ -14155,7 +14191,17 @@
                 <a:latin typeface="Arial" panose="020B0604020202020204" pitchFamily="34" charset="0"/>
                 <a:cs typeface="Arial" panose="020B0604020202020204" pitchFamily="34" charset="0"/>
               </a:rPr>
-              <a:t>Bootstrap Forms</a:t>
+              <a:t>Bootstrap </a:t>
+            </a:r>
+            <a:r>
+              <a:rPr lang="en-US" sz="3600" b="1" dirty="0" err="1" smtClean="0">
+                <a:solidFill>
+                  <a:schemeClr val="bg1"/>
+                </a:solidFill>
+                <a:latin typeface="Arial" panose="020B0604020202020204" pitchFamily="34" charset="0"/>
+                <a:cs typeface="Arial" panose="020B0604020202020204" pitchFamily="34" charset="0"/>
+              </a:rPr>
+              <a:t>Jumbotron</a:t>
             </a:r>
             <a:endParaRPr lang="en-US" sz="3600" b="1" dirty="0">
               <a:solidFill>
@@ -14245,14 +14291,66 @@
       </p:pic>
       <p:pic>
         <p:nvPicPr>
-          <p:cNvPr id="21506" name="Picture 2" descr="http://speckycdn.sdm.netdna-cdn.com/wp-content/uploads/2011/05/wireframe-sketch-07.jpg"/>
+          <p:cNvPr id="10242" name="Picture 2"/>
+          <p:cNvPicPr>
+            <a:picLocks noChangeAspect="1" noChangeArrowheads="1"/>
+          </p:cNvPicPr>
+          <p:nvPr/>
+        </p:nvPicPr>
+        <p:blipFill rotWithShape="1">
+          <a:blip r:embed="rId3">
+            <a:extLst>
+              <a:ext uri="{28A0092B-C50C-407E-A947-70E740481C1C}">
+                <a14:useLocalDpi xmlns:a14="http://schemas.microsoft.com/office/drawing/2010/main" val="0"/>
+              </a:ext>
+            </a:extLst>
+          </a:blip>
+          <a:srcRect t="9770"/>
+          <a:stretch/>
+        </p:blipFill>
+        <p:spPr bwMode="auto">
+          <a:xfrm>
+            <a:off x="57150" y="1066800"/>
+            <a:ext cx="9029700" cy="3652611"/>
+          </a:xfrm>
+          <a:prstGeom prst="rect">
+            <a:avLst/>
+          </a:prstGeom>
+          <a:noFill/>
+          <a:ln>
+            <a:noFill/>
+          </a:ln>
+          <a:extLst>
+            <a:ext uri="{909E8E84-426E-40DD-AFC4-6F175D3DCCD1}">
+              <a14:hiddenFill xmlns:a14="http://schemas.microsoft.com/office/drawing/2010/main">
+                <a:solidFill>
+                  <a:schemeClr val="accent1"/>
+                </a:solidFill>
+              </a14:hiddenFill>
+            </a:ext>
+            <a:ext uri="{91240B29-F687-4F45-9708-019B960494DF}">
+              <a14:hiddenLine xmlns:a14="http://schemas.microsoft.com/office/drawing/2010/main" w="9525">
+                <a:solidFill>
+                  <a:schemeClr val="tx1"/>
+                </a:solidFill>
+                <a:miter lim="800000"/>
+                <a:headEnd/>
+                <a:tailEnd/>
+              </a14:hiddenLine>
+            </a:ext>
+          </a:extLst>
+        </p:spPr>
+      </p:pic>
+      <p:pic>
+        <p:nvPicPr>
+          <p:cNvPr id="10244" name="Picture 4"/>
           <p:cNvPicPr>
             <a:picLocks noChangeAspect="1" noChangeArrowheads="1"/>
           </p:cNvPicPr>
           <p:nvPr/>
         </p:nvPicPr>
         <p:blipFill>
-          <a:blip r:embed="rId3">
+          <a:blip r:embed="rId4">
             <a:extLst>
               <a:ext uri="{28A0092B-C50C-407E-A947-70E740481C1C}">
                 <a14:useLocalDpi xmlns:a14="http://schemas.microsoft.com/office/drawing/2010/main" val="0"/>
@@ -14266,122 +14364,41 @@
         </p:blipFill>
         <p:spPr bwMode="auto">
           <a:xfrm>
-            <a:off x="5087513" y="1905000"/>
-            <a:ext cx="3897813" cy="3276600"/>
+            <a:off x="609600" y="4800600"/>
+            <a:ext cx="7681763" cy="1260475"/>
           </a:xfrm>
           <a:prstGeom prst="rect">
             <a:avLst/>
           </a:prstGeom>
           <a:noFill/>
+          <a:ln>
+            <a:noFill/>
+          </a:ln>
           <a:extLst>
             <a:ext uri="{909E8E84-426E-40DD-AFC4-6F175D3DCCD1}">
               <a14:hiddenFill xmlns:a14="http://schemas.microsoft.com/office/drawing/2010/main">
                 <a:solidFill>
-                  <a:srgbClr val="FFFFFF"/>
+                  <a:schemeClr val="accent1"/>
                 </a:solidFill>
               </a14:hiddenFill>
             </a:ext>
+            <a:ext uri="{91240B29-F687-4F45-9708-019B960494DF}">
+              <a14:hiddenLine xmlns:a14="http://schemas.microsoft.com/office/drawing/2010/main" w="9525">
+                <a:solidFill>
+                  <a:schemeClr val="tx1"/>
+                </a:solidFill>
+                <a:miter lim="800000"/>
+                <a:headEnd/>
+                <a:tailEnd/>
+              </a14:hiddenLine>
+            </a:ext>
           </a:extLst>
         </p:spPr>
       </p:pic>
-      <p:sp>
-        <p:nvSpPr>
-          <p:cNvPr id="9" name="Content Placeholder 2"/>
-          <p:cNvSpPr>
-            <a:spLocks noGrp="1"/>
-          </p:cNvSpPr>
-          <p:nvPr>
-            <p:ph idx="1"/>
-          </p:nvPr>
-        </p:nvSpPr>
-        <p:spPr>
-          <a:xfrm>
-            <a:off x="457200" y="1295400"/>
-            <a:ext cx="4495800" cy="4525963"/>
-          </a:xfrm>
-        </p:spPr>
-        <p:txBody>
-          <a:bodyPr>
-            <a:normAutofit fontScale="92500"/>
-          </a:bodyPr>
-          <a:lstStyle/>
-          <a:p>
-            <a:r>
-              <a:rPr lang="en-US" sz="2400" dirty="0" smtClean="0">
-                <a:latin typeface="Arial" panose="020B0604020202020204" pitchFamily="34" charset="0"/>
-                <a:cs typeface="Arial" panose="020B0604020202020204" pitchFamily="34" charset="0"/>
-              </a:rPr>
-              <a:t>Because every aspect of a site’s “look” is defined by HTML/CSS – it is crucial to have a detailed sketch going in.</a:t>
-            </a:r>
-          </a:p>
-          <a:p>
-            <a:endParaRPr lang="en-US" sz="2400" dirty="0">
-              <a:latin typeface="Arial" panose="020B0604020202020204" pitchFamily="34" charset="0"/>
-              <a:cs typeface="Arial" panose="020B0604020202020204" pitchFamily="34" charset="0"/>
-            </a:endParaRPr>
-          </a:p>
-          <a:p>
-            <a:r>
-              <a:rPr lang="en-US" sz="2400" dirty="0" smtClean="0">
-                <a:latin typeface="Arial" panose="020B0604020202020204" pitchFamily="34" charset="0"/>
-                <a:cs typeface="Arial" panose="020B0604020202020204" pitchFamily="34" charset="0"/>
-              </a:rPr>
-              <a:t>Pay particular attention to the location of navigation bars, titles, headers, content, images, footers etc. </a:t>
-            </a:r>
-          </a:p>
-          <a:p>
-            <a:endParaRPr lang="en-US" sz="2400" dirty="0">
-              <a:latin typeface="Arial" panose="020B0604020202020204" pitchFamily="34" charset="0"/>
-              <a:cs typeface="Arial" panose="020B0604020202020204" pitchFamily="34" charset="0"/>
-            </a:endParaRPr>
-          </a:p>
-          <a:p>
-            <a:r>
-              <a:rPr lang="en-US" sz="2400" dirty="0" smtClean="0">
-                <a:latin typeface="Arial" panose="020B0604020202020204" pitchFamily="34" charset="0"/>
-                <a:cs typeface="Arial" panose="020B0604020202020204" pitchFamily="34" charset="0"/>
-              </a:rPr>
-              <a:t>When imagining alignments, in particular, be mindful of the </a:t>
-            </a:r>
-            <a:r>
-              <a:rPr lang="en-US" sz="2400" b="1" i="1" u="sng" dirty="0" smtClean="0">
-                <a:latin typeface="Arial" panose="020B0604020202020204" pitchFamily="34" charset="0"/>
-                <a:cs typeface="Arial" panose="020B0604020202020204" pitchFamily="34" charset="0"/>
-              </a:rPr>
-              <a:t>grid</a:t>
-            </a:r>
-            <a:r>
-              <a:rPr lang="en-US" sz="2400" i="1" dirty="0" smtClean="0">
-                <a:latin typeface="Arial" panose="020B0604020202020204" pitchFamily="34" charset="0"/>
-                <a:cs typeface="Arial" panose="020B0604020202020204" pitchFamily="34" charset="0"/>
-              </a:rPr>
-              <a:t> </a:t>
-            </a:r>
-          </a:p>
-          <a:p>
-            <a:pPr marL="0" indent="0">
-              <a:buNone/>
-            </a:pPr>
-            <a:endParaRPr lang="en-US" sz="2400" dirty="0">
-              <a:latin typeface="Arial" panose="020B0604020202020204" pitchFamily="34" charset="0"/>
-              <a:cs typeface="Arial" panose="020B0604020202020204" pitchFamily="34" charset="0"/>
-            </a:endParaRPr>
-          </a:p>
-          <a:p>
-            <a:pPr marL="0" indent="0">
-              <a:buNone/>
-            </a:pPr>
-            <a:endParaRPr lang="en-US" sz="2400" dirty="0" smtClean="0">
-              <a:latin typeface="Arial" panose="020B0604020202020204" pitchFamily="34" charset="0"/>
-              <a:cs typeface="Arial" panose="020B0604020202020204" pitchFamily="34" charset="0"/>
-            </a:endParaRPr>
-          </a:p>
-        </p:txBody>
-      </p:sp>
     </p:spTree>
     <p:extLst>
       <p:ext uri="{BB962C8B-B14F-4D97-AF65-F5344CB8AC3E}">
-        <p14:creationId xmlns:p14="http://schemas.microsoft.com/office/powerpoint/2010/main" val="2619485861"/>
+        <p14:creationId xmlns:p14="http://schemas.microsoft.com/office/powerpoint/2010/main" val="2514767528"/>
       </p:ext>
     </p:extLst>
   </p:cSld>
@@ -14417,14 +14434,67 @@
       </p:grpSpPr>
       <p:sp>
         <p:nvSpPr>
-          <p:cNvPr id="9" name="Flowchart: Process 8"/>
+          <p:cNvPr id="2" name="Title 1"/>
+          <p:cNvSpPr>
+            <a:spLocks noGrp="1"/>
+          </p:cNvSpPr>
+          <p:nvPr>
+            <p:ph type="title"/>
+          </p:nvPr>
+        </p:nvSpPr>
+        <p:spPr>
+          <a:xfrm>
+            <a:off x="304800" y="122238"/>
+            <a:ext cx="8229600" cy="639762"/>
+          </a:xfrm>
+        </p:spPr>
+        <p:txBody>
+          <a:bodyPr>
+            <a:noAutofit/>
+          </a:bodyPr>
+          <a:lstStyle/>
+          <a:p>
+            <a:pPr algn="l"/>
+            <a:r>
+              <a:rPr lang="en-US" sz="3600" b="1" dirty="0" smtClean="0">
+                <a:solidFill>
+                  <a:schemeClr val="bg1"/>
+                </a:solidFill>
+                <a:latin typeface="Arial" panose="020B0604020202020204" pitchFamily="34" charset="0"/>
+                <a:cs typeface="Arial" panose="020B0604020202020204" pitchFamily="34" charset="0"/>
+              </a:rPr>
+              <a:t>Bootstrap </a:t>
+            </a:r>
+            <a:r>
+              <a:rPr lang="en-US" sz="3600" b="1" dirty="0" err="1" smtClean="0">
+                <a:solidFill>
+                  <a:schemeClr val="bg1"/>
+                </a:solidFill>
+                <a:latin typeface="Arial" panose="020B0604020202020204" pitchFamily="34" charset="0"/>
+                <a:cs typeface="Arial" panose="020B0604020202020204" pitchFamily="34" charset="0"/>
+              </a:rPr>
+              <a:t>Glyphicons</a:t>
+            </a:r>
+            <a:endParaRPr lang="en-US" sz="3600" b="1" dirty="0">
+              <a:solidFill>
+                <a:schemeClr val="bg1"/>
+              </a:solidFill>
+              <a:latin typeface="Arial" panose="020B0604020202020204" pitchFamily="34" charset="0"/>
+              <a:cs typeface="Arial" panose="020B0604020202020204" pitchFamily="34" charset="0"/>
+            </a:endParaRPr>
+          </a:p>
+        </p:txBody>
+      </p:sp>
+      <p:sp>
+        <p:nvSpPr>
+          <p:cNvPr id="6" name="Flowchart: Process 5"/>
           <p:cNvSpPr/>
           <p:nvPr/>
         </p:nvSpPr>
         <p:spPr>
           <a:xfrm>
-            <a:off x="376381" y="3840481"/>
-            <a:ext cx="8447810" cy="45719"/>
+            <a:off x="-13855" y="838200"/>
+            <a:ext cx="9144000" cy="5791201"/>
           </a:xfrm>
           <a:prstGeom prst="flowChartProcess">
             <a:avLst/>
@@ -14461,55 +14531,162 @@
           </a:p>
         </p:txBody>
       </p:sp>
-      <p:sp>
-        <p:nvSpPr>
-          <p:cNvPr id="5" name="Title 1"/>
-          <p:cNvSpPr>
-            <a:spLocks noGrp="1"/>
-          </p:cNvSpPr>
-          <p:nvPr>
-            <p:ph type="ctrTitle"/>
-          </p:nvPr>
-        </p:nvSpPr>
-        <p:spPr>
-          <a:xfrm>
-            <a:off x="322695" y="2376249"/>
-            <a:ext cx="8610600" cy="1464232"/>
-          </a:xfrm>
-        </p:spPr>
-        <p:txBody>
-          <a:bodyPr>
-            <a:normAutofit/>
+      <p:pic>
+        <p:nvPicPr>
+          <p:cNvPr id="7" name="Picture 6"/>
+          <p:cNvPicPr>
+            <a:picLocks noChangeAspect="1"/>
+          </p:cNvPicPr>
+          <p:nvPr/>
+        </p:nvPicPr>
+        <p:blipFill>
+          <a:blip r:embed="rId2" cstate="print">
+            <a:extLst>
+              <a:ext uri="{28A0092B-C50C-407E-A947-70E740481C1C}">
+                <a14:useLocalDpi xmlns:a14="http://schemas.microsoft.com/office/drawing/2010/main" val="0"/>
+              </a:ext>
+            </a:extLst>
+          </a:blip>
+          <a:stretch>
+            <a:fillRect/>
+          </a:stretch>
+        </p:blipFill>
+        <p:spPr>
+          <a:xfrm>
+            <a:off x="7238999" y="6294884"/>
+            <a:ext cx="1891145" cy="310951"/>
+          </a:xfrm>
+          <a:prstGeom prst="rect">
+            <a:avLst/>
+          </a:prstGeom>
+        </p:spPr>
+      </p:pic>
+      <p:pic>
+        <p:nvPicPr>
+          <p:cNvPr id="12290" name="Picture 2"/>
+          <p:cNvPicPr>
+            <a:picLocks noChangeAspect="1" noChangeArrowheads="1"/>
+          </p:cNvPicPr>
+          <p:nvPr/>
+        </p:nvPicPr>
+        <p:blipFill>
+          <a:blip r:embed="rId3">
+            <a:extLst>
+              <a:ext uri="{28A0092B-C50C-407E-A947-70E740481C1C}">
+                <a14:useLocalDpi xmlns:a14="http://schemas.microsoft.com/office/drawing/2010/main" val="0"/>
+              </a:ext>
+            </a:extLst>
+          </a:blip>
+          <a:srcRect/>
+          <a:stretch>
+            <a:fillRect/>
+          </a:stretch>
+        </p:blipFill>
+        <p:spPr bwMode="auto">
+          <a:xfrm>
+            <a:off x="1306594" y="1038225"/>
+            <a:ext cx="6465806" cy="4295775"/>
+          </a:xfrm>
+          <a:prstGeom prst="rect">
+            <a:avLst/>
+          </a:prstGeom>
+          <a:noFill/>
+          <a:ln>
+            <a:noFill/>
+          </a:ln>
+          <a:extLst>
+            <a:ext uri="{909E8E84-426E-40DD-AFC4-6F175D3DCCD1}">
+              <a14:hiddenFill xmlns:a14="http://schemas.microsoft.com/office/drawing/2010/main">
+                <a:solidFill>
+                  <a:schemeClr val="accent1"/>
+                </a:solidFill>
+              </a14:hiddenFill>
+            </a:ext>
+            <a:ext uri="{91240B29-F687-4F45-9708-019B960494DF}">
+              <a14:hiddenLine xmlns:a14="http://schemas.microsoft.com/office/drawing/2010/main" w="9525">
+                <a:solidFill>
+                  <a:schemeClr val="tx1"/>
+                </a:solidFill>
+                <a:miter lim="800000"/>
+                <a:headEnd/>
+                <a:tailEnd/>
+              </a14:hiddenLine>
+            </a:ext>
+          </a:extLst>
+        </p:spPr>
+      </p:pic>
+      <p:sp>
+        <p:nvSpPr>
+          <p:cNvPr id="4" name="Rectangle 3"/>
+          <p:cNvSpPr/>
+          <p:nvPr/>
+        </p:nvSpPr>
+        <p:spPr>
+          <a:xfrm>
+            <a:off x="381000" y="5392489"/>
+            <a:ext cx="7010400" cy="646331"/>
+          </a:xfrm>
+          <a:prstGeom prst="rect">
+            <a:avLst/>
+          </a:prstGeom>
+        </p:spPr>
+        <p:txBody>
+          <a:bodyPr wrap="square">
+            <a:spAutoFit/>
           </a:bodyPr>
           <a:lstStyle/>
           <a:p>
-            <a:pPr algn="l"/>
-            <a:r>
-              <a:rPr lang="en-US" sz="6000" b="1" i="1" dirty="0" smtClean="0">
-                <a:solidFill>
-                  <a:schemeClr val="bg1"/>
-                </a:solidFill>
-                <a:latin typeface="Arial" panose="020B0604020202020204" pitchFamily="34" charset="0"/>
-                <a:ea typeface="Roboto" panose="02000000000000000000" pitchFamily="2" charset="0"/>
-                <a:cs typeface="Arial" panose="020B0604020202020204" pitchFamily="34" charset="0"/>
-              </a:rPr>
-              <a:t>Time to Build!</a:t>
-            </a:r>
-            <a:endParaRPr lang="en-US" sz="6000" b="1" i="1" dirty="0">
-              <a:solidFill>
-                <a:schemeClr val="bg1"/>
-              </a:solidFill>
-              <a:latin typeface="Arial" panose="020B0604020202020204" pitchFamily="34" charset="0"/>
-              <a:ea typeface="Roboto" panose="02000000000000000000" pitchFamily="2" charset="0"/>
-              <a:cs typeface="Arial" panose="020B0604020202020204" pitchFamily="34" charset="0"/>
-            </a:endParaRPr>
+            <a:r>
+              <a:rPr lang="en-US" b="1" dirty="0">
+                <a:latin typeface="Arial" panose="020B0604020202020204" pitchFamily="34" charset="0"/>
+                <a:cs typeface="Arial" panose="020B0604020202020204" pitchFamily="34" charset="0"/>
+              </a:rPr>
+              <a:t>Example: </a:t>
+            </a:r>
+          </a:p>
+          <a:p>
+            <a:r>
+              <a:rPr lang="en-US" dirty="0">
+                <a:latin typeface="Arial" panose="020B0604020202020204" pitchFamily="34" charset="0"/>
+                <a:cs typeface="Arial" panose="020B0604020202020204" pitchFamily="34" charset="0"/>
+              </a:rPr>
+              <a:t>&lt;span class="</a:t>
+            </a:r>
+            <a:r>
+              <a:rPr lang="en-US" dirty="0" err="1">
+                <a:latin typeface="Arial" panose="020B0604020202020204" pitchFamily="34" charset="0"/>
+                <a:cs typeface="Arial" panose="020B0604020202020204" pitchFamily="34" charset="0"/>
+              </a:rPr>
+              <a:t>glyphicon</a:t>
+            </a:r>
+            <a:r>
+              <a:rPr lang="en-US" dirty="0">
+                <a:latin typeface="Arial" panose="020B0604020202020204" pitchFamily="34" charset="0"/>
+                <a:cs typeface="Arial" panose="020B0604020202020204" pitchFamily="34" charset="0"/>
+              </a:rPr>
+              <a:t> </a:t>
+            </a:r>
+            <a:r>
+              <a:rPr lang="en-US" dirty="0" err="1">
+                <a:latin typeface="Arial" panose="020B0604020202020204" pitchFamily="34" charset="0"/>
+                <a:cs typeface="Arial" panose="020B0604020202020204" pitchFamily="34" charset="0"/>
+              </a:rPr>
+              <a:t>glyphicon</a:t>
+            </a:r>
+            <a:r>
+              <a:rPr lang="en-US" dirty="0">
+                <a:latin typeface="Arial" panose="020B0604020202020204" pitchFamily="34" charset="0"/>
+                <a:cs typeface="Arial" panose="020B0604020202020204" pitchFamily="34" charset="0"/>
+              </a:rPr>
+              <a:t>-certificate"&gt;&lt;/span&gt;</a:t>
+            </a:r>
           </a:p>
         </p:txBody>
       </p:sp>
     </p:spTree>
     <p:extLst>
       <p:ext uri="{BB962C8B-B14F-4D97-AF65-F5344CB8AC3E}">
-        <p14:creationId xmlns:p14="http://schemas.microsoft.com/office/powerpoint/2010/main" val="3542198205"/>
+        <p14:creationId xmlns:p14="http://schemas.microsoft.com/office/powerpoint/2010/main" val="2046804525"/>
       </p:ext>
     </p:extLst>
   </p:cSld>
@@ -14545,14 +14722,67 @@
       </p:grpSpPr>
       <p:sp>
         <p:nvSpPr>
-          <p:cNvPr id="9" name="Flowchart: Process 8"/>
+          <p:cNvPr id="2" name="Title 1"/>
+          <p:cNvSpPr>
+            <a:spLocks noGrp="1"/>
+          </p:cNvSpPr>
+          <p:nvPr>
+            <p:ph type="title"/>
+          </p:nvPr>
+        </p:nvSpPr>
+        <p:spPr>
+          <a:xfrm>
+            <a:off x="304800" y="122238"/>
+            <a:ext cx="8229600" cy="639762"/>
+          </a:xfrm>
+        </p:spPr>
+        <p:txBody>
+          <a:bodyPr>
+            <a:noAutofit/>
+          </a:bodyPr>
+          <a:lstStyle/>
+          <a:p>
+            <a:pPr algn="l"/>
+            <a:r>
+              <a:rPr lang="en-US" sz="3600" b="1" dirty="0" smtClean="0">
+                <a:solidFill>
+                  <a:schemeClr val="bg1"/>
+                </a:solidFill>
+                <a:latin typeface="Arial" panose="020B0604020202020204" pitchFamily="34" charset="0"/>
+                <a:cs typeface="Arial" panose="020B0604020202020204" pitchFamily="34" charset="0"/>
+              </a:rPr>
+              <a:t>Bootstrap </a:t>
+            </a:r>
+            <a:r>
+              <a:rPr lang="en-US" sz="3600" b="1" dirty="0" smtClean="0">
+                <a:solidFill>
+                  <a:schemeClr val="bg1"/>
+                </a:solidFill>
+                <a:latin typeface="Arial" panose="020B0604020202020204" pitchFamily="34" charset="0"/>
+                <a:cs typeface="Arial" panose="020B0604020202020204" pitchFamily="34" charset="0"/>
+              </a:rPr>
+              <a:t>Tables</a:t>
+            </a:r>
+            <a:endParaRPr lang="en-US" sz="3600" b="1" dirty="0">
+              <a:solidFill>
+                <a:schemeClr val="bg1"/>
+              </a:solidFill>
+              <a:latin typeface="Arial" panose="020B0604020202020204" pitchFamily="34" charset="0"/>
+              <a:cs typeface="Arial" panose="020B0604020202020204" pitchFamily="34" charset="0"/>
+            </a:endParaRPr>
+          </a:p>
+        </p:txBody>
+      </p:sp>
+      <p:sp>
+        <p:nvSpPr>
+          <p:cNvPr id="6" name="Flowchart: Process 5"/>
           <p:cNvSpPr/>
           <p:nvPr/>
         </p:nvSpPr>
         <p:spPr>
           <a:xfrm>
-            <a:off x="376381" y="3840481"/>
-            <a:ext cx="8447810" cy="45719"/>
+            <a:off x="-13855" y="838200"/>
+            <a:ext cx="9144000" cy="5791201"/>
           </a:xfrm>
           <a:prstGeom prst="flowChartProcess">
             <a:avLst/>
@@ -14589,55 +14819,344 @@
           </a:p>
         </p:txBody>
       </p:sp>
-      <p:sp>
-        <p:nvSpPr>
-          <p:cNvPr id="5" name="Title 1"/>
-          <p:cNvSpPr>
-            <a:spLocks noGrp="1"/>
-          </p:cNvSpPr>
-          <p:nvPr>
-            <p:ph type="ctrTitle"/>
-          </p:nvPr>
-        </p:nvSpPr>
-        <p:spPr>
-          <a:xfrm>
-            <a:off x="322695" y="2376249"/>
-            <a:ext cx="8610600" cy="1464232"/>
-          </a:xfrm>
-        </p:spPr>
-        <p:txBody>
-          <a:bodyPr>
-            <a:normAutofit/>
+      <p:pic>
+        <p:nvPicPr>
+          <p:cNvPr id="7" name="Picture 6"/>
+          <p:cNvPicPr>
+            <a:picLocks noChangeAspect="1"/>
+          </p:cNvPicPr>
+          <p:nvPr/>
+        </p:nvPicPr>
+        <p:blipFill>
+          <a:blip r:embed="rId2" cstate="print">
+            <a:extLst>
+              <a:ext uri="{28A0092B-C50C-407E-A947-70E740481C1C}">
+                <a14:useLocalDpi xmlns:a14="http://schemas.microsoft.com/office/drawing/2010/main" val="0"/>
+              </a:ext>
+            </a:extLst>
+          </a:blip>
+          <a:stretch>
+            <a:fillRect/>
+          </a:stretch>
+        </p:blipFill>
+        <p:spPr>
+          <a:xfrm>
+            <a:off x="7238999" y="6294884"/>
+            <a:ext cx="1891145" cy="310951"/>
+          </a:xfrm>
+          <a:prstGeom prst="rect">
+            <a:avLst/>
+          </a:prstGeom>
+        </p:spPr>
+      </p:pic>
+      <p:sp>
+        <p:nvSpPr>
+          <p:cNvPr id="4" name="Rectangle 3"/>
+          <p:cNvSpPr/>
+          <p:nvPr/>
+        </p:nvSpPr>
+        <p:spPr>
+          <a:xfrm>
+            <a:off x="609600" y="2667000"/>
+            <a:ext cx="7010400" cy="3970318"/>
+          </a:xfrm>
+          <a:prstGeom prst="rect">
+            <a:avLst/>
+          </a:prstGeom>
+        </p:spPr>
+        <p:txBody>
+          <a:bodyPr wrap="square">
+            <a:spAutoFit/>
           </a:bodyPr>
           <a:lstStyle/>
           <a:p>
-            <a:pPr algn="l"/>
-            <a:r>
-              <a:rPr lang="en-US" sz="6000" b="1" i="1" dirty="0" smtClean="0">
-                <a:solidFill>
-                  <a:schemeClr val="bg1"/>
-                </a:solidFill>
-                <a:latin typeface="Arial" panose="020B0604020202020204" pitchFamily="34" charset="0"/>
-                <a:ea typeface="Roboto" panose="02000000000000000000" pitchFamily="2" charset="0"/>
-                <a:cs typeface="Arial" panose="020B0604020202020204" pitchFamily="34" charset="0"/>
-              </a:rPr>
-              <a:t>Questions?</a:t>
-            </a:r>
-            <a:endParaRPr lang="en-US" sz="6000" b="1" i="1" dirty="0">
-              <a:solidFill>
-                <a:schemeClr val="bg1"/>
-              </a:solidFill>
+            <a:r>
+              <a:rPr lang="en-US" b="1" dirty="0">
+                <a:latin typeface="Arial" panose="020B0604020202020204" pitchFamily="34" charset="0"/>
+                <a:cs typeface="Arial" panose="020B0604020202020204" pitchFamily="34" charset="0"/>
+              </a:rPr>
+              <a:t>Example: </a:t>
+            </a:r>
+          </a:p>
+          <a:p>
+            <a:r>
+              <a:rPr lang="en-US" dirty="0"/>
+              <a:t>&lt;table</a:t>
+            </a:r>
+            <a:r>
+              <a:rPr lang="en-US" dirty="0"/>
+              <a:t> </a:t>
+            </a:r>
+            <a:r>
+              <a:rPr lang="en-US" dirty="0"/>
+              <a:t>class="table table-striped</a:t>
+            </a:r>
+            <a:r>
+              <a:rPr lang="en-US" dirty="0" smtClean="0"/>
+              <a:t>"&gt;</a:t>
+            </a:r>
+          </a:p>
+          <a:p>
+            <a:r>
+              <a:rPr lang="en-US" dirty="0"/>
+              <a:t>	</a:t>
+            </a:r>
+            <a:r>
+              <a:rPr lang="en-US" dirty="0" smtClean="0"/>
+              <a:t>&lt;</a:t>
+            </a:r>
+            <a:r>
+              <a:rPr lang="en-US" dirty="0" err="1" smtClean="0"/>
+              <a:t>tr</a:t>
+            </a:r>
+            <a:r>
+              <a:rPr lang="en-US" dirty="0" smtClean="0"/>
+              <a:t>&gt; </a:t>
+            </a:r>
+          </a:p>
+          <a:p>
+            <a:r>
+              <a:rPr lang="en-US" dirty="0" smtClean="0"/>
+              <a:t>		&lt;</a:t>
+            </a:r>
+            <a:r>
+              <a:rPr lang="en-US" dirty="0" err="1" smtClean="0"/>
+              <a:t>th</a:t>
+            </a:r>
+            <a:r>
+              <a:rPr lang="en-US" dirty="0" smtClean="0"/>
+              <a:t>&gt;First Name&lt;/</a:t>
+            </a:r>
+            <a:r>
+              <a:rPr lang="en-US" dirty="0" err="1" smtClean="0"/>
+              <a:t>th</a:t>
+            </a:r>
+            <a:r>
+              <a:rPr lang="en-US" dirty="0" smtClean="0"/>
+              <a:t>&gt;</a:t>
+            </a:r>
+          </a:p>
+          <a:p>
+            <a:r>
+              <a:rPr lang="en-US" dirty="0"/>
+              <a:t>	</a:t>
+            </a:r>
+            <a:r>
+              <a:rPr lang="en-US" dirty="0" smtClean="0"/>
+              <a:t>	&lt;</a:t>
+            </a:r>
+            <a:r>
+              <a:rPr lang="en-US" dirty="0" err="1" smtClean="0"/>
+              <a:t>th</a:t>
+            </a:r>
+            <a:r>
+              <a:rPr lang="en-US" dirty="0" smtClean="0"/>
+              <a:t>&gt;Last </a:t>
+            </a:r>
+            <a:r>
+              <a:rPr lang="en-US" dirty="0"/>
+              <a:t>Name&lt;/</a:t>
+            </a:r>
+            <a:r>
+              <a:rPr lang="en-US" dirty="0" err="1"/>
+              <a:t>th</a:t>
+            </a:r>
+            <a:r>
+              <a:rPr lang="en-US" dirty="0"/>
+              <a:t>&gt;</a:t>
+            </a:r>
+          </a:p>
+          <a:p>
+            <a:r>
+              <a:rPr lang="en-US" dirty="0"/>
+              <a:t>	</a:t>
+            </a:r>
+            <a:r>
+              <a:rPr lang="en-US" dirty="0" smtClean="0"/>
+              <a:t>	&lt;</a:t>
+            </a:r>
+            <a:r>
+              <a:rPr lang="en-US" dirty="0" err="1" smtClean="0"/>
+              <a:t>th</a:t>
+            </a:r>
+            <a:r>
+              <a:rPr lang="en-US" dirty="0" smtClean="0"/>
+              <a:t>&gt;Username&lt;/</a:t>
+            </a:r>
+            <a:r>
+              <a:rPr lang="en-US" dirty="0" err="1"/>
+              <a:t>th</a:t>
+            </a:r>
+            <a:r>
+              <a:rPr lang="en-US" dirty="0" smtClean="0"/>
+              <a:t>&gt;</a:t>
+            </a:r>
+            <a:endParaRPr lang="en-US" dirty="0"/>
+          </a:p>
+          <a:p>
+            <a:r>
+              <a:rPr lang="en-US" dirty="0" smtClean="0"/>
+              <a:t>	&lt;/</a:t>
+            </a:r>
+            <a:r>
+              <a:rPr lang="en-US" dirty="0" err="1" smtClean="0"/>
+              <a:t>tr</a:t>
+            </a:r>
+            <a:r>
+              <a:rPr lang="en-US" dirty="0" smtClean="0"/>
+              <a:t>&gt;</a:t>
+            </a:r>
+          </a:p>
+          <a:p>
+            <a:r>
+              <a:rPr lang="en-US" dirty="0"/>
+              <a:t>	</a:t>
+            </a:r>
+            <a:r>
+              <a:rPr lang="en-US" dirty="0" smtClean="0"/>
+              <a:t>&lt;</a:t>
+            </a:r>
+            <a:r>
+              <a:rPr lang="en-US" dirty="0" err="1" smtClean="0"/>
+              <a:t>tr</a:t>
+            </a:r>
+            <a:r>
+              <a:rPr lang="en-US" dirty="0" smtClean="0"/>
+              <a:t>&gt;</a:t>
+            </a:r>
+          </a:p>
+          <a:p>
+            <a:r>
+              <a:rPr lang="en-US" dirty="0"/>
+              <a:t>	</a:t>
+            </a:r>
+            <a:r>
+              <a:rPr lang="en-US" dirty="0" smtClean="0"/>
+              <a:t>	&lt;td&gt;Mark&lt;/td&gt;</a:t>
+            </a:r>
+          </a:p>
+          <a:p>
+            <a:r>
+              <a:rPr lang="en-US" dirty="0" smtClean="0"/>
+              <a:t>		&lt;td&gt;Otto&lt;/td&gt;</a:t>
+            </a:r>
+          </a:p>
+          <a:p>
+            <a:r>
+              <a:rPr lang="en-US" dirty="0"/>
+              <a:t>	</a:t>
+            </a:r>
+            <a:r>
+              <a:rPr lang="en-US" dirty="0" smtClean="0"/>
+              <a:t>	&lt;/td&gt;@</a:t>
+            </a:r>
+            <a:r>
+              <a:rPr lang="en-US" dirty="0" err="1" smtClean="0"/>
+              <a:t>mdo</a:t>
+            </a:r>
+            <a:r>
+              <a:rPr lang="en-US" dirty="0" smtClean="0"/>
+              <a:t>&lt;/td&gt;</a:t>
+            </a:r>
+          </a:p>
+          <a:p>
+            <a:r>
+              <a:rPr lang="en-US" dirty="0"/>
+              <a:t>	</a:t>
+            </a:r>
+            <a:r>
+              <a:rPr lang="en-US" dirty="0" smtClean="0"/>
+              <a:t>&lt;/</a:t>
+            </a:r>
+            <a:r>
+              <a:rPr lang="en-US" dirty="0" err="1" smtClean="0"/>
+              <a:t>tr</a:t>
+            </a:r>
+            <a:r>
+              <a:rPr lang="en-US" dirty="0" smtClean="0"/>
+              <a:t>&gt;</a:t>
+            </a:r>
+          </a:p>
+          <a:p>
+            <a:r>
+              <a:rPr lang="en-US" dirty="0" smtClean="0"/>
+              <a:t>	…	</a:t>
+            </a:r>
+          </a:p>
+          <a:p>
+            <a:r>
+              <a:rPr lang="en-US" dirty="0" smtClean="0"/>
+              <a:t>&lt;/</a:t>
+            </a:r>
+            <a:r>
+              <a:rPr lang="en-US" dirty="0"/>
+              <a:t>table&gt;</a:t>
+            </a:r>
+            <a:endParaRPr lang="en-US" dirty="0">
               <a:latin typeface="Arial" panose="020B0604020202020204" pitchFamily="34" charset="0"/>
-              <a:ea typeface="Roboto" panose="02000000000000000000" pitchFamily="2" charset="0"/>
               <a:cs typeface="Arial" panose="020B0604020202020204" pitchFamily="34" charset="0"/>
             </a:endParaRPr>
           </a:p>
         </p:txBody>
       </p:sp>
+      <p:pic>
+        <p:nvPicPr>
+          <p:cNvPr id="13314" name="Picture 2"/>
+          <p:cNvPicPr>
+            <a:picLocks noChangeAspect="1" noChangeArrowheads="1"/>
+          </p:cNvPicPr>
+          <p:nvPr/>
+        </p:nvPicPr>
+        <p:blipFill>
+          <a:blip r:embed="rId3">
+            <a:extLst>
+              <a:ext uri="{28A0092B-C50C-407E-A947-70E740481C1C}">
+                <a14:useLocalDpi xmlns:a14="http://schemas.microsoft.com/office/drawing/2010/main" val="0"/>
+              </a:ext>
+            </a:extLst>
+          </a:blip>
+          <a:srcRect/>
+          <a:stretch>
+            <a:fillRect/>
+          </a:stretch>
+        </p:blipFill>
+        <p:spPr bwMode="auto">
+          <a:xfrm>
+            <a:off x="581025" y="990600"/>
+            <a:ext cx="7981950" cy="1571625"/>
+          </a:xfrm>
+          <a:prstGeom prst="rect">
+            <a:avLst/>
+          </a:prstGeom>
+          <a:noFill/>
+          <a:ln>
+            <a:noFill/>
+          </a:ln>
+          <a:extLst>
+            <a:ext uri="{909E8E84-426E-40DD-AFC4-6F175D3DCCD1}">
+              <a14:hiddenFill xmlns:a14="http://schemas.microsoft.com/office/drawing/2010/main">
+                <a:solidFill>
+                  <a:schemeClr val="accent1"/>
+                </a:solidFill>
+              </a14:hiddenFill>
+            </a:ext>
+            <a:ext uri="{91240B29-F687-4F45-9708-019B960494DF}">
+              <a14:hiddenLine xmlns:a14="http://schemas.microsoft.com/office/drawing/2010/main" w="9525">
+                <a:solidFill>
+                  <a:schemeClr val="tx1"/>
+                </a:solidFill>
+                <a:miter lim="800000"/>
+                <a:headEnd/>
+                <a:tailEnd/>
+              </a14:hiddenLine>
+            </a:ext>
+          </a:extLst>
+        </p:spPr>
+      </p:pic>
     </p:spTree>
     <p:extLst>
       <p:ext uri="{BB962C8B-B14F-4D97-AF65-F5344CB8AC3E}">
-        <p14:creationId xmlns:p14="http://schemas.microsoft.com/office/powerpoint/2010/main" val="4020731822"/>
+        <p14:creationId xmlns:p14="http://schemas.microsoft.com/office/powerpoint/2010/main" val="1260715306"/>
       </p:ext>
     </p:extLst>
   </p:cSld>
@@ -14673,6 +15192,697 @@
       </p:grpSpPr>
       <p:sp>
         <p:nvSpPr>
+          <p:cNvPr id="2" name="Title 1"/>
+          <p:cNvSpPr>
+            <a:spLocks noGrp="1"/>
+          </p:cNvSpPr>
+          <p:nvPr>
+            <p:ph type="title"/>
+          </p:nvPr>
+        </p:nvSpPr>
+        <p:spPr>
+          <a:xfrm>
+            <a:off x="304800" y="122238"/>
+            <a:ext cx="8229600" cy="639762"/>
+          </a:xfrm>
+        </p:spPr>
+        <p:txBody>
+          <a:bodyPr>
+            <a:noAutofit/>
+          </a:bodyPr>
+          <a:lstStyle/>
+          <a:p>
+            <a:pPr algn="l"/>
+            <a:r>
+              <a:rPr lang="en-US" sz="3600" b="1" dirty="0" smtClean="0">
+                <a:solidFill>
+                  <a:schemeClr val="bg1"/>
+                </a:solidFill>
+                <a:latin typeface="Arial" panose="020B0604020202020204" pitchFamily="34" charset="0"/>
+                <a:cs typeface="Arial" panose="020B0604020202020204" pitchFamily="34" charset="0"/>
+              </a:rPr>
+              <a:t>Bootstrap </a:t>
+            </a:r>
+            <a:r>
+              <a:rPr lang="en-US" sz="3600" b="1" dirty="0" smtClean="0">
+                <a:solidFill>
+                  <a:schemeClr val="bg1"/>
+                </a:solidFill>
+                <a:latin typeface="Arial" panose="020B0604020202020204" pitchFamily="34" charset="0"/>
+                <a:cs typeface="Arial" panose="020B0604020202020204" pitchFamily="34" charset="0"/>
+              </a:rPr>
+              <a:t>Forms</a:t>
+            </a:r>
+            <a:endParaRPr lang="en-US" sz="3600" b="1" dirty="0">
+              <a:solidFill>
+                <a:schemeClr val="bg1"/>
+              </a:solidFill>
+              <a:latin typeface="Arial" panose="020B0604020202020204" pitchFamily="34" charset="0"/>
+              <a:cs typeface="Arial" panose="020B0604020202020204" pitchFamily="34" charset="0"/>
+            </a:endParaRPr>
+          </a:p>
+        </p:txBody>
+      </p:sp>
+      <p:sp>
+        <p:nvSpPr>
+          <p:cNvPr id="6" name="Flowchart: Process 5"/>
+          <p:cNvSpPr/>
+          <p:nvPr/>
+        </p:nvSpPr>
+        <p:spPr>
+          <a:xfrm>
+            <a:off x="-13855" y="838200"/>
+            <a:ext cx="9144000" cy="5791201"/>
+          </a:xfrm>
+          <a:prstGeom prst="flowChartProcess">
+            <a:avLst/>
+          </a:prstGeom>
+          <a:solidFill>
+            <a:schemeClr val="bg1"/>
+          </a:solidFill>
+          <a:ln>
+            <a:noFill/>
+          </a:ln>
+        </p:spPr>
+        <p:style>
+          <a:lnRef idx="2">
+            <a:schemeClr val="accent1">
+              <a:shade val="50000"/>
+            </a:schemeClr>
+          </a:lnRef>
+          <a:fillRef idx="1">
+            <a:schemeClr val="accent1"/>
+          </a:fillRef>
+          <a:effectRef idx="0">
+            <a:schemeClr val="accent1"/>
+          </a:effectRef>
+          <a:fontRef idx="minor">
+            <a:schemeClr val="lt1"/>
+          </a:fontRef>
+        </p:style>
+        <p:txBody>
+          <a:bodyPr rtlCol="0" anchor="ctr"/>
+          <a:lstStyle/>
+          <a:p>
+            <a:pPr algn="ctr"/>
+            <a:endParaRPr lang="en-US"/>
+          </a:p>
+        </p:txBody>
+      </p:sp>
+      <p:pic>
+        <p:nvPicPr>
+          <p:cNvPr id="7" name="Picture 6"/>
+          <p:cNvPicPr>
+            <a:picLocks noChangeAspect="1"/>
+          </p:cNvPicPr>
+          <p:nvPr/>
+        </p:nvPicPr>
+        <p:blipFill>
+          <a:blip r:embed="rId2" cstate="print">
+            <a:extLst>
+              <a:ext uri="{28A0092B-C50C-407E-A947-70E740481C1C}">
+                <a14:useLocalDpi xmlns:a14="http://schemas.microsoft.com/office/drawing/2010/main" val="0"/>
+              </a:ext>
+            </a:extLst>
+          </a:blip>
+          <a:stretch>
+            <a:fillRect/>
+          </a:stretch>
+        </p:blipFill>
+        <p:spPr>
+          <a:xfrm>
+            <a:off x="7238999" y="6294884"/>
+            <a:ext cx="1891145" cy="310951"/>
+          </a:xfrm>
+          <a:prstGeom prst="rect">
+            <a:avLst/>
+          </a:prstGeom>
+        </p:spPr>
+      </p:pic>
+      <p:pic>
+        <p:nvPicPr>
+          <p:cNvPr id="14338" name="Picture 2"/>
+          <p:cNvPicPr>
+            <a:picLocks noChangeAspect="1" noChangeArrowheads="1"/>
+          </p:cNvPicPr>
+          <p:nvPr/>
+        </p:nvPicPr>
+        <p:blipFill>
+          <a:blip r:embed="rId3">
+            <a:extLst>
+              <a:ext uri="{28A0092B-C50C-407E-A947-70E740481C1C}">
+                <a14:useLocalDpi xmlns:a14="http://schemas.microsoft.com/office/drawing/2010/main" val="0"/>
+              </a:ext>
+            </a:extLst>
+          </a:blip>
+          <a:srcRect/>
+          <a:stretch>
+            <a:fillRect/>
+          </a:stretch>
+        </p:blipFill>
+        <p:spPr bwMode="auto">
+          <a:xfrm>
+            <a:off x="1344855" y="3436945"/>
+            <a:ext cx="5826772" cy="3040055"/>
+          </a:xfrm>
+          <a:prstGeom prst="rect">
+            <a:avLst/>
+          </a:prstGeom>
+          <a:noFill/>
+          <a:ln>
+            <a:noFill/>
+          </a:ln>
+          <a:extLst>
+            <a:ext uri="{909E8E84-426E-40DD-AFC4-6F175D3DCCD1}">
+              <a14:hiddenFill xmlns:a14="http://schemas.microsoft.com/office/drawing/2010/main">
+                <a:solidFill>
+                  <a:schemeClr val="accent1"/>
+                </a:solidFill>
+              </a14:hiddenFill>
+            </a:ext>
+            <a:ext uri="{91240B29-F687-4F45-9708-019B960494DF}">
+              <a14:hiddenLine xmlns:a14="http://schemas.microsoft.com/office/drawing/2010/main" w="9525">
+                <a:solidFill>
+                  <a:schemeClr val="tx1"/>
+                </a:solidFill>
+                <a:miter lim="800000"/>
+                <a:headEnd/>
+                <a:tailEnd/>
+              </a14:hiddenLine>
+            </a:ext>
+          </a:extLst>
+        </p:spPr>
+      </p:pic>
+      <p:pic>
+        <p:nvPicPr>
+          <p:cNvPr id="14339" name="Picture 3"/>
+          <p:cNvPicPr>
+            <a:picLocks noChangeAspect="1" noChangeArrowheads="1"/>
+          </p:cNvPicPr>
+          <p:nvPr/>
+        </p:nvPicPr>
+        <p:blipFill>
+          <a:blip r:embed="rId4">
+            <a:extLst>
+              <a:ext uri="{28A0092B-C50C-407E-A947-70E740481C1C}">
+                <a14:useLocalDpi xmlns:a14="http://schemas.microsoft.com/office/drawing/2010/main" val="0"/>
+              </a:ext>
+            </a:extLst>
+          </a:blip>
+          <a:srcRect/>
+          <a:stretch>
+            <a:fillRect/>
+          </a:stretch>
+        </p:blipFill>
+        <p:spPr bwMode="auto">
+          <a:xfrm>
+            <a:off x="1241198" y="1077905"/>
+            <a:ext cx="6034087" cy="2283559"/>
+          </a:xfrm>
+          <a:prstGeom prst="rect">
+            <a:avLst/>
+          </a:prstGeom>
+          <a:noFill/>
+          <a:ln>
+            <a:noFill/>
+          </a:ln>
+          <a:extLst>
+            <a:ext uri="{909E8E84-426E-40DD-AFC4-6F175D3DCCD1}">
+              <a14:hiddenFill xmlns:a14="http://schemas.microsoft.com/office/drawing/2010/main">
+                <a:solidFill>
+                  <a:schemeClr val="accent1"/>
+                </a:solidFill>
+              </a14:hiddenFill>
+            </a:ext>
+            <a:ext uri="{91240B29-F687-4F45-9708-019B960494DF}">
+              <a14:hiddenLine xmlns:a14="http://schemas.microsoft.com/office/drawing/2010/main" w="9525">
+                <a:solidFill>
+                  <a:schemeClr val="tx1"/>
+                </a:solidFill>
+                <a:miter lim="800000"/>
+                <a:headEnd/>
+                <a:tailEnd/>
+              </a14:hiddenLine>
+            </a:ext>
+          </a:extLst>
+        </p:spPr>
+      </p:pic>
+    </p:spTree>
+    <p:extLst>
+      <p:ext uri="{BB962C8B-B14F-4D97-AF65-F5344CB8AC3E}">
+        <p14:creationId xmlns:p14="http://schemas.microsoft.com/office/powerpoint/2010/main" val="3321868230"/>
+      </p:ext>
+    </p:extLst>
+  </p:cSld>
+  <p:clrMapOvr>
+    <a:masterClrMapping/>
+  </p:clrMapOvr>
+  <p:timing>
+    <p:tnLst>
+      <p:par>
+        <p:cTn id="1" dur="indefinite" restart="never" nodeType="tmRoot"/>
+      </p:par>
+    </p:tnLst>
+  </p:timing>
+</p:sld>
+</file>
+
+<file path=ppt/slides/slide46.xml><?xml version="1.0" encoding="utf-8"?>
+<p:sld xmlns:a="http://schemas.openxmlformats.org/drawingml/2006/main" xmlns:r="http://schemas.openxmlformats.org/officeDocument/2006/relationships" xmlns:p="http://schemas.openxmlformats.org/presentationml/2006/main">
+  <p:cSld>
+    <p:spTree>
+      <p:nvGrpSpPr>
+        <p:cNvPr id="1" name=""/>
+        <p:cNvGrpSpPr/>
+        <p:nvPr/>
+      </p:nvGrpSpPr>
+      <p:grpSpPr>
+        <a:xfrm>
+          <a:off x="0" y="0"/>
+          <a:ext cx="0" cy="0"/>
+          <a:chOff x="0" y="0"/>
+          <a:chExt cx="0" cy="0"/>
+        </a:xfrm>
+      </p:grpSpPr>
+      <p:sp>
+        <p:nvSpPr>
+          <p:cNvPr id="9" name="Flowchart: Process 8"/>
+          <p:cNvSpPr/>
+          <p:nvPr/>
+        </p:nvSpPr>
+        <p:spPr>
+          <a:xfrm>
+            <a:off x="376381" y="3138701"/>
+            <a:ext cx="8447810" cy="45719"/>
+          </a:xfrm>
+          <a:prstGeom prst="flowChartProcess">
+            <a:avLst/>
+          </a:prstGeom>
+          <a:solidFill>
+            <a:schemeClr val="bg1"/>
+          </a:solidFill>
+          <a:ln>
+            <a:noFill/>
+          </a:ln>
+        </p:spPr>
+        <p:style>
+          <a:lnRef idx="2">
+            <a:schemeClr val="accent1">
+              <a:shade val="50000"/>
+            </a:schemeClr>
+          </a:lnRef>
+          <a:fillRef idx="1">
+            <a:schemeClr val="accent1"/>
+          </a:fillRef>
+          <a:effectRef idx="0">
+            <a:schemeClr val="accent1"/>
+          </a:effectRef>
+          <a:fontRef idx="minor">
+            <a:schemeClr val="lt1"/>
+          </a:fontRef>
+        </p:style>
+        <p:txBody>
+          <a:bodyPr rtlCol="0" anchor="ctr"/>
+          <a:lstStyle/>
+          <a:p>
+            <a:pPr algn="ctr"/>
+            <a:endParaRPr lang="en-US"/>
+          </a:p>
+        </p:txBody>
+      </p:sp>
+      <p:sp>
+        <p:nvSpPr>
+          <p:cNvPr id="5" name="Title 1"/>
+          <p:cNvSpPr>
+            <a:spLocks noGrp="1"/>
+          </p:cNvSpPr>
+          <p:nvPr>
+            <p:ph type="ctrTitle"/>
+          </p:nvPr>
+        </p:nvSpPr>
+        <p:spPr>
+          <a:xfrm>
+            <a:off x="322695" y="1674469"/>
+            <a:ext cx="8610600" cy="1464232"/>
+          </a:xfrm>
+        </p:spPr>
+        <p:txBody>
+          <a:bodyPr>
+            <a:normAutofit/>
+          </a:bodyPr>
+          <a:lstStyle/>
+          <a:p>
+            <a:pPr algn="l"/>
+            <a:r>
+              <a:rPr lang="en-US" sz="6000" b="1" i="1" dirty="0" smtClean="0">
+                <a:solidFill>
+                  <a:schemeClr val="bg1"/>
+                </a:solidFill>
+                <a:latin typeface="Arial" panose="020B0604020202020204" pitchFamily="34" charset="0"/>
+                <a:ea typeface="Roboto" panose="02000000000000000000" pitchFamily="2" charset="0"/>
+                <a:cs typeface="Arial" panose="020B0604020202020204" pitchFamily="34" charset="0"/>
+              </a:rPr>
+              <a:t>Time to Build!</a:t>
+            </a:r>
+            <a:endParaRPr lang="en-US" sz="6000" b="1" i="1" dirty="0">
+              <a:solidFill>
+                <a:schemeClr val="bg1"/>
+              </a:solidFill>
+              <a:latin typeface="Arial" panose="020B0604020202020204" pitchFamily="34" charset="0"/>
+              <a:ea typeface="Roboto" panose="02000000000000000000" pitchFamily="2" charset="0"/>
+              <a:cs typeface="Arial" panose="020B0604020202020204" pitchFamily="34" charset="0"/>
+            </a:endParaRPr>
+          </a:p>
+        </p:txBody>
+      </p:sp>
+      <p:sp>
+        <p:nvSpPr>
+          <p:cNvPr id="6" name="Title 1"/>
+          <p:cNvSpPr txBox="1">
+            <a:spLocks/>
+          </p:cNvSpPr>
+          <p:nvPr/>
+        </p:nvSpPr>
+        <p:spPr>
+          <a:xfrm>
+            <a:off x="381000" y="3370175"/>
+            <a:ext cx="8458200" cy="1887625"/>
+          </a:xfrm>
+          <a:prstGeom prst="rect">
+            <a:avLst/>
+          </a:prstGeom>
+        </p:spPr>
+        <p:txBody>
+          <a:bodyPr vert="horz" lIns="91440" tIns="45720" rIns="91440" bIns="45720" rtlCol="0" anchor="ctr">
+            <a:normAutofit lnSpcReduction="10000"/>
+          </a:bodyPr>
+          <a:lstStyle>
+            <a:lvl1pPr algn="ctr" defTabSz="914400" rtl="0" eaLnBrk="1" latinLnBrk="0" hangingPunct="1">
+              <a:spcBef>
+                <a:spcPct val="0"/>
+              </a:spcBef>
+              <a:buNone/>
+              <a:defRPr sz="4400" kern="1200">
+                <a:solidFill>
+                  <a:schemeClr val="tx1"/>
+                </a:solidFill>
+                <a:latin typeface="+mj-lt"/>
+                <a:ea typeface="+mj-ea"/>
+                <a:cs typeface="+mj-cs"/>
+              </a:defRPr>
+            </a:lvl1pPr>
+          </a:lstStyle>
+          <a:p>
+            <a:pPr algn="l"/>
+            <a:r>
+              <a:rPr lang="en-US" sz="2000" b="1" i="1" u="sng" dirty="0" smtClean="0">
+                <a:solidFill>
+                  <a:schemeClr val="bg1"/>
+                </a:solidFill>
+                <a:latin typeface="Arial" panose="020B0604020202020204" pitchFamily="34" charset="0"/>
+                <a:ea typeface="Roboto" panose="02000000000000000000" pitchFamily="2" charset="0"/>
+                <a:cs typeface="Arial" panose="020B0604020202020204" pitchFamily="34" charset="0"/>
+              </a:rPr>
+              <a:t>See Code Base:</a:t>
+            </a:r>
+          </a:p>
+          <a:p>
+            <a:pPr algn="l"/>
+            <a:endParaRPr lang="en-US" sz="2000" b="1" i="1" u="sng" dirty="0" smtClean="0">
+              <a:solidFill>
+                <a:schemeClr val="bg1"/>
+              </a:solidFill>
+              <a:latin typeface="Arial" panose="020B0604020202020204" pitchFamily="34" charset="0"/>
+              <a:ea typeface="Roboto" panose="02000000000000000000" pitchFamily="2" charset="0"/>
+              <a:cs typeface="Arial" panose="020B0604020202020204" pitchFamily="34" charset="0"/>
+            </a:endParaRPr>
+          </a:p>
+          <a:p>
+            <a:pPr algn="l"/>
+            <a:r>
+              <a:rPr lang="en-US" sz="2000" b="1" i="1" dirty="0" smtClean="0">
+                <a:solidFill>
+                  <a:schemeClr val="bg1"/>
+                </a:solidFill>
+                <a:latin typeface="Arial" panose="020B0604020202020204" pitchFamily="34" charset="0"/>
+                <a:ea typeface="Roboto" panose="02000000000000000000" pitchFamily="2" charset="0"/>
+                <a:cs typeface="Arial" panose="020B0604020202020204" pitchFamily="34" charset="0"/>
+              </a:rPr>
+              <a:t>https://github.com/afhaque/Rice-DevChats-Bootstrap</a:t>
+            </a:r>
+          </a:p>
+          <a:p>
+            <a:pPr algn="l"/>
+            <a:endParaRPr lang="en-US" sz="2000" b="1" i="1" dirty="0">
+              <a:solidFill>
+                <a:schemeClr val="bg1"/>
+              </a:solidFill>
+              <a:latin typeface="Arial" panose="020B0604020202020204" pitchFamily="34" charset="0"/>
+              <a:ea typeface="Roboto" panose="02000000000000000000" pitchFamily="2" charset="0"/>
+              <a:cs typeface="Arial" panose="020B0604020202020204" pitchFamily="34" charset="0"/>
+            </a:endParaRPr>
+          </a:p>
+          <a:p>
+            <a:pPr algn="l"/>
+            <a:r>
+              <a:rPr lang="en-US" sz="1400" b="1" i="1" dirty="0" smtClean="0">
+                <a:solidFill>
+                  <a:schemeClr val="bg1"/>
+                </a:solidFill>
+                <a:latin typeface="Arial" panose="020B0604020202020204" pitchFamily="34" charset="0"/>
+                <a:ea typeface="Roboto" panose="02000000000000000000" pitchFamily="2" charset="0"/>
+                <a:cs typeface="Arial" panose="020B0604020202020204" pitchFamily="34" charset="0"/>
+              </a:rPr>
+              <a:t>Start at </a:t>
+            </a:r>
+            <a:r>
+              <a:rPr lang="en-US" sz="1400" b="1" i="1" dirty="0">
+                <a:solidFill>
+                  <a:schemeClr val="bg1"/>
+                </a:solidFill>
+                <a:latin typeface="Arial" panose="020B0604020202020204" pitchFamily="34" charset="0"/>
+                <a:ea typeface="Roboto" panose="02000000000000000000" pitchFamily="2" charset="0"/>
+                <a:cs typeface="Arial" panose="020B0604020202020204" pitchFamily="34" charset="0"/>
+              </a:rPr>
+              <a:t>Commit: </a:t>
+            </a:r>
+            <a:r>
+              <a:rPr lang="en-US" sz="1400" b="1" i="1" dirty="0" smtClean="0">
+                <a:solidFill>
+                  <a:schemeClr val="bg1"/>
+                </a:solidFill>
+                <a:latin typeface="Arial" panose="020B0604020202020204" pitchFamily="34" charset="0"/>
+                <a:ea typeface="Roboto" panose="02000000000000000000" pitchFamily="2" charset="0"/>
+                <a:cs typeface="Arial" panose="020B0604020202020204" pitchFamily="34" charset="0"/>
+              </a:rPr>
+              <a:t>4342549ace9f99684b4192ea5c983b11624c6277</a:t>
+            </a:r>
+          </a:p>
+          <a:p>
+            <a:pPr algn="l"/>
+            <a:endParaRPr lang="en-US" sz="1400" b="1" i="1" dirty="0">
+              <a:solidFill>
+                <a:schemeClr val="bg1"/>
+              </a:solidFill>
+              <a:latin typeface="Arial" panose="020B0604020202020204" pitchFamily="34" charset="0"/>
+              <a:ea typeface="Roboto" panose="02000000000000000000" pitchFamily="2" charset="0"/>
+              <a:cs typeface="Arial" panose="020B0604020202020204" pitchFamily="34" charset="0"/>
+            </a:endParaRPr>
+          </a:p>
+          <a:p>
+            <a:pPr algn="l"/>
+            <a:r>
+              <a:rPr lang="en-US" sz="1400" b="1" i="1" dirty="0" smtClean="0">
+                <a:solidFill>
+                  <a:schemeClr val="bg1"/>
+                </a:solidFill>
+                <a:latin typeface="Arial" panose="020B0604020202020204" pitchFamily="34" charset="0"/>
+                <a:ea typeface="Roboto" panose="02000000000000000000" pitchFamily="2" charset="0"/>
+                <a:cs typeface="Arial" panose="020B0604020202020204" pitchFamily="34" charset="0"/>
+              </a:rPr>
+              <a:t>Go to Commit</a:t>
+            </a:r>
+            <a:r>
+              <a:rPr lang="en-US" sz="1400" b="1" i="1" dirty="0">
+                <a:solidFill>
+                  <a:schemeClr val="bg1"/>
+                </a:solidFill>
+                <a:latin typeface="Arial" panose="020B0604020202020204" pitchFamily="34" charset="0"/>
+                <a:ea typeface="Roboto" panose="02000000000000000000" pitchFamily="2" charset="0"/>
+                <a:cs typeface="Arial" panose="020B0604020202020204" pitchFamily="34" charset="0"/>
+              </a:rPr>
+              <a:t>: 62a29269d29d264536ccff4ab707d44493480da7</a:t>
+            </a:r>
+          </a:p>
+        </p:txBody>
+      </p:sp>
+    </p:spTree>
+    <p:extLst>
+      <p:ext uri="{BB962C8B-B14F-4D97-AF65-F5344CB8AC3E}">
+        <p14:creationId xmlns:p14="http://schemas.microsoft.com/office/powerpoint/2010/main" val="3542198205"/>
+      </p:ext>
+    </p:extLst>
+  </p:cSld>
+  <p:clrMapOvr>
+    <a:masterClrMapping/>
+  </p:clrMapOvr>
+  <p:timing>
+    <p:tnLst>
+      <p:par>
+        <p:cTn id="1" dur="indefinite" restart="never" nodeType="tmRoot"/>
+      </p:par>
+    </p:tnLst>
+  </p:timing>
+</p:sld>
+</file>
+
+<file path=ppt/slides/slide47.xml><?xml version="1.0" encoding="utf-8"?>
+<p:sld xmlns:a="http://schemas.openxmlformats.org/drawingml/2006/main" xmlns:r="http://schemas.openxmlformats.org/officeDocument/2006/relationships" xmlns:p="http://schemas.openxmlformats.org/presentationml/2006/main">
+  <p:cSld>
+    <p:spTree>
+      <p:nvGrpSpPr>
+        <p:cNvPr id="1" name=""/>
+        <p:cNvGrpSpPr/>
+        <p:nvPr/>
+      </p:nvGrpSpPr>
+      <p:grpSpPr>
+        <a:xfrm>
+          <a:off x="0" y="0"/>
+          <a:ext cx="0" cy="0"/>
+          <a:chOff x="0" y="0"/>
+          <a:chExt cx="0" cy="0"/>
+        </a:xfrm>
+      </p:grpSpPr>
+      <p:sp>
+        <p:nvSpPr>
+          <p:cNvPr id="9" name="Flowchart: Process 8"/>
+          <p:cNvSpPr/>
+          <p:nvPr/>
+        </p:nvSpPr>
+        <p:spPr>
+          <a:xfrm>
+            <a:off x="376381" y="3840481"/>
+            <a:ext cx="8447810" cy="45719"/>
+          </a:xfrm>
+          <a:prstGeom prst="flowChartProcess">
+            <a:avLst/>
+          </a:prstGeom>
+          <a:solidFill>
+            <a:schemeClr val="bg1"/>
+          </a:solidFill>
+          <a:ln>
+            <a:noFill/>
+          </a:ln>
+        </p:spPr>
+        <p:style>
+          <a:lnRef idx="2">
+            <a:schemeClr val="accent1">
+              <a:shade val="50000"/>
+            </a:schemeClr>
+          </a:lnRef>
+          <a:fillRef idx="1">
+            <a:schemeClr val="accent1"/>
+          </a:fillRef>
+          <a:effectRef idx="0">
+            <a:schemeClr val="accent1"/>
+          </a:effectRef>
+          <a:fontRef idx="minor">
+            <a:schemeClr val="lt1"/>
+          </a:fontRef>
+        </p:style>
+        <p:txBody>
+          <a:bodyPr rtlCol="0" anchor="ctr"/>
+          <a:lstStyle/>
+          <a:p>
+            <a:pPr algn="ctr"/>
+            <a:endParaRPr lang="en-US"/>
+          </a:p>
+        </p:txBody>
+      </p:sp>
+      <p:sp>
+        <p:nvSpPr>
+          <p:cNvPr id="5" name="Title 1"/>
+          <p:cNvSpPr>
+            <a:spLocks noGrp="1"/>
+          </p:cNvSpPr>
+          <p:nvPr>
+            <p:ph type="ctrTitle"/>
+          </p:nvPr>
+        </p:nvSpPr>
+        <p:spPr>
+          <a:xfrm>
+            <a:off x="322695" y="2376249"/>
+            <a:ext cx="8610600" cy="1464232"/>
+          </a:xfrm>
+        </p:spPr>
+        <p:txBody>
+          <a:bodyPr>
+            <a:normAutofit/>
+          </a:bodyPr>
+          <a:lstStyle/>
+          <a:p>
+            <a:pPr algn="l"/>
+            <a:r>
+              <a:rPr lang="en-US" sz="6000" b="1" i="1" dirty="0" smtClean="0">
+                <a:solidFill>
+                  <a:schemeClr val="bg1"/>
+                </a:solidFill>
+                <a:latin typeface="Arial" panose="020B0604020202020204" pitchFamily="34" charset="0"/>
+                <a:ea typeface="Roboto" panose="02000000000000000000" pitchFamily="2" charset="0"/>
+                <a:cs typeface="Arial" panose="020B0604020202020204" pitchFamily="34" charset="0"/>
+              </a:rPr>
+              <a:t>Questions?</a:t>
+            </a:r>
+            <a:endParaRPr lang="en-US" sz="6000" b="1" i="1" dirty="0">
+              <a:solidFill>
+                <a:schemeClr val="bg1"/>
+              </a:solidFill>
+              <a:latin typeface="Arial" panose="020B0604020202020204" pitchFamily="34" charset="0"/>
+              <a:ea typeface="Roboto" panose="02000000000000000000" pitchFamily="2" charset="0"/>
+              <a:cs typeface="Arial" panose="020B0604020202020204" pitchFamily="34" charset="0"/>
+            </a:endParaRPr>
+          </a:p>
+        </p:txBody>
+      </p:sp>
+    </p:spTree>
+    <p:extLst>
+      <p:ext uri="{BB962C8B-B14F-4D97-AF65-F5344CB8AC3E}">
+        <p14:creationId xmlns:p14="http://schemas.microsoft.com/office/powerpoint/2010/main" val="4020731822"/>
+      </p:ext>
+    </p:extLst>
+  </p:cSld>
+  <p:clrMapOvr>
+    <a:masterClrMapping/>
+  </p:clrMapOvr>
+  <p:timing>
+    <p:tnLst>
+      <p:par>
+        <p:cTn id="1" dur="indefinite" restart="never" nodeType="tmRoot"/>
+      </p:par>
+    </p:tnLst>
+  </p:timing>
+</p:sld>
+</file>
+
+<file path=ppt/slides/slide48.xml><?xml version="1.0" encoding="utf-8"?>
+<p:sld xmlns:a="http://schemas.openxmlformats.org/drawingml/2006/main" xmlns:r="http://schemas.openxmlformats.org/officeDocument/2006/relationships" xmlns:p="http://schemas.openxmlformats.org/presentationml/2006/main">
+  <p:cSld>
+    <p:spTree>
+      <p:nvGrpSpPr>
+        <p:cNvPr id="1" name=""/>
+        <p:cNvGrpSpPr/>
+        <p:nvPr/>
+      </p:nvGrpSpPr>
+      <p:grpSpPr>
+        <a:xfrm>
+          <a:off x="0" y="0"/>
+          <a:ext cx="0" cy="0"/>
+          <a:chOff x="0" y="0"/>
+          <a:chExt cx="0" cy="0"/>
+        </a:xfrm>
+      </p:grpSpPr>
+      <p:sp>
+        <p:nvSpPr>
           <p:cNvPr id="4" name="Title 1"/>
           <p:cNvSpPr txBox="1">
             <a:spLocks/>
@@ -14841,7 +16051,7 @@
         </p:nvSpPr>
         <p:spPr>
           <a:xfrm>
-            <a:off x="2083636" y="972234"/>
+            <a:off x="2083636" y="1143000"/>
             <a:ext cx="5032147" cy="646331"/>
           </a:xfrm>
           <a:prstGeom prst="rect">

</xml_diff>